<commit_message>
agrego una minuta de reunion y subo la presentacion en pdf para que todos vean
</commit_message>
<xml_diff>
--- a/Presentacion/Presentacion.pptx
+++ b/Presentacion/Presentacion.pptx
@@ -4,6 +4,9 @@
   <p:sldMasterIdLst>
     <p:sldMasterId id="2147483816" r:id="rId1"/>
   </p:sldMasterIdLst>
+  <p:notesMasterIdLst>
+    <p:notesMasterId r:id="rId17"/>
+  </p:notesMasterIdLst>
   <p:sldIdLst>
     <p:sldId id="258" r:id="rId2"/>
     <p:sldId id="256" r:id="rId3"/>
@@ -13,6 +16,13 @@
     <p:sldId id="259" r:id="rId7"/>
     <p:sldId id="257" r:id="rId8"/>
     <p:sldId id="263" r:id="rId9"/>
+    <p:sldId id="270" r:id="rId10"/>
+    <p:sldId id="264" r:id="rId11"/>
+    <p:sldId id="265" r:id="rId12"/>
+    <p:sldId id="266" r:id="rId13"/>
+    <p:sldId id="267" r:id="rId14"/>
+    <p:sldId id="268" r:id="rId15"/>
+    <p:sldId id="269" r:id="rId16"/>
   </p:sldIdLst>
   <p:sldSz cx="9144000" cy="6858000" type="screen4x3"/>
   <p:notesSz cx="6858000" cy="9144000"/>
@@ -1240,82 +1250,6 @@
         </a:p>
       </dgm:t>
     </dgm:pt>
-    <dgm:pt modelId="{1E4B7DDD-4F04-4FA8-9471-EA7EBE484506}">
-      <dgm:prSet/>
-      <dgm:spPr/>
-      <dgm:t>
-        <a:bodyPr/>
-        <a:lstStyle/>
-        <a:p>
-          <a:pPr rtl="0"/>
-          <a:r>
-            <a:rPr lang="es-AR" dirty="0" smtClean="0"/>
-            <a:t>Satisfacción de Estándares</a:t>
-          </a:r>
-          <a:endParaRPr lang="es-AR" dirty="0"/>
-        </a:p>
-      </dgm:t>
-    </dgm:pt>
-    <dgm:pt modelId="{D97C422B-A4CA-4B1C-9B59-3A6A3EBB4F86}" type="parTrans" cxnId="{B4996A55-3343-403B-B137-3C42517A1876}">
-      <dgm:prSet/>
-      <dgm:spPr/>
-      <dgm:t>
-        <a:bodyPr/>
-        <a:lstStyle/>
-        <a:p>
-          <a:endParaRPr lang="es-AR"/>
-        </a:p>
-      </dgm:t>
-    </dgm:pt>
-    <dgm:pt modelId="{311533FB-B21D-4D27-8173-B5DC79A01368}" type="sibTrans" cxnId="{B4996A55-3343-403B-B137-3C42517A1876}">
-      <dgm:prSet/>
-      <dgm:spPr/>
-      <dgm:t>
-        <a:bodyPr/>
-        <a:lstStyle/>
-        <a:p>
-          <a:endParaRPr lang="es-AR"/>
-        </a:p>
-      </dgm:t>
-    </dgm:pt>
-    <dgm:pt modelId="{2A05199A-8E55-4DAC-B952-D65C790A62A0}">
-      <dgm:prSet/>
-      <dgm:spPr/>
-      <dgm:t>
-        <a:bodyPr/>
-        <a:lstStyle/>
-        <a:p>
-          <a:pPr rtl="0"/>
-          <a:r>
-            <a:rPr lang="es-AR" dirty="0" smtClean="0"/>
-            <a:t>Antigüedad del Contrato.</a:t>
-          </a:r>
-          <a:endParaRPr lang="es-AR" dirty="0"/>
-        </a:p>
-      </dgm:t>
-    </dgm:pt>
-    <dgm:pt modelId="{76AB4B32-D979-48A7-81E2-15AD683CF2E6}" type="parTrans" cxnId="{32C07E74-D8C6-4497-8525-9991187823AC}">
-      <dgm:prSet/>
-      <dgm:spPr/>
-      <dgm:t>
-        <a:bodyPr/>
-        <a:lstStyle/>
-        <a:p>
-          <a:endParaRPr lang="es-AR"/>
-        </a:p>
-      </dgm:t>
-    </dgm:pt>
-    <dgm:pt modelId="{7C5603CF-DCAB-424B-A888-BE9EECC07052}" type="sibTrans" cxnId="{32C07E74-D8C6-4497-8525-9991187823AC}">
-      <dgm:prSet/>
-      <dgm:spPr/>
-      <dgm:t>
-        <a:bodyPr/>
-        <a:lstStyle/>
-        <a:p>
-          <a:endParaRPr lang="es-AR"/>
-        </a:p>
-      </dgm:t>
-    </dgm:pt>
     <dgm:pt modelId="{69D4992F-85D2-4745-95AF-0D4A30CEAD37}">
       <dgm:prSet/>
       <dgm:spPr/>
@@ -1392,7 +1326,7 @@
         </a:p>
       </dgm:t>
     </dgm:pt>
-    <dgm:pt modelId="{88EAB0F4-46CE-443B-8862-1AE40F92914C}">
+    <dgm:pt modelId="{73A43C2F-50AB-42E0-A06B-BA6B48E86EB3}">
       <dgm:prSet/>
       <dgm:spPr/>
       <dgm:t>
@@ -1402,13 +1336,13 @@
           <a:pPr rtl="0"/>
           <a:r>
             <a:rPr lang="es-AR" dirty="0" smtClean="0"/>
-            <a:t>Vínculos informales con los clientes</a:t>
+            <a:t>Promover valores de la empresa a empleados</a:t>
           </a:r>
           <a:endParaRPr lang="es-AR" dirty="0"/>
         </a:p>
       </dgm:t>
     </dgm:pt>
-    <dgm:pt modelId="{F8F497C4-1F67-4544-ACC2-62509FC3D7FE}" type="parTrans" cxnId="{1F588FB1-4A6F-4589-BEDD-4E2B6382A7F1}">
+    <dgm:pt modelId="{2BEC9442-07F0-43D0-A6CD-4826C9292744}" type="parTrans" cxnId="{DD27D5B2-0A6E-40A4-8348-B31C1C3EED99}">
       <dgm:prSet/>
       <dgm:spPr/>
       <dgm:t>
@@ -1419,7 +1353,7 @@
         </a:p>
       </dgm:t>
     </dgm:pt>
-    <dgm:pt modelId="{3A186F0B-9A5C-484F-A924-87E5D2D56CAB}" type="sibTrans" cxnId="{1F588FB1-4A6F-4589-BEDD-4E2B6382A7F1}">
+    <dgm:pt modelId="{3E55B58A-0C0C-4DEB-B2A0-722716B40CEB}" type="sibTrans" cxnId="{DD27D5B2-0A6E-40A4-8348-B31C1C3EED99}">
       <dgm:prSet/>
       <dgm:spPr/>
       <dgm:t>
@@ -1429,68 +1363,6 @@
           <a:endParaRPr lang="es-AR"/>
         </a:p>
       </dgm:t>
-    </dgm:pt>
-    <dgm:pt modelId="{F16BD526-6D86-4308-A788-83DA0591944F}">
-      <dgm:prSet/>
-      <dgm:spPr/>
-      <dgm:t>
-        <a:bodyPr/>
-        <a:lstStyle/>
-        <a:p>
-          <a:pPr rtl="0"/>
-          <a:r>
-            <a:rPr lang="es-AR" dirty="0" smtClean="0"/>
-            <a:t>Limitaciones  físicas</a:t>
-          </a:r>
-          <a:endParaRPr lang="es-AR" dirty="0"/>
-        </a:p>
-      </dgm:t>
-    </dgm:pt>
-    <dgm:pt modelId="{98BD3010-ACC2-485A-9060-962097E51D7A}" type="parTrans" cxnId="{81FEF3EF-9578-440E-A6C4-9EE7C26F1843}">
-      <dgm:prSet/>
-      <dgm:spPr/>
-      <dgm:t>
-        <a:bodyPr/>
-        <a:lstStyle/>
-        <a:p>
-          <a:endParaRPr lang="es-AR"/>
-        </a:p>
-      </dgm:t>
-    </dgm:pt>
-    <dgm:pt modelId="{1B87073E-3D1B-4AAC-A07B-4122A7AD87BE}" type="sibTrans" cxnId="{81FEF3EF-9578-440E-A6C4-9EE7C26F1843}">
-      <dgm:prSet/>
-      <dgm:spPr/>
-      <dgm:t>
-        <a:bodyPr/>
-        <a:lstStyle/>
-        <a:p>
-          <a:endParaRPr lang="es-AR"/>
-        </a:p>
-      </dgm:t>
-    </dgm:pt>
-    <dgm:pt modelId="{73A43C2F-50AB-42E0-A06B-BA6B48E86EB3}">
-      <dgm:prSet/>
-      <dgm:spPr/>
-      <dgm:t>
-        <a:bodyPr/>
-        <a:lstStyle/>
-        <a:p>
-          <a:pPr rtl="0"/>
-          <a:r>
-            <a:rPr lang="es-AR" b="0" i="0" u="none" dirty="0" smtClean="0"/>
-            <a:t>Nuevo negocio, producción gráfica.</a:t>
-          </a:r>
-          <a:endParaRPr lang="es-AR" dirty="0"/>
-        </a:p>
-      </dgm:t>
-    </dgm:pt>
-    <dgm:pt modelId="{2BEC9442-07F0-43D0-A6CD-4826C9292744}" type="parTrans" cxnId="{DD27D5B2-0A6E-40A4-8348-B31C1C3EED99}">
-      <dgm:prSet/>
-      <dgm:spPr/>
-    </dgm:pt>
-    <dgm:pt modelId="{3E55B58A-0C0C-4DEB-B2A0-722716B40CEB}" type="sibTrans" cxnId="{DD27D5B2-0A6E-40A4-8348-B31C1C3EED99}">
-      <dgm:prSet/>
-      <dgm:spPr/>
     </dgm:pt>
     <dgm:pt modelId="{A72031DC-6AD7-4E92-B5B6-73F64AA2F5AC}">
       <dgm:prSet/>
@@ -1502,7 +1374,11 @@
           <a:pPr rtl="0"/>
           <a:r>
             <a:rPr lang="es-AR" b="0" i="0" u="none" dirty="0" smtClean="0"/>
-            <a:t>Renuncias del personal por falta de compromiso y/o autonomía.</a:t>
+            <a:t>Renuncias del personal por falta de </a:t>
+          </a:r>
+          <a:r>
+            <a:rPr lang="es-AR" b="0" i="0" u="none" dirty="0" smtClean="0"/>
+            <a:t>compromiso.</a:t>
           </a:r>
           <a:endParaRPr lang="es-AR" dirty="0"/>
         </a:p>
@@ -1511,34 +1387,24 @@
     <dgm:pt modelId="{8919A4EC-C574-405B-AB06-B9D9EF73BF5B}" type="parTrans" cxnId="{0EDEC647-E71F-44D8-B65E-32BC8BECD35A}">
       <dgm:prSet/>
       <dgm:spPr/>
+      <dgm:t>
+        <a:bodyPr/>
+        <a:lstStyle/>
+        <a:p>
+          <a:endParaRPr lang="es-AR"/>
+        </a:p>
+      </dgm:t>
     </dgm:pt>
     <dgm:pt modelId="{437F6ACA-0C6C-4E41-B7F8-52479B3D3DDD}" type="sibTrans" cxnId="{0EDEC647-E71F-44D8-B65E-32BC8BECD35A}">
-      <dgm:prSet/>
-      <dgm:spPr/>
-    </dgm:pt>
-    <dgm:pt modelId="{F2E8D1D3-CFB5-4C18-ADE4-52605E148E11}">
       <dgm:prSet/>
       <dgm:spPr/>
       <dgm:t>
         <a:bodyPr/>
         <a:lstStyle/>
         <a:p>
-          <a:pPr rtl="0"/>
-          <a:r>
-            <a:rPr lang="es-AR" dirty="0" smtClean="0"/>
-            <a:t>Promover el compromiso  y valores de la empresa a los empleados</a:t>
-          </a:r>
-          <a:endParaRPr lang="es-AR" dirty="0"/>
+          <a:endParaRPr lang="es-AR"/>
         </a:p>
       </dgm:t>
-    </dgm:pt>
-    <dgm:pt modelId="{34BA3757-142F-40B4-BDE4-2DAD0D3B9057}" type="parTrans" cxnId="{ED9E1D78-05A7-4DE5-9C57-5ED2FC06EBB6}">
-      <dgm:prSet/>
-      <dgm:spPr/>
-    </dgm:pt>
-    <dgm:pt modelId="{AFDD0C87-61DD-41AF-8F2E-B83CDF8EA971}" type="sibTrans" cxnId="{ED9E1D78-05A7-4DE5-9C57-5ED2FC06EBB6}">
-      <dgm:prSet/>
-      <dgm:spPr/>
     </dgm:pt>
     <dgm:pt modelId="{654D4F92-B2D3-458D-9B79-8F2E45AD76B6}">
       <dgm:prSet/>
@@ -1549,8 +1415,8 @@
         <a:p>
           <a:pPr rtl="0"/>
           <a:r>
-            <a:rPr lang="es-AR" b="0" i="0" u="none" smtClean="0"/>
-            <a:t>Establecer su identidad institucional y darla a conocer a sus públicos.</a:t>
+            <a:rPr lang="es-AR" b="0" i="0" u="none" dirty="0" smtClean="0"/>
+            <a:t>Establecer su identidad institucional </a:t>
           </a:r>
           <a:endParaRPr lang="es-AR" dirty="0"/>
         </a:p>
@@ -1559,34 +1425,24 @@
     <dgm:pt modelId="{6BB6293F-3D11-4A4C-8F5C-4FA8B498A4D2}" type="parTrans" cxnId="{B2F8F0B7-C5FC-4BE9-A3A4-70E05462D162}">
       <dgm:prSet/>
       <dgm:spPr/>
+      <dgm:t>
+        <a:bodyPr/>
+        <a:lstStyle/>
+        <a:p>
+          <a:endParaRPr lang="es-AR"/>
+        </a:p>
+      </dgm:t>
     </dgm:pt>
     <dgm:pt modelId="{C5EBC75C-AAE4-4C07-B079-0CC8F3C6CF0F}" type="sibTrans" cxnId="{B2F8F0B7-C5FC-4BE9-A3A4-70E05462D162}">
-      <dgm:prSet/>
-      <dgm:spPr/>
-    </dgm:pt>
-    <dgm:pt modelId="{05B39CA7-B3F0-4B96-A0C5-A799D71EE5E8}">
       <dgm:prSet/>
       <dgm:spPr/>
       <dgm:t>
         <a:bodyPr/>
         <a:lstStyle/>
         <a:p>
-          <a:pPr rtl="0"/>
-          <a:r>
-            <a:rPr lang="es-AR" b="0" i="0" u="none" dirty="0" smtClean="0"/>
-            <a:t>Vender nuevamente a Brasil y México.</a:t>
-          </a:r>
-          <a:endParaRPr lang="es-AR" dirty="0"/>
+          <a:endParaRPr lang="es-AR"/>
         </a:p>
       </dgm:t>
-    </dgm:pt>
-    <dgm:pt modelId="{BA08F874-7B44-4618-A0B5-DAEBE43AC9BC}" type="parTrans" cxnId="{252A41F4-F542-4692-890D-FF2EB9E741C4}">
-      <dgm:prSet/>
-      <dgm:spPr/>
-    </dgm:pt>
-    <dgm:pt modelId="{EA9DDD72-75BB-4E8C-9CEC-3B069BF8A156}" type="sibTrans" cxnId="{252A41F4-F542-4692-890D-FF2EB9E741C4}">
-      <dgm:prSet/>
-      <dgm:spPr/>
     </dgm:pt>
     <dgm:pt modelId="{F12D9970-9670-4C84-9E9B-32FAB30C9F22}">
       <dgm:prSet/>
@@ -1615,34 +1471,24 @@
     <dgm:pt modelId="{FD0C7FE7-8005-4D54-B423-A833EB45DDCA}" type="parTrans" cxnId="{C9C2DF6A-241E-4122-B192-C2CA3263402F}">
       <dgm:prSet/>
       <dgm:spPr/>
+      <dgm:t>
+        <a:bodyPr/>
+        <a:lstStyle/>
+        <a:p>
+          <a:endParaRPr lang="es-AR"/>
+        </a:p>
+      </dgm:t>
     </dgm:pt>
     <dgm:pt modelId="{2BF4798B-700B-4F8C-B173-11A7DA3B5BB3}" type="sibTrans" cxnId="{C9C2DF6A-241E-4122-B192-C2CA3263402F}">
-      <dgm:prSet/>
-      <dgm:spPr/>
-    </dgm:pt>
-    <dgm:pt modelId="{A1E88F13-7501-4194-B5C2-9EF35B517936}">
       <dgm:prSet/>
       <dgm:spPr/>
       <dgm:t>
         <a:bodyPr/>
         <a:lstStyle/>
         <a:p>
-          <a:pPr rtl="0"/>
-          <a:r>
-            <a:rPr lang="es-AR" b="0" i="0" u="none" dirty="0" smtClean="0"/>
-            <a:t>Brasil como potencial competidor.</a:t>
-          </a:r>
-          <a:endParaRPr lang="es-AR" dirty="0"/>
+          <a:endParaRPr lang="es-AR"/>
         </a:p>
       </dgm:t>
-    </dgm:pt>
-    <dgm:pt modelId="{4CEDA5D7-9E92-43E0-9A60-9CA0C292D7D5}" type="parTrans" cxnId="{BEC28348-DCF8-4CAA-8DAA-3C46E1251461}">
-      <dgm:prSet/>
-      <dgm:spPr/>
-    </dgm:pt>
-    <dgm:pt modelId="{2A5BD06C-97CD-40DA-B435-8545BAC16845}" type="sibTrans" cxnId="{BEC28348-DCF8-4CAA-8DAA-3C46E1251461}">
-      <dgm:prSet/>
-      <dgm:spPr/>
     </dgm:pt>
     <dgm:pt modelId="{737226B1-6088-45E1-B651-1B9FE9E356C1}" type="pres">
       <dgm:prSet presAssocID="{488108B7-8FED-4F7C-AB93-E8688431D24C}" presName="Name0" presStyleCnt="0">
@@ -1653,13 +1499,20 @@
         </dgm:presLayoutVars>
       </dgm:prSet>
       <dgm:spPr/>
+      <dgm:t>
+        <a:bodyPr/>
+        <a:lstStyle/>
+        <a:p>
+          <a:endParaRPr lang="es-AR"/>
+        </a:p>
+      </dgm:t>
     </dgm:pt>
     <dgm:pt modelId="{6DFC0D3F-FF56-4AF6-B844-06752871C3D0}" type="pres">
       <dgm:prSet presAssocID="{AE09FC52-CBD1-4976-BB3E-E26F79961999}" presName="linNode" presStyleCnt="0"/>
       <dgm:spPr/>
     </dgm:pt>
     <dgm:pt modelId="{A6361060-C10E-4E37-8F2E-22995CBE22E8}" type="pres">
-      <dgm:prSet presAssocID="{AE09FC52-CBD1-4976-BB3E-E26F79961999}" presName="parentText" presStyleLbl="node1" presStyleIdx="0" presStyleCnt="4">
+      <dgm:prSet presAssocID="{AE09FC52-CBD1-4976-BB3E-E26F79961999}" presName="parentText" presStyleLbl="node1" presStyleIdx="0" presStyleCnt="4" custScaleX="71566">
         <dgm:presLayoutVars>
           <dgm:chMax val="1"/>
           <dgm:bulletEnabled val="1"/>
@@ -1698,7 +1551,7 @@
       <dgm:spPr/>
     </dgm:pt>
     <dgm:pt modelId="{183613A6-3582-4B54-AB0A-5BB8F694C388}" type="pres">
-      <dgm:prSet presAssocID="{DEFA69BD-3F00-49CD-9A46-A48CF9E9A136}" presName="parentText" presStyleLbl="node1" presStyleIdx="1" presStyleCnt="4">
+      <dgm:prSet presAssocID="{DEFA69BD-3F00-49CD-9A46-A48CF9E9A136}" presName="parentText" presStyleLbl="node1" presStyleIdx="1" presStyleCnt="4" custScaleX="71566">
         <dgm:presLayoutVars>
           <dgm:chMax val="1"/>
           <dgm:bulletEnabled val="1"/>
@@ -1737,13 +1590,20 @@
       <dgm:spPr/>
     </dgm:pt>
     <dgm:pt modelId="{1137A19C-59D5-4F79-A5E0-6C0BA5E45B0D}" type="pres">
-      <dgm:prSet presAssocID="{8EB2F827-9AAD-469F-9969-59BE568D8BC7}" presName="parentText" presStyleLbl="node1" presStyleIdx="2" presStyleCnt="4">
+      <dgm:prSet presAssocID="{8EB2F827-9AAD-469F-9969-59BE568D8BC7}" presName="parentText" presStyleLbl="node1" presStyleIdx="2" presStyleCnt="4" custScaleX="71566">
         <dgm:presLayoutVars>
           <dgm:chMax val="1"/>
           <dgm:bulletEnabled val="1"/>
         </dgm:presLayoutVars>
       </dgm:prSet>
       <dgm:spPr/>
+      <dgm:t>
+        <a:bodyPr/>
+        <a:lstStyle/>
+        <a:p>
+          <a:endParaRPr lang="es-AR"/>
+        </a:p>
+      </dgm:t>
     </dgm:pt>
     <dgm:pt modelId="{6CCF747A-BDBA-435F-879F-3F7E1ADEC61C}" type="pres">
       <dgm:prSet presAssocID="{8EB2F827-9AAD-469F-9969-59BE568D8BC7}" presName="descendantText" presStyleLbl="alignAccFollowNode1" presStyleIdx="2" presStyleCnt="4">
@@ -1769,7 +1629,7 @@
       <dgm:spPr/>
     </dgm:pt>
     <dgm:pt modelId="{493AB5D1-2395-4E95-A0C0-AC50A5BB937D}" type="pres">
-      <dgm:prSet presAssocID="{AC81930F-D710-4B09-9F7F-7E714960459A}" presName="parentText" presStyleLbl="node1" presStyleIdx="3" presStyleCnt="4">
+      <dgm:prSet presAssocID="{AC81930F-D710-4B09-9F7F-7E714960459A}" presName="parentText" presStyleLbl="node1" presStyleIdx="3" presStyleCnt="4" custScaleX="71566">
         <dgm:presLayoutVars>
           <dgm:chMax val="1"/>
           <dgm:bulletEnabled val="1"/>
@@ -1801,45 +1661,31 @@
     </dgm:pt>
   </dgm:ptLst>
   <dgm:cxnLst>
-    <dgm:cxn modelId="{497D09C4-B9E6-411E-9788-54594A2941E0}" type="presOf" srcId="{88EAB0F4-46CE-443B-8862-1AE40F92914C}" destId="{6CCF747A-BDBA-435F-879F-3F7E1ADEC61C}" srcOrd="0" destOrd="2" presId="urn:microsoft.com/office/officeart/2005/8/layout/vList5"/>
+    <dgm:cxn modelId="{7483819E-C469-493D-8BE8-94BE64832693}" srcId="{488108B7-8FED-4F7C-AB93-E8688431D24C}" destId="{AE09FC52-CBD1-4976-BB3E-E26F79961999}" srcOrd="0" destOrd="0" parTransId="{551D02C7-B68D-4177-87E1-1525E6289AB2}" sibTransId="{F7FFED55-5B30-4076-9B7C-2B98A23599DF}"/>
+    <dgm:cxn modelId="{129B1655-F589-4619-B040-749226143FC3}" type="presOf" srcId="{488108B7-8FED-4F7C-AB93-E8688431D24C}" destId="{737226B1-6088-45E1-B651-1B9FE9E356C1}" srcOrd="0" destOrd="0" presId="urn:microsoft.com/office/officeart/2005/8/layout/vList5"/>
+    <dgm:cxn modelId="{4F8A4F85-CBF7-4C19-8877-78A5C01E784F}" type="presOf" srcId="{AC81930F-D710-4B09-9F7F-7E714960459A}" destId="{493AB5D1-2395-4E95-A0C0-AC50A5BB937D}" srcOrd="0" destOrd="0" presId="urn:microsoft.com/office/officeart/2005/8/layout/vList5"/>
+    <dgm:cxn modelId="{E402F184-990B-4F57-B13D-1988C255A9AA}" type="presOf" srcId="{8EB2F827-9AAD-469F-9969-59BE568D8BC7}" destId="{1137A19C-59D5-4F79-A5E0-6C0BA5E45B0D}" srcOrd="0" destOrd="0" presId="urn:microsoft.com/office/officeart/2005/8/layout/vList5"/>
+    <dgm:cxn modelId="{2C0916B5-D56F-4B5F-8FAD-81D4477D3C4D}" srcId="{488108B7-8FED-4F7C-AB93-E8688431D24C}" destId="{8EB2F827-9AAD-469F-9969-59BE568D8BC7}" srcOrd="2" destOrd="0" parTransId="{3202E687-8709-400C-9726-044057AB80BB}" sibTransId="{DCA33057-4D31-4607-8DE2-E45CE472533C}"/>
+    <dgm:cxn modelId="{6E9336BE-C842-4929-941F-580DE2FCA550}" srcId="{488108B7-8FED-4F7C-AB93-E8688431D24C}" destId="{AC81930F-D710-4B09-9F7F-7E714960459A}" srcOrd="3" destOrd="0" parTransId="{1D4AE1BE-B7D1-46F8-A319-5FCF5C0A814D}" sibTransId="{935A3844-A879-44E1-A1CA-C6880796FEB0}"/>
+    <dgm:cxn modelId="{C9C2DF6A-241E-4122-B192-C2CA3263402F}" srcId="{AC81930F-D710-4B09-9F7F-7E714960459A}" destId="{F12D9970-9670-4C84-9E9B-32FAB30C9F22}" srcOrd="1" destOrd="0" parTransId="{FD0C7FE7-8005-4D54-B423-A833EB45DDCA}" sibTransId="{2BF4798B-700B-4F8C-B173-11A7DA3B5BB3}"/>
+    <dgm:cxn modelId="{25DD0083-8514-400F-A928-9C0764F6661E}" type="presOf" srcId="{A72031DC-6AD7-4E92-B5B6-73F64AA2F5AC}" destId="{BF41B2D6-AEE9-4E39-B637-343DC8CEC7DB}" srcOrd="0" destOrd="0" presId="urn:microsoft.com/office/officeart/2005/8/layout/vList5"/>
+    <dgm:cxn modelId="{3CB1B86F-9DF2-40B3-8C73-4A721D319283}" type="presOf" srcId="{73A43C2F-50AB-42E0-A06B-BA6B48E86EB3}" destId="{E59E6B55-A114-44EA-B0F0-9AB5AEB9FA41}" srcOrd="0" destOrd="0" presId="urn:microsoft.com/office/officeart/2005/8/layout/vList5"/>
+    <dgm:cxn modelId="{B7D9F503-C8E3-48B5-A168-2392FEB9278B}" srcId="{8EB2F827-9AAD-469F-9969-59BE568D8BC7}" destId="{69D4992F-85D2-4745-95AF-0D4A30CEAD37}" srcOrd="0" destOrd="0" parTransId="{9E92C412-DD16-43ED-B628-0B6C54FA9829}" sibTransId="{F8E997B6-7570-4A2F-9BF0-4E2138249D56}"/>
+    <dgm:cxn modelId="{08E75189-6016-4E89-8915-D866E8EDF947}" type="presOf" srcId="{F12D9970-9670-4C84-9E9B-32FAB30C9F22}" destId="{BF41B2D6-AEE9-4E39-B637-343DC8CEC7DB}" srcOrd="0" destOrd="1" presId="urn:microsoft.com/office/officeart/2005/8/layout/vList5"/>
+    <dgm:cxn modelId="{CD627B7B-4268-44B4-8D76-3236B572E973}" type="presOf" srcId="{654D4F92-B2D3-458D-9B79-8F2E45AD76B6}" destId="{E59E6B55-A114-44EA-B0F0-9AB5AEB9FA41}" srcOrd="0" destOrd="1" presId="urn:microsoft.com/office/officeart/2005/8/layout/vList5"/>
+    <dgm:cxn modelId="{9219400A-EE80-4333-B6C9-33C102C57007}" srcId="{8EB2F827-9AAD-469F-9969-59BE568D8BC7}" destId="{30603449-8C72-4310-992C-BAA1D8E666CB}" srcOrd="1" destOrd="0" parTransId="{2108F448-2883-4FFF-9536-BA26CC5ACBC5}" sibTransId="{E00985EA-0B64-42F0-80D9-BEBD0EE66255}"/>
     <dgm:cxn modelId="{CCE59B7D-1608-4794-836C-CC87FE50657D}" type="presOf" srcId="{AE09FC52-CBD1-4976-BB3E-E26F79961999}" destId="{A6361060-C10E-4E37-8F2E-22995CBE22E8}" srcOrd="0" destOrd="0" presId="urn:microsoft.com/office/officeart/2005/8/layout/vList5"/>
+    <dgm:cxn modelId="{0EDEC647-E71F-44D8-B65E-32BC8BECD35A}" srcId="{AC81930F-D710-4B09-9F7F-7E714960459A}" destId="{A72031DC-6AD7-4E92-B5B6-73F64AA2F5AC}" srcOrd="0" destOrd="0" parTransId="{8919A4EC-C574-405B-AB06-B9D9EF73BF5B}" sibTransId="{437F6ACA-0C6C-4E41-B7F8-52479B3D3DDD}"/>
+    <dgm:cxn modelId="{925FAD2B-5224-4AD2-AC98-2F011F44DB2E}" srcId="{AE09FC52-CBD1-4976-BB3E-E26F79961999}" destId="{3B141F08-8C2D-4ABB-B615-821E7AF34079}" srcOrd="0" destOrd="0" parTransId="{B03F5C0F-ABDF-4344-A406-2AC961BDA172}" sibTransId="{7DBC2A96-AF7B-4B46-87A5-40A31795A166}"/>
     <dgm:cxn modelId="{54A439FB-E3F6-4143-8690-A13F8C2E523E}" type="presOf" srcId="{69D4992F-85D2-4745-95AF-0D4A30CEAD37}" destId="{6CCF747A-BDBA-435F-879F-3F7E1ADEC61C}" srcOrd="0" destOrd="0" presId="urn:microsoft.com/office/officeart/2005/8/layout/vList5"/>
-    <dgm:cxn modelId="{B2F8F0B7-C5FC-4BE9-A3A4-70E05462D162}" srcId="{DEFA69BD-3F00-49CD-9A46-A48CF9E9A136}" destId="{654D4F92-B2D3-458D-9B79-8F2E45AD76B6}" srcOrd="2" destOrd="0" parTransId="{6BB6293F-3D11-4A4C-8F5C-4FA8B498A4D2}" sibTransId="{C5EBC75C-AAE4-4C07-B079-0CC8F3C6CF0F}"/>
-    <dgm:cxn modelId="{E402F184-990B-4F57-B13D-1988C255A9AA}" type="presOf" srcId="{8EB2F827-9AAD-469F-9969-59BE568D8BC7}" destId="{1137A19C-59D5-4F79-A5E0-6C0BA5E45B0D}" srcOrd="0" destOrd="0" presId="urn:microsoft.com/office/officeart/2005/8/layout/vList5"/>
-    <dgm:cxn modelId="{252A41F4-F542-4692-890D-FF2EB9E741C4}" srcId="{DEFA69BD-3F00-49CD-9A46-A48CF9E9A136}" destId="{05B39CA7-B3F0-4B96-A0C5-A799D71EE5E8}" srcOrd="3" destOrd="0" parTransId="{BA08F874-7B44-4618-A0B5-DAEBE43AC9BC}" sibTransId="{EA9DDD72-75BB-4E8C-9CEC-3B069BF8A156}"/>
+    <dgm:cxn modelId="{DD27D5B2-0A6E-40A4-8348-B31C1C3EED99}" srcId="{DEFA69BD-3F00-49CD-9A46-A48CF9E9A136}" destId="{73A43C2F-50AB-42E0-A06B-BA6B48E86EB3}" srcOrd="0" destOrd="0" parTransId="{2BEC9442-07F0-43D0-A6CD-4826C9292744}" sibTransId="{3E55B58A-0C0C-4DEB-B2A0-722716B40CEB}"/>
+    <dgm:cxn modelId="{A1C3B9D9-EB0F-4AB7-97E8-4D978C746654}" type="presOf" srcId="{35DE487D-BC49-4883-A374-1A9FFDF9074F}" destId="{AACEF277-9F62-4033-B094-CD38A5D4759A}" srcOrd="0" destOrd="1" presId="urn:microsoft.com/office/officeart/2005/8/layout/vList5"/>
+    <dgm:cxn modelId="{02874E67-1A14-4EF6-A02B-E312669817A3}" srcId="{488108B7-8FED-4F7C-AB93-E8688431D24C}" destId="{DEFA69BD-3F00-49CD-9A46-A48CF9E9A136}" srcOrd="1" destOrd="0" parTransId="{FF9570AC-1582-4351-AA88-7BDB319E3730}" sibTransId="{560BEA0A-7D29-4972-8D92-A8D79DAF9717}"/>
+    <dgm:cxn modelId="{F21396DF-7939-400E-A644-2145C5844A2F}" type="presOf" srcId="{30603449-8C72-4310-992C-BAA1D8E666CB}" destId="{6CCF747A-BDBA-435F-879F-3F7E1ADEC61C}" srcOrd="0" destOrd="1" presId="urn:microsoft.com/office/officeart/2005/8/layout/vList5"/>
+    <dgm:cxn modelId="{D0595288-16DE-4A42-9C12-E8573B84695F}" type="presOf" srcId="{3B141F08-8C2D-4ABB-B615-821E7AF34079}" destId="{AACEF277-9F62-4033-B094-CD38A5D4759A}" srcOrd="0" destOrd="0" presId="urn:microsoft.com/office/officeart/2005/8/layout/vList5"/>
     <dgm:cxn modelId="{FD422CDF-0F04-4EE4-B363-581F3AAD864E}" type="presOf" srcId="{DEFA69BD-3F00-49CD-9A46-A48CF9E9A136}" destId="{183613A6-3582-4B54-AB0A-5BB8F694C388}" srcOrd="0" destOrd="0" presId="urn:microsoft.com/office/officeart/2005/8/layout/vList5"/>
-    <dgm:cxn modelId="{A1C3B9D9-EB0F-4AB7-97E8-4D978C746654}" type="presOf" srcId="{35DE487D-BC49-4883-A374-1A9FFDF9074F}" destId="{AACEF277-9F62-4033-B094-CD38A5D4759A}" srcOrd="0" destOrd="1" presId="urn:microsoft.com/office/officeart/2005/8/layout/vList5"/>
-    <dgm:cxn modelId="{08E75189-6016-4E89-8915-D866E8EDF947}" type="presOf" srcId="{F12D9970-9670-4C84-9E9B-32FAB30C9F22}" destId="{BF41B2D6-AEE9-4E39-B637-343DC8CEC7DB}" srcOrd="0" destOrd="1" presId="urn:microsoft.com/office/officeart/2005/8/layout/vList5"/>
-    <dgm:cxn modelId="{BEC28348-DCF8-4CAA-8DAA-3C46E1251461}" srcId="{AC81930F-D710-4B09-9F7F-7E714960459A}" destId="{A1E88F13-7501-4194-B5C2-9EF35B517936}" srcOrd="2" destOrd="0" parTransId="{4CEDA5D7-9E92-43E0-9A60-9CA0C292D7D5}" sibTransId="{2A5BD06C-97CD-40DA-B435-8545BAC16845}"/>
-    <dgm:cxn modelId="{7483819E-C469-493D-8BE8-94BE64832693}" srcId="{488108B7-8FED-4F7C-AB93-E8688431D24C}" destId="{AE09FC52-CBD1-4976-BB3E-E26F79961999}" srcOrd="0" destOrd="0" parTransId="{551D02C7-B68D-4177-87E1-1525E6289AB2}" sibTransId="{F7FFED55-5B30-4076-9B7C-2B98A23599DF}"/>
-    <dgm:cxn modelId="{32C07E74-D8C6-4497-8525-9991187823AC}" srcId="{AE09FC52-CBD1-4976-BB3E-E26F79961999}" destId="{2A05199A-8E55-4DAC-B952-D65C790A62A0}" srcOrd="3" destOrd="0" parTransId="{76AB4B32-D979-48A7-81E2-15AD683CF2E6}" sibTransId="{7C5603CF-DCAB-424B-A888-BE9EECC07052}"/>
-    <dgm:cxn modelId="{DD27D5B2-0A6E-40A4-8348-B31C1C3EED99}" srcId="{DEFA69BD-3F00-49CD-9A46-A48CF9E9A136}" destId="{73A43C2F-50AB-42E0-A06B-BA6B48E86EB3}" srcOrd="0" destOrd="0" parTransId="{2BEC9442-07F0-43D0-A6CD-4826C9292744}" sibTransId="{3E55B58A-0C0C-4DEB-B2A0-722716B40CEB}"/>
-    <dgm:cxn modelId="{F21396DF-7939-400E-A644-2145C5844A2F}" type="presOf" srcId="{30603449-8C72-4310-992C-BAA1D8E666CB}" destId="{6CCF747A-BDBA-435F-879F-3F7E1ADEC61C}" srcOrd="0" destOrd="1" presId="urn:microsoft.com/office/officeart/2005/8/layout/vList5"/>
-    <dgm:cxn modelId="{ED9E1D78-05A7-4DE5-9C57-5ED2FC06EBB6}" srcId="{DEFA69BD-3F00-49CD-9A46-A48CF9E9A136}" destId="{F2E8D1D3-CFB5-4C18-ADE4-52605E148E11}" srcOrd="1" destOrd="0" parTransId="{34BA3757-142F-40B4-BDE4-2DAD0D3B9057}" sibTransId="{AFDD0C87-61DD-41AF-8F2E-B83CDF8EA971}"/>
-    <dgm:cxn modelId="{02874E67-1A14-4EF6-A02B-E312669817A3}" srcId="{488108B7-8FED-4F7C-AB93-E8688431D24C}" destId="{DEFA69BD-3F00-49CD-9A46-A48CF9E9A136}" srcOrd="1" destOrd="0" parTransId="{FF9570AC-1582-4351-AA88-7BDB319E3730}" sibTransId="{560BEA0A-7D29-4972-8D92-A8D79DAF9717}"/>
-    <dgm:cxn modelId="{4F8A4F85-CBF7-4C19-8877-78A5C01E784F}" type="presOf" srcId="{AC81930F-D710-4B09-9F7F-7E714960459A}" destId="{493AB5D1-2395-4E95-A0C0-AC50A5BB937D}" srcOrd="0" destOrd="0" presId="urn:microsoft.com/office/officeart/2005/8/layout/vList5"/>
-    <dgm:cxn modelId="{181E81CC-118F-4660-B6A0-3DC457619827}" type="presOf" srcId="{05B39CA7-B3F0-4B96-A0C5-A799D71EE5E8}" destId="{E59E6B55-A114-44EA-B0F0-9AB5AEB9FA41}" srcOrd="0" destOrd="3" presId="urn:microsoft.com/office/officeart/2005/8/layout/vList5"/>
-    <dgm:cxn modelId="{B4996A55-3343-403B-B137-3C42517A1876}" srcId="{AE09FC52-CBD1-4976-BB3E-E26F79961999}" destId="{1E4B7DDD-4F04-4FA8-9471-EA7EBE484506}" srcOrd="2" destOrd="0" parTransId="{D97C422B-A4CA-4B1C-9B59-3A6A3EBB4F86}" sibTransId="{311533FB-B21D-4D27-8173-B5DC79A01368}"/>
-    <dgm:cxn modelId="{C9C2DF6A-241E-4122-B192-C2CA3263402F}" srcId="{AC81930F-D710-4B09-9F7F-7E714960459A}" destId="{F12D9970-9670-4C84-9E9B-32FAB30C9F22}" srcOrd="1" destOrd="0" parTransId="{FD0C7FE7-8005-4D54-B423-A833EB45DDCA}" sibTransId="{2BF4798B-700B-4F8C-B173-11A7DA3B5BB3}"/>
-    <dgm:cxn modelId="{9EDF9FF3-BB07-4772-A9B5-731B34A0A94F}" type="presOf" srcId="{A1E88F13-7501-4194-B5C2-9EF35B517936}" destId="{BF41B2D6-AEE9-4E39-B637-343DC8CEC7DB}" srcOrd="0" destOrd="2" presId="urn:microsoft.com/office/officeart/2005/8/layout/vList5"/>
-    <dgm:cxn modelId="{B7D9F503-C8E3-48B5-A168-2392FEB9278B}" srcId="{8EB2F827-9AAD-469F-9969-59BE568D8BC7}" destId="{69D4992F-85D2-4745-95AF-0D4A30CEAD37}" srcOrd="0" destOrd="0" parTransId="{9E92C412-DD16-43ED-B628-0B6C54FA9829}" sibTransId="{F8E997B6-7570-4A2F-9BF0-4E2138249D56}"/>
-    <dgm:cxn modelId="{129B1655-F589-4619-B040-749226143FC3}" type="presOf" srcId="{488108B7-8FED-4F7C-AB93-E8688431D24C}" destId="{737226B1-6088-45E1-B651-1B9FE9E356C1}" srcOrd="0" destOrd="0" presId="urn:microsoft.com/office/officeart/2005/8/layout/vList5"/>
-    <dgm:cxn modelId="{3CB1B86F-9DF2-40B3-8C73-4A721D319283}" type="presOf" srcId="{73A43C2F-50AB-42E0-A06B-BA6B48E86EB3}" destId="{E59E6B55-A114-44EA-B0F0-9AB5AEB9FA41}" srcOrd="0" destOrd="0" presId="urn:microsoft.com/office/officeart/2005/8/layout/vList5"/>
-    <dgm:cxn modelId="{E9300539-1098-4A88-A83D-769129DA4247}" type="presOf" srcId="{F16BD526-6D86-4308-A788-83DA0591944F}" destId="{6CCF747A-BDBA-435F-879F-3F7E1ADEC61C}" srcOrd="0" destOrd="3" presId="urn:microsoft.com/office/officeart/2005/8/layout/vList5"/>
-    <dgm:cxn modelId="{81FEF3EF-9578-440E-A6C4-9EE7C26F1843}" srcId="{8EB2F827-9AAD-469F-9969-59BE568D8BC7}" destId="{F16BD526-6D86-4308-A788-83DA0591944F}" srcOrd="3" destOrd="0" parTransId="{98BD3010-ACC2-485A-9060-962097E51D7A}" sibTransId="{1B87073E-3D1B-4AAC-A07B-4122A7AD87BE}"/>
-    <dgm:cxn modelId="{9219400A-EE80-4333-B6C9-33C102C57007}" srcId="{8EB2F827-9AAD-469F-9969-59BE568D8BC7}" destId="{30603449-8C72-4310-992C-BAA1D8E666CB}" srcOrd="1" destOrd="0" parTransId="{2108F448-2883-4FFF-9536-BA26CC5ACBC5}" sibTransId="{E00985EA-0B64-42F0-80D9-BEBD0EE66255}"/>
-    <dgm:cxn modelId="{7C3AD491-B29D-47AF-A4F4-20875AE0B4F0}" type="presOf" srcId="{F2E8D1D3-CFB5-4C18-ADE4-52605E148E11}" destId="{E59E6B55-A114-44EA-B0F0-9AB5AEB9FA41}" srcOrd="0" destOrd="1" presId="urn:microsoft.com/office/officeart/2005/8/layout/vList5"/>
-    <dgm:cxn modelId="{D0595288-16DE-4A42-9C12-E8573B84695F}" type="presOf" srcId="{3B141F08-8C2D-4ABB-B615-821E7AF34079}" destId="{AACEF277-9F62-4033-B094-CD38A5D4759A}" srcOrd="0" destOrd="0" presId="urn:microsoft.com/office/officeart/2005/8/layout/vList5"/>
-    <dgm:cxn modelId="{7E7D5B1A-2022-41C9-B7B2-E23BCEC00D0D}" type="presOf" srcId="{1E4B7DDD-4F04-4FA8-9471-EA7EBE484506}" destId="{AACEF277-9F62-4033-B094-CD38A5D4759A}" srcOrd="0" destOrd="2" presId="urn:microsoft.com/office/officeart/2005/8/layout/vList5"/>
-    <dgm:cxn modelId="{CD627B7B-4268-44B4-8D76-3236B572E973}" type="presOf" srcId="{654D4F92-B2D3-458D-9B79-8F2E45AD76B6}" destId="{E59E6B55-A114-44EA-B0F0-9AB5AEB9FA41}" srcOrd="0" destOrd="2" presId="urn:microsoft.com/office/officeart/2005/8/layout/vList5"/>
-    <dgm:cxn modelId="{0EDEC647-E71F-44D8-B65E-32BC8BECD35A}" srcId="{AC81930F-D710-4B09-9F7F-7E714960459A}" destId="{A72031DC-6AD7-4E92-B5B6-73F64AA2F5AC}" srcOrd="0" destOrd="0" parTransId="{8919A4EC-C574-405B-AB06-B9D9EF73BF5B}" sibTransId="{437F6ACA-0C6C-4E41-B7F8-52479B3D3DDD}"/>
-    <dgm:cxn modelId="{BFAC731E-BB6F-4E9E-A0DD-B4AF3E0A1E77}" type="presOf" srcId="{2A05199A-8E55-4DAC-B952-D65C790A62A0}" destId="{AACEF277-9F62-4033-B094-CD38A5D4759A}" srcOrd="0" destOrd="3" presId="urn:microsoft.com/office/officeart/2005/8/layout/vList5"/>
+    <dgm:cxn modelId="{B2F8F0B7-C5FC-4BE9-A3A4-70E05462D162}" srcId="{DEFA69BD-3F00-49CD-9A46-A48CF9E9A136}" destId="{654D4F92-B2D3-458D-9B79-8F2E45AD76B6}" srcOrd="1" destOrd="0" parTransId="{6BB6293F-3D11-4A4C-8F5C-4FA8B498A4D2}" sibTransId="{C5EBC75C-AAE4-4C07-B079-0CC8F3C6CF0F}"/>
     <dgm:cxn modelId="{8219442F-D6C4-41B5-9747-A59978509D68}" srcId="{AE09FC52-CBD1-4976-BB3E-E26F79961999}" destId="{35DE487D-BC49-4883-A374-1A9FFDF9074F}" srcOrd="1" destOrd="0" parTransId="{2773BB36-FE37-44EF-8D03-125B6D9D4B85}" sibTransId="{385DCAB8-5061-4499-BD08-2BEB42ACC0E6}"/>
-    <dgm:cxn modelId="{6E9336BE-C842-4929-941F-580DE2FCA550}" srcId="{488108B7-8FED-4F7C-AB93-E8688431D24C}" destId="{AC81930F-D710-4B09-9F7F-7E714960459A}" srcOrd="3" destOrd="0" parTransId="{1D4AE1BE-B7D1-46F8-A319-5FCF5C0A814D}" sibTransId="{935A3844-A879-44E1-A1CA-C6880796FEB0}"/>
-    <dgm:cxn modelId="{925FAD2B-5224-4AD2-AC98-2F011F44DB2E}" srcId="{AE09FC52-CBD1-4976-BB3E-E26F79961999}" destId="{3B141F08-8C2D-4ABB-B615-821E7AF34079}" srcOrd="0" destOrd="0" parTransId="{B03F5C0F-ABDF-4344-A406-2AC961BDA172}" sibTransId="{7DBC2A96-AF7B-4B46-87A5-40A31795A166}"/>
-    <dgm:cxn modelId="{1F588FB1-4A6F-4589-BEDD-4E2B6382A7F1}" srcId="{8EB2F827-9AAD-469F-9969-59BE568D8BC7}" destId="{88EAB0F4-46CE-443B-8862-1AE40F92914C}" srcOrd="2" destOrd="0" parTransId="{F8F497C4-1F67-4544-ACC2-62509FC3D7FE}" sibTransId="{3A186F0B-9A5C-484F-A924-87E5D2D56CAB}"/>
-    <dgm:cxn modelId="{2C0916B5-D56F-4B5F-8FAD-81D4477D3C4D}" srcId="{488108B7-8FED-4F7C-AB93-E8688431D24C}" destId="{8EB2F827-9AAD-469F-9969-59BE568D8BC7}" srcOrd="2" destOrd="0" parTransId="{3202E687-8709-400C-9726-044057AB80BB}" sibTransId="{DCA33057-4D31-4607-8DE2-E45CE472533C}"/>
-    <dgm:cxn modelId="{25DD0083-8514-400F-A928-9C0764F6661E}" type="presOf" srcId="{A72031DC-6AD7-4E92-B5B6-73F64AA2F5AC}" destId="{BF41B2D6-AEE9-4E39-B637-343DC8CEC7DB}" srcOrd="0" destOrd="0" presId="urn:microsoft.com/office/officeart/2005/8/layout/vList5"/>
     <dgm:cxn modelId="{330ED32E-FB7D-4267-8EAD-E5CE0B81F8ED}" type="presParOf" srcId="{737226B1-6088-45E1-B651-1B9FE9E356C1}" destId="{6DFC0D3F-FF56-4AF6-B844-06752871C3D0}" srcOrd="0" destOrd="0" presId="urn:microsoft.com/office/officeart/2005/8/layout/vList5"/>
     <dgm:cxn modelId="{776EFC55-0758-44A2-83CE-0B8B745EB698}" type="presParOf" srcId="{6DFC0D3F-FF56-4AF6-B844-06752871C3D0}" destId="{A6361060-C10E-4E37-8F2E-22995CBE22E8}" srcOrd="0" destOrd="0" presId="urn:microsoft.com/office/officeart/2005/8/layout/vList5"/>
     <dgm:cxn modelId="{90A90767-D497-42B5-B728-1C8A27B25D36}" type="presParOf" srcId="{6DFC0D3F-FF56-4AF6-B844-06752871C3D0}" destId="{AACEF277-9F62-4033-B094-CD38A5D4759A}" srcOrd="1" destOrd="0" presId="urn:microsoft.com/office/officeart/2005/8/layout/vList5"/>
@@ -1881,8 +1727,8 @@
       </dsp:nvSpPr>
       <dsp:spPr>
         <a:xfrm rot="5400000">
-          <a:off x="4972416" y="-1955518"/>
-          <a:ext cx="979959" cy="5141079"/>
+          <a:off x="4362469" y="-1857799"/>
+          <a:ext cx="970701" cy="4934021"/>
         </a:xfrm>
         <a:prstGeom prst="round2SameRect">
           <a:avLst/>
@@ -1938,12 +1784,12 @@
         <a:fontRef idx="minor"/>
       </dsp:style>
       <dsp:txBody>
-        <a:bodyPr spcFirstLastPara="0" vert="horz" wrap="square" lIns="49530" tIns="24765" rIns="49530" bIns="24765" numCol="1" spcCol="1270" anchor="ctr" anchorCtr="0">
+        <a:bodyPr spcFirstLastPara="0" vert="horz" wrap="square" lIns="72390" tIns="36195" rIns="72390" bIns="36195" numCol="1" spcCol="1270" anchor="ctr" anchorCtr="0">
           <a:noAutofit/>
         </a:bodyPr>
         <a:lstStyle/>
         <a:p>
-          <a:pPr marL="114300" lvl="1" indent="-114300" algn="l" defTabSz="577850" rtl="0">
+          <a:pPr marL="171450" lvl="1" indent="-171450" algn="l" defTabSz="844550" rtl="0">
             <a:lnSpc>
               <a:spcPct val="90000"/>
             </a:lnSpc>
@@ -1956,17 +1802,17 @@
             <a:buChar char="••"/>
           </a:pPr>
           <a:r>
-            <a:rPr lang="es-AR" sz="1300" kern="1200" dirty="0" smtClean="0"/>
+            <a:rPr lang="es-AR" sz="1900" kern="1200" dirty="0" smtClean="0"/>
             <a:t>Exclusividad y confianza con </a:t>
           </a:r>
           <a:r>
-            <a:rPr lang="es-AR" sz="1300" kern="1200" dirty="0" err="1" smtClean="0"/>
+            <a:rPr lang="es-AR" sz="1900" kern="1200" dirty="0" err="1" smtClean="0"/>
             <a:t>Nike</a:t>
           </a:r>
-          <a:endParaRPr lang="es-AR" sz="1300" kern="1200" dirty="0"/>
+          <a:endParaRPr lang="es-AR" sz="1900" kern="1200" dirty="0"/>
         </a:p>
         <a:p>
-          <a:pPr marL="114300" lvl="1" indent="-114300" algn="l" defTabSz="577850" rtl="0">
+          <a:pPr marL="171450" lvl="1" indent="-171450" algn="l" defTabSz="844550" rtl="0">
             <a:lnSpc>
               <a:spcPct val="90000"/>
             </a:lnSpc>
@@ -1979,53 +1825,15 @@
             <a:buChar char="••"/>
           </a:pPr>
           <a:r>
-            <a:rPr lang="es-AR" sz="1300" kern="1200" dirty="0" smtClean="0"/>
+            <a:rPr lang="es-AR" sz="1900" kern="1200" dirty="0" smtClean="0"/>
             <a:t>Innovación y crecimiento permanente</a:t>
           </a:r>
-          <a:endParaRPr lang="es-AR" sz="1300" kern="1200" dirty="0"/>
-        </a:p>
-        <a:p>
-          <a:pPr marL="114300" lvl="1" indent="-114300" algn="l" defTabSz="577850" rtl="0">
-            <a:lnSpc>
-              <a:spcPct val="90000"/>
-            </a:lnSpc>
-            <a:spcBef>
-              <a:spcPct val="0"/>
-            </a:spcBef>
-            <a:spcAft>
-              <a:spcPct val="15000"/>
-            </a:spcAft>
-            <a:buChar char="••"/>
-          </a:pPr>
-          <a:r>
-            <a:rPr lang="es-AR" sz="1300" kern="1200" dirty="0" smtClean="0"/>
-            <a:t>Satisfacción de Estándares</a:t>
-          </a:r>
-          <a:endParaRPr lang="es-AR" sz="1300" kern="1200" dirty="0"/>
-        </a:p>
-        <a:p>
-          <a:pPr marL="114300" lvl="1" indent="-114300" algn="l" defTabSz="577850" rtl="0">
-            <a:lnSpc>
-              <a:spcPct val="90000"/>
-            </a:lnSpc>
-            <a:spcBef>
-              <a:spcPct val="0"/>
-            </a:spcBef>
-            <a:spcAft>
-              <a:spcPct val="15000"/>
-            </a:spcAft>
-            <a:buChar char="••"/>
-          </a:pPr>
-          <a:r>
-            <a:rPr lang="es-AR" sz="1300" kern="1200" dirty="0" smtClean="0"/>
-            <a:t>Antigüedad del Contrato.</a:t>
-          </a:r>
-          <a:endParaRPr lang="es-AR" sz="1300" kern="1200" dirty="0"/>
+          <a:endParaRPr lang="es-AR" sz="1900" kern="1200" dirty="0"/>
         </a:p>
       </dsp:txBody>
       <dsp:txXfrm rot="5400000">
-        <a:off x="4972416" y="-1955518"/>
-        <a:ext cx="979959" cy="5141079"/>
+        <a:off x="4362469" y="-1857799"/>
+        <a:ext cx="970701" cy="4934021"/>
       </dsp:txXfrm>
     </dsp:sp>
     <dsp:sp modelId="{A6361060-C10E-4E37-8F2E-22995CBE22E8}">
@@ -2035,8 +1843,8 @@
       </dsp:nvSpPr>
       <dsp:spPr>
         <a:xfrm>
-          <a:off x="0" y="2546"/>
-          <a:ext cx="2891856" cy="1224949"/>
+          <a:off x="394576" y="2522"/>
+          <a:ext cx="1986233" cy="1213376"/>
         </a:xfrm>
         <a:prstGeom prst="roundRect">
           <a:avLst/>
@@ -2114,12 +1922,12 @@
         </a:fontRef>
       </dsp:style>
       <dsp:txBody>
-        <a:bodyPr spcFirstLastPara="0" vert="horz" wrap="square" lIns="114300" tIns="57150" rIns="114300" bIns="57150" numCol="1" spcCol="1270" anchor="ctr" anchorCtr="0">
+        <a:bodyPr spcFirstLastPara="0" vert="horz" wrap="square" lIns="76200" tIns="38100" rIns="76200" bIns="38100" numCol="1" spcCol="1270" anchor="ctr" anchorCtr="0">
           <a:noAutofit/>
         </a:bodyPr>
         <a:lstStyle/>
         <a:p>
-          <a:pPr lvl="0" algn="ctr" defTabSz="1333500" rtl="0">
+          <a:pPr lvl="0" algn="ctr" defTabSz="889000" rtl="0">
             <a:lnSpc>
               <a:spcPct val="90000"/>
             </a:lnSpc>
@@ -2131,15 +1939,15 @@
             </a:spcAft>
           </a:pPr>
           <a:r>
-            <a:rPr lang="es-AR" sz="3000" kern="1200" dirty="0" smtClean="0"/>
+            <a:rPr lang="es-AR" sz="2000" kern="1200" dirty="0" smtClean="0"/>
             <a:t>Fortalezas</a:t>
           </a:r>
-          <a:endParaRPr lang="es-AR" sz="3000" kern="1200" dirty="0"/>
+          <a:endParaRPr lang="es-AR" sz="2000" kern="1200" dirty="0"/>
         </a:p>
       </dsp:txBody>
       <dsp:txXfrm>
-        <a:off x="0" y="2546"/>
-        <a:ext cx="2891856" cy="1224949"/>
+        <a:off x="394576" y="2522"/>
+        <a:ext cx="1986233" cy="1213376"/>
       </dsp:txXfrm>
     </dsp:sp>
     <dsp:sp modelId="{E59E6B55-A114-44EA-B0F0-9AB5AEB9FA41}">
@@ -2149,8 +1957,8 @@
       </dsp:nvSpPr>
       <dsp:spPr>
         <a:xfrm rot="5400000">
-          <a:off x="4972416" y="-669321"/>
-          <a:ext cx="979959" cy="5141079"/>
+          <a:off x="4362469" y="-583753"/>
+          <a:ext cx="970701" cy="4934021"/>
         </a:xfrm>
         <a:prstGeom prst="round2SameRect">
           <a:avLst/>
@@ -2206,12 +2014,12 @@
         <a:fontRef idx="minor"/>
       </dsp:style>
       <dsp:txBody>
-        <a:bodyPr spcFirstLastPara="0" vert="horz" wrap="square" lIns="49530" tIns="24765" rIns="49530" bIns="24765" numCol="1" spcCol="1270" anchor="ctr" anchorCtr="0">
+        <a:bodyPr spcFirstLastPara="0" vert="horz" wrap="square" lIns="72390" tIns="36195" rIns="72390" bIns="36195" numCol="1" spcCol="1270" anchor="ctr" anchorCtr="0">
           <a:noAutofit/>
         </a:bodyPr>
         <a:lstStyle/>
         <a:p>
-          <a:pPr marL="114300" lvl="1" indent="-114300" algn="l" defTabSz="577850" rtl="0">
+          <a:pPr marL="171450" lvl="1" indent="-171450" algn="l" defTabSz="844550" rtl="0">
             <a:lnSpc>
               <a:spcPct val="90000"/>
             </a:lnSpc>
@@ -2224,13 +2032,13 @@
             <a:buChar char="••"/>
           </a:pPr>
           <a:r>
-            <a:rPr lang="es-AR" sz="1300" b="0" i="0" u="none" kern="1200" dirty="0" smtClean="0"/>
-            <a:t>Nuevo negocio, producción gráfica.</a:t>
+            <a:rPr lang="es-AR" sz="1900" kern="1200" dirty="0" smtClean="0"/>
+            <a:t>Promover valores de la empresa a empleados</a:t>
           </a:r>
-          <a:endParaRPr lang="es-AR" sz="1300" kern="1200" dirty="0"/>
+          <a:endParaRPr lang="es-AR" sz="1900" kern="1200" dirty="0"/>
         </a:p>
         <a:p>
-          <a:pPr marL="114300" lvl="1" indent="-114300" algn="l" defTabSz="577850" rtl="0">
+          <a:pPr marL="171450" lvl="1" indent="-171450" algn="l" defTabSz="844550" rtl="0">
             <a:lnSpc>
               <a:spcPct val="90000"/>
             </a:lnSpc>
@@ -2243,53 +2051,15 @@
             <a:buChar char="••"/>
           </a:pPr>
           <a:r>
-            <a:rPr lang="es-AR" sz="1300" kern="1200" dirty="0" smtClean="0"/>
-            <a:t>Promover el compromiso  y valores de la empresa a los empleados</a:t>
+            <a:rPr lang="es-AR" sz="1900" b="0" i="0" u="none" kern="1200" dirty="0" smtClean="0"/>
+            <a:t>Establecer su identidad institucional </a:t>
           </a:r>
-          <a:endParaRPr lang="es-AR" sz="1300" kern="1200" dirty="0"/>
-        </a:p>
-        <a:p>
-          <a:pPr marL="114300" lvl="1" indent="-114300" algn="l" defTabSz="577850" rtl="0">
-            <a:lnSpc>
-              <a:spcPct val="90000"/>
-            </a:lnSpc>
-            <a:spcBef>
-              <a:spcPct val="0"/>
-            </a:spcBef>
-            <a:spcAft>
-              <a:spcPct val="15000"/>
-            </a:spcAft>
-            <a:buChar char="••"/>
-          </a:pPr>
-          <a:r>
-            <a:rPr lang="es-AR" sz="1300" b="0" i="0" u="none" kern="1200" smtClean="0"/>
-            <a:t>Establecer su identidad institucional y darla a conocer a sus públicos.</a:t>
-          </a:r>
-          <a:endParaRPr lang="es-AR" sz="1300" kern="1200" dirty="0"/>
-        </a:p>
-        <a:p>
-          <a:pPr marL="114300" lvl="1" indent="-114300" algn="l" defTabSz="577850" rtl="0">
-            <a:lnSpc>
-              <a:spcPct val="90000"/>
-            </a:lnSpc>
-            <a:spcBef>
-              <a:spcPct val="0"/>
-            </a:spcBef>
-            <a:spcAft>
-              <a:spcPct val="15000"/>
-            </a:spcAft>
-            <a:buChar char="••"/>
-          </a:pPr>
-          <a:r>
-            <a:rPr lang="es-AR" sz="1300" b="0" i="0" u="none" kern="1200" dirty="0" smtClean="0"/>
-            <a:t>Vender nuevamente a Brasil y México.</a:t>
-          </a:r>
-          <a:endParaRPr lang="es-AR" sz="1300" kern="1200" dirty="0"/>
+          <a:endParaRPr lang="es-AR" sz="1900" kern="1200" dirty="0"/>
         </a:p>
       </dsp:txBody>
       <dsp:txXfrm rot="5400000">
-        <a:off x="4972416" y="-669321"/>
-        <a:ext cx="979959" cy="5141079"/>
+        <a:off x="4362469" y="-583753"/>
+        <a:ext cx="970701" cy="4934021"/>
       </dsp:txXfrm>
     </dsp:sp>
     <dsp:sp modelId="{183613A6-3582-4B54-AB0A-5BB8F694C388}">
@@ -2299,8 +2069,8 @@
       </dsp:nvSpPr>
       <dsp:spPr>
         <a:xfrm>
-          <a:off x="0" y="1288743"/>
-          <a:ext cx="2891856" cy="1224949"/>
+          <a:off x="394576" y="1276568"/>
+          <a:ext cx="1986233" cy="1213376"/>
         </a:xfrm>
         <a:prstGeom prst="roundRect">
           <a:avLst/>
@@ -2378,12 +2148,12 @@
         </a:fontRef>
       </dsp:style>
       <dsp:txBody>
-        <a:bodyPr spcFirstLastPara="0" vert="horz" wrap="square" lIns="114300" tIns="57150" rIns="114300" bIns="57150" numCol="1" spcCol="1270" anchor="ctr" anchorCtr="0">
+        <a:bodyPr spcFirstLastPara="0" vert="horz" wrap="square" lIns="76200" tIns="38100" rIns="76200" bIns="38100" numCol="1" spcCol="1270" anchor="ctr" anchorCtr="0">
           <a:noAutofit/>
         </a:bodyPr>
         <a:lstStyle/>
         <a:p>
-          <a:pPr lvl="0" algn="ctr" defTabSz="1333500" rtl="0">
+          <a:pPr lvl="0" algn="ctr" defTabSz="889000" rtl="0">
             <a:lnSpc>
               <a:spcPct val="90000"/>
             </a:lnSpc>
@@ -2395,15 +2165,15 @@
             </a:spcAft>
           </a:pPr>
           <a:r>
-            <a:rPr lang="es-AR" sz="3000" kern="1200" dirty="0" smtClean="0"/>
+            <a:rPr lang="es-AR" sz="2000" kern="1200" dirty="0" smtClean="0"/>
             <a:t>Oportunidades</a:t>
           </a:r>
-          <a:endParaRPr lang="es-AR" sz="3000" kern="1200" dirty="0"/>
+          <a:endParaRPr lang="es-AR" sz="2000" kern="1200" dirty="0"/>
         </a:p>
       </dsp:txBody>
       <dsp:txXfrm>
-        <a:off x="0" y="1288743"/>
-        <a:ext cx="2891856" cy="1224949"/>
+        <a:off x="394576" y="1276568"/>
+        <a:ext cx="1986233" cy="1213376"/>
       </dsp:txXfrm>
     </dsp:sp>
     <dsp:sp modelId="{6CCF747A-BDBA-435F-879F-3F7E1ADEC61C}">
@@ -2413,8 +2183,8 @@
       </dsp:nvSpPr>
       <dsp:spPr>
         <a:xfrm rot="5400000">
-          <a:off x="4972416" y="616874"/>
-          <a:ext cx="979959" cy="5141079"/>
+          <a:off x="4362469" y="690292"/>
+          <a:ext cx="970701" cy="4934021"/>
         </a:xfrm>
         <a:prstGeom prst="round2SameRect">
           <a:avLst/>
@@ -2470,12 +2240,12 @@
         <a:fontRef idx="minor"/>
       </dsp:style>
       <dsp:txBody>
-        <a:bodyPr spcFirstLastPara="0" vert="horz" wrap="square" lIns="49530" tIns="24765" rIns="49530" bIns="24765" numCol="1" spcCol="1270" anchor="ctr" anchorCtr="0">
+        <a:bodyPr spcFirstLastPara="0" vert="horz" wrap="square" lIns="72390" tIns="36195" rIns="72390" bIns="36195" numCol="1" spcCol="1270" anchor="ctr" anchorCtr="0">
           <a:noAutofit/>
         </a:bodyPr>
         <a:lstStyle/>
         <a:p>
-          <a:pPr marL="114300" lvl="1" indent="-114300" algn="l" defTabSz="577850" rtl="0">
+          <a:pPr marL="171450" lvl="1" indent="-171450" algn="l" defTabSz="844550" rtl="0">
             <a:lnSpc>
               <a:spcPct val="90000"/>
             </a:lnSpc>
@@ -2488,13 +2258,13 @@
             <a:buChar char="••"/>
           </a:pPr>
           <a:r>
-            <a:rPr lang="es-AR" sz="1300" kern="1200" dirty="0" smtClean="0"/>
+            <a:rPr lang="es-AR" sz="1900" kern="1200" dirty="0" smtClean="0"/>
             <a:t>No hay formalización de actividades</a:t>
           </a:r>
-          <a:endParaRPr lang="es-AR" sz="1300" kern="1200" dirty="0"/>
+          <a:endParaRPr lang="es-AR" sz="1900" kern="1200" dirty="0"/>
         </a:p>
         <a:p>
-          <a:pPr marL="114300" lvl="1" indent="-114300" algn="l" defTabSz="577850" rtl="0">
+          <a:pPr marL="171450" lvl="1" indent="-171450" algn="l" defTabSz="844550" rtl="0">
             <a:lnSpc>
               <a:spcPct val="90000"/>
             </a:lnSpc>
@@ -2507,53 +2277,15 @@
             <a:buChar char="••"/>
           </a:pPr>
           <a:r>
-            <a:rPr lang="es-AR" sz="1300" kern="1200" dirty="0" smtClean="0"/>
+            <a:rPr lang="es-AR" sz="1900" kern="1200" dirty="0" smtClean="0"/>
             <a:t>La dirección no comunica las proyecciones de la empresa</a:t>
           </a:r>
-          <a:endParaRPr lang="es-AR" sz="1300" kern="1200" dirty="0"/>
-        </a:p>
-        <a:p>
-          <a:pPr marL="114300" lvl="1" indent="-114300" algn="l" defTabSz="577850" rtl="0">
-            <a:lnSpc>
-              <a:spcPct val="90000"/>
-            </a:lnSpc>
-            <a:spcBef>
-              <a:spcPct val="0"/>
-            </a:spcBef>
-            <a:spcAft>
-              <a:spcPct val="15000"/>
-            </a:spcAft>
-            <a:buChar char="••"/>
-          </a:pPr>
-          <a:r>
-            <a:rPr lang="es-AR" sz="1300" kern="1200" dirty="0" smtClean="0"/>
-            <a:t>Vínculos informales con los clientes</a:t>
-          </a:r>
-          <a:endParaRPr lang="es-AR" sz="1300" kern="1200" dirty="0"/>
-        </a:p>
-        <a:p>
-          <a:pPr marL="114300" lvl="1" indent="-114300" algn="l" defTabSz="577850" rtl="0">
-            <a:lnSpc>
-              <a:spcPct val="90000"/>
-            </a:lnSpc>
-            <a:spcBef>
-              <a:spcPct val="0"/>
-            </a:spcBef>
-            <a:spcAft>
-              <a:spcPct val="15000"/>
-            </a:spcAft>
-            <a:buChar char="••"/>
-          </a:pPr>
-          <a:r>
-            <a:rPr lang="es-AR" sz="1300" kern="1200" dirty="0" smtClean="0"/>
-            <a:t>Limitaciones  físicas</a:t>
-          </a:r>
-          <a:endParaRPr lang="es-AR" sz="1300" kern="1200" dirty="0"/>
+          <a:endParaRPr lang="es-AR" sz="1900" kern="1200" dirty="0"/>
         </a:p>
       </dsp:txBody>
       <dsp:txXfrm rot="5400000">
-        <a:off x="4972416" y="616874"/>
-        <a:ext cx="979959" cy="5141079"/>
+        <a:off x="4362469" y="690292"/>
+        <a:ext cx="970701" cy="4934021"/>
       </dsp:txXfrm>
     </dsp:sp>
     <dsp:sp modelId="{1137A19C-59D5-4F79-A5E0-6C0BA5E45B0D}">
@@ -2563,8 +2295,8 @@
       </dsp:nvSpPr>
       <dsp:spPr>
         <a:xfrm>
-          <a:off x="0" y="2574939"/>
-          <a:ext cx="2891856" cy="1224949"/>
+          <a:off x="394576" y="2550614"/>
+          <a:ext cx="1986233" cy="1213376"/>
         </a:xfrm>
         <a:prstGeom prst="roundRect">
           <a:avLst/>
@@ -2642,12 +2374,12 @@
         </a:fontRef>
       </dsp:style>
       <dsp:txBody>
-        <a:bodyPr spcFirstLastPara="0" vert="horz" wrap="square" lIns="114300" tIns="57150" rIns="114300" bIns="57150" numCol="1" spcCol="1270" anchor="ctr" anchorCtr="0">
+        <a:bodyPr spcFirstLastPara="0" vert="horz" wrap="square" lIns="76200" tIns="38100" rIns="76200" bIns="38100" numCol="1" spcCol="1270" anchor="ctr" anchorCtr="0">
           <a:noAutofit/>
         </a:bodyPr>
         <a:lstStyle/>
         <a:p>
-          <a:pPr lvl="0" algn="ctr" defTabSz="1333500" rtl="0">
+          <a:pPr lvl="0" algn="ctr" defTabSz="889000" rtl="0">
             <a:lnSpc>
               <a:spcPct val="90000"/>
             </a:lnSpc>
@@ -2659,15 +2391,15 @@
             </a:spcAft>
           </a:pPr>
           <a:r>
-            <a:rPr lang="es-AR" sz="3000" kern="1200" dirty="0" smtClean="0"/>
+            <a:rPr lang="es-AR" sz="2000" kern="1200" dirty="0" smtClean="0"/>
             <a:t>Debilidades </a:t>
           </a:r>
-          <a:endParaRPr lang="es-AR" sz="3000" kern="1200" dirty="0"/>
+          <a:endParaRPr lang="es-AR" sz="2000" kern="1200" dirty="0"/>
         </a:p>
       </dsp:txBody>
       <dsp:txXfrm>
-        <a:off x="0" y="2574939"/>
-        <a:ext cx="2891856" cy="1224949"/>
+        <a:off x="394576" y="2550614"/>
+        <a:ext cx="1986233" cy="1213376"/>
       </dsp:txXfrm>
     </dsp:sp>
     <dsp:sp modelId="{BF41B2D6-AEE9-4E39-B637-343DC8CEC7DB}">
@@ -2677,8 +2409,8 @@
       </dsp:nvSpPr>
       <dsp:spPr>
         <a:xfrm rot="5400000">
-          <a:off x="4972416" y="1903071"/>
-          <a:ext cx="979959" cy="5141079"/>
+          <a:off x="4362469" y="1964338"/>
+          <a:ext cx="970701" cy="4934021"/>
         </a:xfrm>
         <a:prstGeom prst="round2SameRect">
           <a:avLst/>
@@ -2734,12 +2466,12 @@
         <a:fontRef idx="minor"/>
       </dsp:style>
       <dsp:txBody>
-        <a:bodyPr spcFirstLastPara="0" vert="horz" wrap="square" lIns="49530" tIns="24765" rIns="49530" bIns="24765" numCol="1" spcCol="1270" anchor="ctr" anchorCtr="0">
+        <a:bodyPr spcFirstLastPara="0" vert="horz" wrap="square" lIns="72390" tIns="36195" rIns="72390" bIns="36195" numCol="1" spcCol="1270" anchor="ctr" anchorCtr="0">
           <a:noAutofit/>
         </a:bodyPr>
         <a:lstStyle/>
         <a:p>
-          <a:pPr marL="114300" lvl="1" indent="-114300" algn="l" defTabSz="577850" rtl="0">
+          <a:pPr marL="171450" lvl="1" indent="-171450" algn="l" defTabSz="844550" rtl="0">
             <a:lnSpc>
               <a:spcPct val="90000"/>
             </a:lnSpc>
@@ -2752,13 +2484,17 @@
             <a:buChar char="••"/>
           </a:pPr>
           <a:r>
-            <a:rPr lang="es-AR" sz="1300" b="0" i="0" u="none" kern="1200" dirty="0" smtClean="0"/>
-            <a:t>Renuncias del personal por falta de compromiso y/o autonomía.</a:t>
+            <a:rPr lang="es-AR" sz="1900" b="0" i="0" u="none" kern="1200" dirty="0" smtClean="0"/>
+            <a:t>Renuncias del personal por falta de </a:t>
           </a:r>
-          <a:endParaRPr lang="es-AR" sz="1300" kern="1200" dirty="0"/>
+          <a:r>
+            <a:rPr lang="es-AR" sz="1900" b="0" i="0" u="none" kern="1200" dirty="0" smtClean="0"/>
+            <a:t>compromiso.</a:t>
+          </a:r>
+          <a:endParaRPr lang="es-AR" sz="1900" kern="1200" dirty="0"/>
         </a:p>
         <a:p>
-          <a:pPr marL="114300" lvl="1" indent="-114300" algn="l" defTabSz="577850" rtl="0">
+          <a:pPr marL="171450" lvl="1" indent="-171450" algn="l" defTabSz="844550" rtl="0">
             <a:lnSpc>
               <a:spcPct val="90000"/>
             </a:lnSpc>
@@ -2771,42 +2507,23 @@
             <a:buChar char="••"/>
           </a:pPr>
           <a:r>
-            <a:rPr lang="es-AR" sz="1300" b="0" i="0" u="none" kern="1200" dirty="0" smtClean="0"/>
+            <a:rPr lang="es-AR" sz="1900" b="0" i="0" u="none" kern="1200" dirty="0" smtClean="0"/>
             <a:t>Cambio de proveedor por parte de </a:t>
           </a:r>
           <a:r>
-            <a:rPr lang="es-AR" sz="1300" b="0" i="0" u="none" kern="1200" dirty="0" err="1" smtClean="0"/>
+            <a:rPr lang="es-AR" sz="1900" b="0" i="0" u="none" kern="1200" dirty="0" err="1" smtClean="0"/>
             <a:t>Nike</a:t>
           </a:r>
           <a:r>
-            <a:rPr lang="es-AR" sz="1300" b="0" i="0" u="none" kern="1200" dirty="0" smtClean="0"/>
+            <a:rPr lang="es-AR" sz="1900" b="0" i="0" u="none" kern="1200" dirty="0" smtClean="0"/>
             <a:t>.</a:t>
           </a:r>
-          <a:endParaRPr lang="es-AR" sz="1300" kern="1200" dirty="0"/>
-        </a:p>
-        <a:p>
-          <a:pPr marL="114300" lvl="1" indent="-114300" algn="l" defTabSz="577850" rtl="0">
-            <a:lnSpc>
-              <a:spcPct val="90000"/>
-            </a:lnSpc>
-            <a:spcBef>
-              <a:spcPct val="0"/>
-            </a:spcBef>
-            <a:spcAft>
-              <a:spcPct val="15000"/>
-            </a:spcAft>
-            <a:buChar char="••"/>
-          </a:pPr>
-          <a:r>
-            <a:rPr lang="es-AR" sz="1300" b="0" i="0" u="none" kern="1200" dirty="0" smtClean="0"/>
-            <a:t>Brasil como potencial competidor.</a:t>
-          </a:r>
-          <a:endParaRPr lang="es-AR" sz="1300" kern="1200" dirty="0"/>
+          <a:endParaRPr lang="es-AR" sz="1900" kern="1200" dirty="0"/>
         </a:p>
       </dsp:txBody>
       <dsp:txXfrm rot="5400000">
-        <a:off x="4972416" y="1903071"/>
-        <a:ext cx="979959" cy="5141079"/>
+        <a:off x="4362469" y="1964338"/>
+        <a:ext cx="970701" cy="4934021"/>
       </dsp:txXfrm>
     </dsp:sp>
     <dsp:sp modelId="{493AB5D1-2395-4E95-A0C0-AC50A5BB937D}">
@@ -2816,8 +2533,8 @@
       </dsp:nvSpPr>
       <dsp:spPr>
         <a:xfrm>
-          <a:off x="0" y="3861136"/>
-          <a:ext cx="2891856" cy="1224949"/>
+          <a:off x="394576" y="3824660"/>
+          <a:ext cx="1986233" cy="1213376"/>
         </a:xfrm>
         <a:prstGeom prst="roundRect">
           <a:avLst/>
@@ -2895,12 +2612,12 @@
         </a:fontRef>
       </dsp:style>
       <dsp:txBody>
-        <a:bodyPr spcFirstLastPara="0" vert="horz" wrap="square" lIns="114300" tIns="57150" rIns="114300" bIns="57150" numCol="1" spcCol="1270" anchor="ctr" anchorCtr="0">
+        <a:bodyPr spcFirstLastPara="0" vert="horz" wrap="square" lIns="76200" tIns="38100" rIns="76200" bIns="38100" numCol="1" spcCol="1270" anchor="ctr" anchorCtr="0">
           <a:noAutofit/>
         </a:bodyPr>
         <a:lstStyle/>
         <a:p>
-          <a:pPr lvl="0" algn="ctr" defTabSz="1333500" rtl="0">
+          <a:pPr lvl="0" algn="ctr" defTabSz="889000" rtl="0">
             <a:lnSpc>
               <a:spcPct val="90000"/>
             </a:lnSpc>
@@ -2912,15 +2629,15 @@
             </a:spcAft>
           </a:pPr>
           <a:r>
-            <a:rPr lang="es-AR" sz="3000" kern="1200" dirty="0" smtClean="0"/>
+            <a:rPr lang="es-AR" sz="2000" kern="1200" dirty="0" smtClean="0"/>
             <a:t>Amenazas</a:t>
           </a:r>
-          <a:endParaRPr lang="es-AR" sz="3000" kern="1200" dirty="0"/>
+          <a:endParaRPr lang="es-AR" sz="2000" kern="1200" dirty="0"/>
         </a:p>
       </dsp:txBody>
       <dsp:txXfrm>
-        <a:off x="0" y="3861136"/>
-        <a:ext cx="2891856" cy="1224949"/>
+        <a:off x="394576" y="3824660"/>
+        <a:ext cx="1986233" cy="1213376"/>
       </dsp:txXfrm>
     </dsp:sp>
   </dsp:spTree>
@@ -4277,6 +3994,353 @@
 </dgm:styleDef>
 </file>
 
+<file path=ppt/notesMasters/notesMaster1.xml><?xml version="1.0" encoding="utf-8"?>
+<p:notesMaster xmlns:a="http://schemas.openxmlformats.org/drawingml/2006/main" xmlns:r="http://schemas.openxmlformats.org/officeDocument/2006/relationships" xmlns:p="http://schemas.openxmlformats.org/presentationml/2006/main">
+  <p:cSld>
+    <p:bg>
+      <p:bgRef idx="1001">
+        <a:schemeClr val="bg1"/>
+      </p:bgRef>
+    </p:bg>
+    <p:spTree>
+      <p:nvGrpSpPr>
+        <p:cNvPr id="1" name=""/>
+        <p:cNvGrpSpPr/>
+        <p:nvPr/>
+      </p:nvGrpSpPr>
+      <p:grpSpPr>
+        <a:xfrm>
+          <a:off x="0" y="0"/>
+          <a:ext cx="0" cy="0"/>
+          <a:chOff x="0" y="0"/>
+          <a:chExt cx="0" cy="0"/>
+        </a:xfrm>
+      </p:grpSpPr>
+      <p:sp>
+        <p:nvSpPr>
+          <p:cNvPr id="2" name="1 Marcador de encabezado"/>
+          <p:cNvSpPr>
+            <a:spLocks noGrp="1"/>
+          </p:cNvSpPr>
+          <p:nvPr>
+            <p:ph type="hdr" sz="quarter"/>
+          </p:nvPr>
+        </p:nvSpPr>
+        <p:spPr>
+          <a:xfrm>
+            <a:off x="0" y="0"/>
+            <a:ext cx="2971800" cy="457200"/>
+          </a:xfrm>
+          <a:prstGeom prst="rect">
+            <a:avLst/>
+          </a:prstGeom>
+        </p:spPr>
+        <p:txBody>
+          <a:bodyPr vert="horz" lIns="91440" tIns="45720" rIns="91440" bIns="45720" rtlCol="0"/>
+          <a:lstStyle>
+            <a:lvl1pPr algn="l">
+              <a:defRPr sz="1200"/>
+            </a:lvl1pPr>
+          </a:lstStyle>
+          <a:p>
+            <a:endParaRPr lang="es-AR"/>
+          </a:p>
+        </p:txBody>
+      </p:sp>
+      <p:sp>
+        <p:nvSpPr>
+          <p:cNvPr id="3" name="2 Marcador de fecha"/>
+          <p:cNvSpPr>
+            <a:spLocks noGrp="1"/>
+          </p:cNvSpPr>
+          <p:nvPr>
+            <p:ph type="dt" idx="1"/>
+          </p:nvPr>
+        </p:nvSpPr>
+        <p:spPr>
+          <a:xfrm>
+            <a:off x="3884613" y="0"/>
+            <a:ext cx="2971800" cy="457200"/>
+          </a:xfrm>
+          <a:prstGeom prst="rect">
+            <a:avLst/>
+          </a:prstGeom>
+        </p:spPr>
+        <p:txBody>
+          <a:bodyPr vert="horz" lIns="91440" tIns="45720" rIns="91440" bIns="45720" rtlCol="0"/>
+          <a:lstStyle>
+            <a:lvl1pPr algn="r">
+              <a:defRPr sz="1200"/>
+            </a:lvl1pPr>
+          </a:lstStyle>
+          <a:p>
+            <a:fld id="{F7EC247D-ED8B-45CF-B553-37729D048AD6}" type="datetimeFigureOut">
+              <a:rPr lang="es-AR" smtClean="0"/>
+              <a:t>08/06/2011</a:t>
+            </a:fld>
+            <a:endParaRPr lang="es-AR"/>
+          </a:p>
+        </p:txBody>
+      </p:sp>
+      <p:sp>
+        <p:nvSpPr>
+          <p:cNvPr id="4" name="3 Marcador de imagen de diapositiva"/>
+          <p:cNvSpPr>
+            <a:spLocks noGrp="1" noRot="1" noChangeAspect="1"/>
+          </p:cNvSpPr>
+          <p:nvPr>
+            <p:ph type="sldImg" idx="2"/>
+          </p:nvPr>
+        </p:nvSpPr>
+        <p:spPr>
+          <a:xfrm>
+            <a:off x="1143000" y="685800"/>
+            <a:ext cx="4572000" cy="3429000"/>
+          </a:xfrm>
+          <a:prstGeom prst="rect">
+            <a:avLst/>
+          </a:prstGeom>
+          <a:noFill/>
+          <a:ln w="12700">
+            <a:solidFill>
+              <a:prstClr val="black"/>
+            </a:solidFill>
+          </a:ln>
+        </p:spPr>
+        <p:txBody>
+          <a:bodyPr vert="horz" lIns="91440" tIns="45720" rIns="91440" bIns="45720" rtlCol="0" anchor="ctr"/>
+          <a:lstStyle/>
+          <a:p>
+            <a:endParaRPr lang="es-AR"/>
+          </a:p>
+        </p:txBody>
+      </p:sp>
+      <p:sp>
+        <p:nvSpPr>
+          <p:cNvPr id="5" name="4 Marcador de notas"/>
+          <p:cNvSpPr>
+            <a:spLocks noGrp="1"/>
+          </p:cNvSpPr>
+          <p:nvPr>
+            <p:ph type="body" sz="quarter" idx="3"/>
+          </p:nvPr>
+        </p:nvSpPr>
+        <p:spPr>
+          <a:xfrm>
+            <a:off x="685800" y="4343400"/>
+            <a:ext cx="5486400" cy="4114800"/>
+          </a:xfrm>
+          <a:prstGeom prst="rect">
+            <a:avLst/>
+          </a:prstGeom>
+        </p:spPr>
+        <p:txBody>
+          <a:bodyPr vert="horz" lIns="91440" tIns="45720" rIns="91440" bIns="45720" rtlCol="0">
+            <a:normAutofit/>
+          </a:bodyPr>
+          <a:lstStyle/>
+          <a:p>
+            <a:pPr lvl="0"/>
+            <a:r>
+              <a:rPr lang="es-ES" smtClean="0"/>
+              <a:t>Haga clic para modificar el estilo de texto del patrón</a:t>
+            </a:r>
+          </a:p>
+          <a:p>
+            <a:pPr lvl="1"/>
+            <a:r>
+              <a:rPr lang="es-ES" smtClean="0"/>
+              <a:t>Segundo nivel</a:t>
+            </a:r>
+          </a:p>
+          <a:p>
+            <a:pPr lvl="2"/>
+            <a:r>
+              <a:rPr lang="es-ES" smtClean="0"/>
+              <a:t>Tercer nivel</a:t>
+            </a:r>
+          </a:p>
+          <a:p>
+            <a:pPr lvl="3"/>
+            <a:r>
+              <a:rPr lang="es-ES" smtClean="0"/>
+              <a:t>Cuarto nivel</a:t>
+            </a:r>
+          </a:p>
+          <a:p>
+            <a:pPr lvl="4"/>
+            <a:r>
+              <a:rPr lang="es-ES" smtClean="0"/>
+              <a:t>Quinto nivel</a:t>
+            </a:r>
+            <a:endParaRPr lang="es-AR"/>
+          </a:p>
+        </p:txBody>
+      </p:sp>
+      <p:sp>
+        <p:nvSpPr>
+          <p:cNvPr id="6" name="5 Marcador de pie de página"/>
+          <p:cNvSpPr>
+            <a:spLocks noGrp="1"/>
+          </p:cNvSpPr>
+          <p:nvPr>
+            <p:ph type="ftr" sz="quarter" idx="4"/>
+          </p:nvPr>
+        </p:nvSpPr>
+        <p:spPr>
+          <a:xfrm>
+            <a:off x="0" y="8685213"/>
+            <a:ext cx="2971800" cy="457200"/>
+          </a:xfrm>
+          <a:prstGeom prst="rect">
+            <a:avLst/>
+          </a:prstGeom>
+        </p:spPr>
+        <p:txBody>
+          <a:bodyPr vert="horz" lIns="91440" tIns="45720" rIns="91440" bIns="45720" rtlCol="0" anchor="b"/>
+          <a:lstStyle>
+            <a:lvl1pPr algn="l">
+              <a:defRPr sz="1200"/>
+            </a:lvl1pPr>
+          </a:lstStyle>
+          <a:p>
+            <a:endParaRPr lang="es-AR"/>
+          </a:p>
+        </p:txBody>
+      </p:sp>
+      <p:sp>
+        <p:nvSpPr>
+          <p:cNvPr id="7" name="6 Marcador de número de diapositiva"/>
+          <p:cNvSpPr>
+            <a:spLocks noGrp="1"/>
+          </p:cNvSpPr>
+          <p:nvPr>
+            <p:ph type="sldNum" sz="quarter" idx="5"/>
+          </p:nvPr>
+        </p:nvSpPr>
+        <p:spPr>
+          <a:xfrm>
+            <a:off x="3884613" y="8685213"/>
+            <a:ext cx="2971800" cy="457200"/>
+          </a:xfrm>
+          <a:prstGeom prst="rect">
+            <a:avLst/>
+          </a:prstGeom>
+        </p:spPr>
+        <p:txBody>
+          <a:bodyPr vert="horz" lIns="91440" tIns="45720" rIns="91440" bIns="45720" rtlCol="0" anchor="b"/>
+          <a:lstStyle>
+            <a:lvl1pPr algn="r">
+              <a:defRPr sz="1200"/>
+            </a:lvl1pPr>
+          </a:lstStyle>
+          <a:p>
+            <a:fld id="{3B7CDEE8-E56D-48C4-83CC-E6685DE3E4C3}" type="slidenum">
+              <a:rPr lang="es-AR" smtClean="0"/>
+              <a:t>‹Nº›</a:t>
+            </a:fld>
+            <a:endParaRPr lang="es-AR"/>
+          </a:p>
+        </p:txBody>
+      </p:sp>
+    </p:spTree>
+  </p:cSld>
+  <p:clrMap bg1="lt1" tx1="dk1" bg2="lt2" tx2="dk2" accent1="accent1" accent2="accent2" accent3="accent3" accent4="accent4" accent5="accent5" accent6="accent6" hlink="hlink" folHlink="folHlink"/>
+  <p:notesStyle>
+    <a:lvl1pPr marL="0" algn="l" defTabSz="914400" rtl="0" eaLnBrk="1" latinLnBrk="0" hangingPunct="1">
+      <a:defRPr sz="1200" kern="1200">
+        <a:solidFill>
+          <a:schemeClr val="tx1"/>
+        </a:solidFill>
+        <a:latin typeface="+mn-lt"/>
+        <a:ea typeface="+mn-ea"/>
+        <a:cs typeface="+mn-cs"/>
+      </a:defRPr>
+    </a:lvl1pPr>
+    <a:lvl2pPr marL="457200" algn="l" defTabSz="914400" rtl="0" eaLnBrk="1" latinLnBrk="0" hangingPunct="1">
+      <a:defRPr sz="1200" kern="1200">
+        <a:solidFill>
+          <a:schemeClr val="tx1"/>
+        </a:solidFill>
+        <a:latin typeface="+mn-lt"/>
+        <a:ea typeface="+mn-ea"/>
+        <a:cs typeface="+mn-cs"/>
+      </a:defRPr>
+    </a:lvl2pPr>
+    <a:lvl3pPr marL="914400" algn="l" defTabSz="914400" rtl="0" eaLnBrk="1" latinLnBrk="0" hangingPunct="1">
+      <a:defRPr sz="1200" kern="1200">
+        <a:solidFill>
+          <a:schemeClr val="tx1"/>
+        </a:solidFill>
+        <a:latin typeface="+mn-lt"/>
+        <a:ea typeface="+mn-ea"/>
+        <a:cs typeface="+mn-cs"/>
+      </a:defRPr>
+    </a:lvl3pPr>
+    <a:lvl4pPr marL="1371600" algn="l" defTabSz="914400" rtl="0" eaLnBrk="1" latinLnBrk="0" hangingPunct="1">
+      <a:defRPr sz="1200" kern="1200">
+        <a:solidFill>
+          <a:schemeClr val="tx1"/>
+        </a:solidFill>
+        <a:latin typeface="+mn-lt"/>
+        <a:ea typeface="+mn-ea"/>
+        <a:cs typeface="+mn-cs"/>
+      </a:defRPr>
+    </a:lvl4pPr>
+    <a:lvl5pPr marL="1828800" algn="l" defTabSz="914400" rtl="0" eaLnBrk="1" latinLnBrk="0" hangingPunct="1">
+      <a:defRPr sz="1200" kern="1200">
+        <a:solidFill>
+          <a:schemeClr val="tx1"/>
+        </a:solidFill>
+        <a:latin typeface="+mn-lt"/>
+        <a:ea typeface="+mn-ea"/>
+        <a:cs typeface="+mn-cs"/>
+      </a:defRPr>
+    </a:lvl5pPr>
+    <a:lvl6pPr marL="2286000" algn="l" defTabSz="914400" rtl="0" eaLnBrk="1" latinLnBrk="0" hangingPunct="1">
+      <a:defRPr sz="1200" kern="1200">
+        <a:solidFill>
+          <a:schemeClr val="tx1"/>
+        </a:solidFill>
+        <a:latin typeface="+mn-lt"/>
+        <a:ea typeface="+mn-ea"/>
+        <a:cs typeface="+mn-cs"/>
+      </a:defRPr>
+    </a:lvl6pPr>
+    <a:lvl7pPr marL="2743200" algn="l" defTabSz="914400" rtl="0" eaLnBrk="1" latinLnBrk="0" hangingPunct="1">
+      <a:defRPr sz="1200" kern="1200">
+        <a:solidFill>
+          <a:schemeClr val="tx1"/>
+        </a:solidFill>
+        <a:latin typeface="+mn-lt"/>
+        <a:ea typeface="+mn-ea"/>
+        <a:cs typeface="+mn-cs"/>
+      </a:defRPr>
+    </a:lvl7pPr>
+    <a:lvl8pPr marL="3200400" algn="l" defTabSz="914400" rtl="0" eaLnBrk="1" latinLnBrk="0" hangingPunct="1">
+      <a:defRPr sz="1200" kern="1200">
+        <a:solidFill>
+          <a:schemeClr val="tx1"/>
+        </a:solidFill>
+        <a:latin typeface="+mn-lt"/>
+        <a:ea typeface="+mn-ea"/>
+        <a:cs typeface="+mn-cs"/>
+      </a:defRPr>
+    </a:lvl8pPr>
+    <a:lvl9pPr marL="3657600" algn="l" defTabSz="914400" rtl="0" eaLnBrk="1" latinLnBrk="0" hangingPunct="1">
+      <a:defRPr sz="1200" kern="1200">
+        <a:solidFill>
+          <a:schemeClr val="tx1"/>
+        </a:solidFill>
+        <a:latin typeface="+mn-lt"/>
+        <a:ea typeface="+mn-ea"/>
+        <a:cs typeface="+mn-cs"/>
+      </a:defRPr>
+    </a:lvl9pPr>
+  </p:notesStyle>
+</p:notesMaster>
+</file>
+
 <file path=ppt/slideLayouts/slideLayout1.xml><?xml version="1.0" encoding="utf-8"?>
 <p:sldLayout xmlns:a="http://schemas.openxmlformats.org/drawingml/2006/main" xmlns:r="http://schemas.openxmlformats.org/officeDocument/2006/relationships" xmlns:p="http://schemas.openxmlformats.org/presentationml/2006/main" type="title" preserve="1">
   <p:cSld name="Diapositiva de título">
@@ -4412,7 +4476,7 @@
             <a:fld id="{7C44809D-EF54-4966-A24E-C6C0F0B167CB}" type="datetimeFigureOut">
               <a:rPr lang="es-AR" smtClean="0"/>
               <a:pPr/>
-              <a:t>23/05/2011</a:t>
+              <a:t>08/06/2011</a:t>
             </a:fld>
             <a:endParaRPr lang="es-AR"/>
           </a:p>
@@ -4730,7 +4794,7 @@
             <a:fld id="{7C44809D-EF54-4966-A24E-C6C0F0B167CB}" type="datetimeFigureOut">
               <a:rPr lang="es-AR" smtClean="0"/>
               <a:pPr/>
-              <a:t>23/05/2011</a:t>
+              <a:t>08/06/2011</a:t>
             </a:fld>
             <a:endParaRPr lang="es-AR"/>
           </a:p>
@@ -4920,7 +4984,7 @@
             <a:fld id="{7C44809D-EF54-4966-A24E-C6C0F0B167CB}" type="datetimeFigureOut">
               <a:rPr lang="es-AR" smtClean="0"/>
               <a:pPr/>
-              <a:t>23/05/2011</a:t>
+              <a:t>08/06/2011</a:t>
             </a:fld>
             <a:endParaRPr lang="es-AR"/>
           </a:p>
@@ -5100,7 +5164,7 @@
             <a:fld id="{7C44809D-EF54-4966-A24E-C6C0F0B167CB}" type="datetimeFigureOut">
               <a:rPr lang="es-AR" smtClean="0"/>
               <a:pPr/>
-              <a:t>23/05/2011</a:t>
+              <a:t>08/06/2011</a:t>
             </a:fld>
             <a:endParaRPr lang="es-AR"/>
           </a:p>
@@ -5373,7 +5437,7 @@
             <a:fld id="{7C44809D-EF54-4966-A24E-C6C0F0B167CB}" type="datetimeFigureOut">
               <a:rPr lang="es-AR" smtClean="0"/>
               <a:pPr/>
-              <a:t>23/05/2011</a:t>
+              <a:t>08/06/2011</a:t>
             </a:fld>
             <a:endParaRPr lang="es-AR"/>
           </a:p>
@@ -5846,7 +5910,7 @@
             <a:fld id="{7C44809D-EF54-4966-A24E-C6C0F0B167CB}" type="datetimeFigureOut">
               <a:rPr lang="es-AR" smtClean="0"/>
               <a:pPr/>
-              <a:t>23/05/2011</a:t>
+              <a:t>08/06/2011</a:t>
             </a:fld>
             <a:endParaRPr lang="es-AR"/>
           </a:p>
@@ -6340,7 +6404,7 @@
             <a:fld id="{7C44809D-EF54-4966-A24E-C6C0F0B167CB}" type="datetimeFigureOut">
               <a:rPr lang="es-AR" smtClean="0"/>
               <a:pPr/>
-              <a:t>23/05/2011</a:t>
+              <a:t>08/06/2011</a:t>
             </a:fld>
             <a:endParaRPr lang="es-AR"/>
           </a:p>
@@ -6471,7 +6535,7 @@
             <a:fld id="{7C44809D-EF54-4966-A24E-C6C0F0B167CB}" type="datetimeFigureOut">
               <a:rPr lang="es-AR" smtClean="0"/>
               <a:pPr/>
-              <a:t>23/05/2011</a:t>
+              <a:t>08/06/2011</a:t>
             </a:fld>
             <a:endParaRPr lang="es-AR"/>
           </a:p>
@@ -6620,7 +6684,7 @@
             <a:fld id="{7C44809D-EF54-4966-A24E-C6C0F0B167CB}" type="datetimeFigureOut">
               <a:rPr lang="es-AR" smtClean="0"/>
               <a:pPr/>
-              <a:t>23/05/2011</a:t>
+              <a:t>08/06/2011</a:t>
             </a:fld>
             <a:endParaRPr lang="es-AR"/>
           </a:p>
@@ -6947,7 +7011,7 @@
             <a:fld id="{7C44809D-EF54-4966-A24E-C6C0F0B167CB}" type="datetimeFigureOut">
               <a:rPr lang="es-AR" smtClean="0"/>
               <a:pPr/>
-              <a:t>23/05/2011</a:t>
+              <a:t>08/06/2011</a:t>
             </a:fld>
             <a:endParaRPr lang="es-AR"/>
           </a:p>
@@ -7086,7 +7150,7 @@
             <a:fld id="{7C44809D-EF54-4966-A24E-C6C0F0B167CB}" type="datetimeFigureOut">
               <a:rPr lang="es-AR" smtClean="0"/>
               <a:pPr/>
-              <a:t>23/05/2011</a:t>
+              <a:t>08/06/2011</a:t>
             </a:fld>
             <a:endParaRPr lang="es-AR"/>
           </a:p>
@@ -7872,7 +7936,7 @@
             <a:fld id="{7C44809D-EF54-4966-A24E-C6C0F0B167CB}" type="datetimeFigureOut">
               <a:rPr lang="es-AR" smtClean="0"/>
               <a:pPr/>
-              <a:t>23/05/2011</a:t>
+              <a:t>08/06/2011</a:t>
             </a:fld>
             <a:endParaRPr lang="es-AR"/>
           </a:p>
@@ -8495,6 +8559,502 @@
 </p:sld>
 </file>
 
+<file path=ppt/slides/slide10.xml><?xml version="1.0" encoding="utf-8"?>
+<p:sld xmlns:a="http://schemas.openxmlformats.org/drawingml/2006/main" xmlns:r="http://schemas.openxmlformats.org/officeDocument/2006/relationships" xmlns:p="http://schemas.openxmlformats.org/presentationml/2006/main">
+  <p:cSld>
+    <p:spTree>
+      <p:nvGrpSpPr>
+        <p:cNvPr id="1" name=""/>
+        <p:cNvGrpSpPr/>
+        <p:nvPr/>
+      </p:nvGrpSpPr>
+      <p:grpSpPr>
+        <a:xfrm>
+          <a:off x="0" y="0"/>
+          <a:ext cx="0" cy="0"/>
+          <a:chOff x="0" y="0"/>
+          <a:chExt cx="0" cy="0"/>
+        </a:xfrm>
+      </p:grpSpPr>
+      <p:sp>
+        <p:nvSpPr>
+          <p:cNvPr id="2" name="1 Título"/>
+          <p:cNvSpPr>
+            <a:spLocks noGrp="1"/>
+          </p:cNvSpPr>
+          <p:nvPr>
+            <p:ph type="title"/>
+          </p:nvPr>
+        </p:nvSpPr>
+        <p:spPr>
+          <a:xfrm>
+            <a:off x="1331640" y="2708920"/>
+            <a:ext cx="7812360" cy="1296144"/>
+          </a:xfrm>
+        </p:spPr>
+        <p:txBody>
+          <a:bodyPr>
+            <a:normAutofit/>
+          </a:bodyPr>
+          <a:lstStyle/>
+          <a:p>
+            <a:pPr algn="ctr"/>
+            <a:r>
+              <a:rPr lang="es-AR" sz="5400" dirty="0" smtClean="0"/>
+              <a:t>Algunos de sus Productos</a:t>
+            </a:r>
+            <a:endParaRPr lang="es-AR" sz="5400" dirty="0"/>
+          </a:p>
+        </p:txBody>
+      </p:sp>
+    </p:spTree>
+  </p:cSld>
+  <p:clrMapOvr>
+    <a:masterClrMapping/>
+  </p:clrMapOvr>
+  <p:transition>
+    <p:fade/>
+  </p:transition>
+</p:sld>
+</file>
+
+<file path=ppt/slides/slide11.xml><?xml version="1.0" encoding="utf-8"?>
+<p:sld xmlns:a="http://schemas.openxmlformats.org/drawingml/2006/main" xmlns:r="http://schemas.openxmlformats.org/officeDocument/2006/relationships" xmlns:p="http://schemas.openxmlformats.org/presentationml/2006/main">
+  <p:cSld>
+    <p:spTree>
+      <p:nvGrpSpPr>
+        <p:cNvPr id="1" name=""/>
+        <p:cNvGrpSpPr/>
+        <p:nvPr/>
+      </p:nvGrpSpPr>
+      <p:grpSpPr>
+        <a:xfrm>
+          <a:off x="0" y="0"/>
+          <a:ext cx="0" cy="0"/>
+          <a:chOff x="0" y="0"/>
+          <a:chExt cx="0" cy="0"/>
+        </a:xfrm>
+      </p:grpSpPr>
+      <p:sp>
+        <p:nvSpPr>
+          <p:cNvPr id="2" name="1 Título"/>
+          <p:cNvSpPr>
+            <a:spLocks noGrp="1"/>
+          </p:cNvSpPr>
+          <p:nvPr>
+            <p:ph type="title"/>
+          </p:nvPr>
+        </p:nvSpPr>
+        <p:spPr/>
+        <p:txBody>
+          <a:bodyPr>
+            <a:normAutofit/>
+          </a:bodyPr>
+          <a:lstStyle/>
+          <a:p>
+            <a:pPr algn="ctr"/>
+            <a:r>
+              <a:rPr lang="es-AR" dirty="0" smtClean="0"/>
+              <a:t>Percheros de Metal</a:t>
+            </a:r>
+            <a:endParaRPr lang="es-AR" dirty="0"/>
+          </a:p>
+        </p:txBody>
+      </p:sp>
+      <p:pic>
+        <p:nvPicPr>
+          <p:cNvPr id="1026" name="Picture 2"/>
+          <p:cNvPicPr>
+            <a:picLocks noGrp="1" noChangeAspect="1" noChangeArrowheads="1"/>
+          </p:cNvPicPr>
+          <p:nvPr>
+            <p:ph idx="1"/>
+          </p:nvPr>
+        </p:nvPicPr>
+        <p:blipFill>
+          <a:blip r:embed="rId2" cstate="print"/>
+          <a:srcRect/>
+          <a:stretch>
+            <a:fillRect/>
+          </a:stretch>
+        </p:blipFill>
+        <p:spPr bwMode="auto">
+          <a:xfrm>
+            <a:off x="1547663" y="1928813"/>
+            <a:ext cx="3737967" cy="3864250"/>
+          </a:xfrm>
+          <a:prstGeom prst="rect">
+            <a:avLst/>
+          </a:prstGeom>
+          <a:noFill/>
+          <a:ln w="9525">
+            <a:noFill/>
+            <a:miter lim="800000"/>
+            <a:headEnd/>
+            <a:tailEnd/>
+          </a:ln>
+        </p:spPr>
+      </p:pic>
+      <p:pic>
+        <p:nvPicPr>
+          <p:cNvPr id="1027" name="Picture 3"/>
+          <p:cNvPicPr>
+            <a:picLocks noChangeAspect="1" noChangeArrowheads="1"/>
+          </p:cNvPicPr>
+          <p:nvPr/>
+        </p:nvPicPr>
+        <p:blipFill>
+          <a:blip r:embed="rId3" cstate="print"/>
+          <a:srcRect/>
+          <a:stretch>
+            <a:fillRect/>
+          </a:stretch>
+        </p:blipFill>
+        <p:spPr bwMode="auto">
+          <a:xfrm>
+            <a:off x="5364088" y="1916833"/>
+            <a:ext cx="3384376" cy="3888432"/>
+          </a:xfrm>
+          <a:prstGeom prst="rect">
+            <a:avLst/>
+          </a:prstGeom>
+          <a:noFill/>
+          <a:ln w="9525">
+            <a:noFill/>
+            <a:miter lim="800000"/>
+            <a:headEnd/>
+            <a:tailEnd/>
+          </a:ln>
+        </p:spPr>
+      </p:pic>
+    </p:spTree>
+  </p:cSld>
+  <p:clrMapOvr>
+    <a:masterClrMapping/>
+  </p:clrMapOvr>
+  <p:transition>
+    <p:fade/>
+  </p:transition>
+</p:sld>
+</file>
+
+<file path=ppt/slides/slide12.xml><?xml version="1.0" encoding="utf-8"?>
+<p:sld xmlns:a="http://schemas.openxmlformats.org/drawingml/2006/main" xmlns:r="http://schemas.openxmlformats.org/officeDocument/2006/relationships" xmlns:p="http://schemas.openxmlformats.org/presentationml/2006/main">
+  <p:cSld>
+    <p:spTree>
+      <p:nvGrpSpPr>
+        <p:cNvPr id="1" name=""/>
+        <p:cNvGrpSpPr/>
+        <p:nvPr/>
+      </p:nvGrpSpPr>
+      <p:grpSpPr>
+        <a:xfrm>
+          <a:off x="0" y="0"/>
+          <a:ext cx="0" cy="0"/>
+          <a:chOff x="0" y="0"/>
+          <a:chExt cx="0" cy="0"/>
+        </a:xfrm>
+      </p:grpSpPr>
+      <p:sp>
+        <p:nvSpPr>
+          <p:cNvPr id="2" name="1 Título"/>
+          <p:cNvSpPr>
+            <a:spLocks noGrp="1"/>
+          </p:cNvSpPr>
+          <p:nvPr>
+            <p:ph type="title"/>
+          </p:nvPr>
+        </p:nvSpPr>
+        <p:spPr/>
+        <p:txBody>
+          <a:bodyPr/>
+          <a:lstStyle/>
+          <a:p>
+            <a:pPr algn="ctr"/>
+            <a:r>
+              <a:rPr lang="es-AR" dirty="0" smtClean="0"/>
+              <a:t>Estanterías</a:t>
+            </a:r>
+            <a:endParaRPr lang="es-AR" dirty="0"/>
+          </a:p>
+        </p:txBody>
+      </p:sp>
+      <p:pic>
+        <p:nvPicPr>
+          <p:cNvPr id="2050" name="Picture 2"/>
+          <p:cNvPicPr>
+            <a:picLocks noGrp="1" noChangeAspect="1" noChangeArrowheads="1"/>
+          </p:cNvPicPr>
+          <p:nvPr>
+            <p:ph idx="1"/>
+          </p:nvPr>
+        </p:nvPicPr>
+        <p:blipFill>
+          <a:blip r:embed="rId2" cstate="print"/>
+          <a:srcRect/>
+          <a:stretch>
+            <a:fillRect/>
+          </a:stretch>
+        </p:blipFill>
+        <p:spPr bwMode="auto">
+          <a:xfrm>
+            <a:off x="1979712" y="1412776"/>
+            <a:ext cx="6696744" cy="5126544"/>
+          </a:xfrm>
+          <a:prstGeom prst="rect">
+            <a:avLst/>
+          </a:prstGeom>
+          <a:noFill/>
+          <a:ln w="9525">
+            <a:noFill/>
+            <a:miter lim="800000"/>
+            <a:headEnd/>
+            <a:tailEnd/>
+          </a:ln>
+        </p:spPr>
+      </p:pic>
+    </p:spTree>
+  </p:cSld>
+  <p:clrMapOvr>
+    <a:masterClrMapping/>
+  </p:clrMapOvr>
+  <p:transition>
+    <p:fade/>
+  </p:transition>
+</p:sld>
+</file>
+
+<file path=ppt/slides/slide13.xml><?xml version="1.0" encoding="utf-8"?>
+<p:sld xmlns:a="http://schemas.openxmlformats.org/drawingml/2006/main" xmlns:r="http://schemas.openxmlformats.org/officeDocument/2006/relationships" xmlns:p="http://schemas.openxmlformats.org/presentationml/2006/main">
+  <p:cSld>
+    <p:spTree>
+      <p:nvGrpSpPr>
+        <p:cNvPr id="1" name=""/>
+        <p:cNvGrpSpPr/>
+        <p:nvPr/>
+      </p:nvGrpSpPr>
+      <p:grpSpPr>
+        <a:xfrm>
+          <a:off x="0" y="0"/>
+          <a:ext cx="0" cy="0"/>
+          <a:chOff x="0" y="0"/>
+          <a:chExt cx="0" cy="0"/>
+        </a:xfrm>
+      </p:grpSpPr>
+      <p:sp>
+        <p:nvSpPr>
+          <p:cNvPr id="2" name="1 Título"/>
+          <p:cNvSpPr>
+            <a:spLocks noGrp="1"/>
+          </p:cNvSpPr>
+          <p:nvPr>
+            <p:ph type="title"/>
+          </p:nvPr>
+        </p:nvSpPr>
+        <p:spPr/>
+        <p:txBody>
+          <a:bodyPr/>
+          <a:lstStyle/>
+          <a:p>
+            <a:pPr algn="ctr"/>
+            <a:r>
+              <a:rPr lang="es-AR" dirty="0" smtClean="0"/>
+              <a:t>Mobiliario Para Local Pequeño</a:t>
+            </a:r>
+            <a:endParaRPr lang="es-AR" dirty="0"/>
+          </a:p>
+        </p:txBody>
+      </p:sp>
+      <p:pic>
+        <p:nvPicPr>
+          <p:cNvPr id="3074" name="Picture 2"/>
+          <p:cNvPicPr>
+            <a:picLocks noGrp="1" noChangeAspect="1" noChangeArrowheads="1"/>
+          </p:cNvPicPr>
+          <p:nvPr>
+            <p:ph idx="1"/>
+          </p:nvPr>
+        </p:nvPicPr>
+        <p:blipFill>
+          <a:blip r:embed="rId2" cstate="print"/>
+          <a:srcRect/>
+          <a:stretch>
+            <a:fillRect/>
+          </a:stretch>
+        </p:blipFill>
+        <p:spPr bwMode="auto">
+          <a:xfrm>
+            <a:off x="1691681" y="1196752"/>
+            <a:ext cx="6984776" cy="5443670"/>
+          </a:xfrm>
+          <a:prstGeom prst="rect">
+            <a:avLst/>
+          </a:prstGeom>
+          <a:noFill/>
+          <a:ln w="9525">
+            <a:noFill/>
+            <a:miter lim="800000"/>
+            <a:headEnd/>
+            <a:tailEnd/>
+          </a:ln>
+        </p:spPr>
+      </p:pic>
+    </p:spTree>
+  </p:cSld>
+  <p:clrMapOvr>
+    <a:masterClrMapping/>
+  </p:clrMapOvr>
+  <p:transition>
+    <p:fade/>
+  </p:transition>
+</p:sld>
+</file>
+
+<file path=ppt/slides/slide14.xml><?xml version="1.0" encoding="utf-8"?>
+<p:sld xmlns:a="http://schemas.openxmlformats.org/drawingml/2006/main" xmlns:r="http://schemas.openxmlformats.org/officeDocument/2006/relationships" xmlns:p="http://schemas.openxmlformats.org/presentationml/2006/main">
+  <p:cSld>
+    <p:spTree>
+      <p:nvGrpSpPr>
+        <p:cNvPr id="1" name=""/>
+        <p:cNvGrpSpPr/>
+        <p:nvPr/>
+      </p:nvGrpSpPr>
+      <p:grpSpPr>
+        <a:xfrm>
+          <a:off x="0" y="0"/>
+          <a:ext cx="0" cy="0"/>
+          <a:chOff x="0" y="0"/>
+          <a:chExt cx="0" cy="0"/>
+        </a:xfrm>
+      </p:grpSpPr>
+      <p:sp>
+        <p:nvSpPr>
+          <p:cNvPr id="2" name="1 Título"/>
+          <p:cNvSpPr>
+            <a:spLocks noGrp="1"/>
+          </p:cNvSpPr>
+          <p:nvPr>
+            <p:ph type="title"/>
+          </p:nvPr>
+        </p:nvSpPr>
+        <p:spPr/>
+        <p:txBody>
+          <a:bodyPr/>
+          <a:lstStyle/>
+          <a:p>
+            <a:pPr algn="ctr"/>
+            <a:r>
+              <a:rPr lang="es-AR" dirty="0" smtClean="0"/>
+              <a:t>Mobiliario Para Local Grande</a:t>
+            </a:r>
+            <a:endParaRPr lang="es-AR" dirty="0"/>
+          </a:p>
+        </p:txBody>
+      </p:sp>
+      <p:pic>
+        <p:nvPicPr>
+          <p:cNvPr id="4098" name="Picture 2"/>
+          <p:cNvPicPr>
+            <a:picLocks noGrp="1" noChangeAspect="1" noChangeArrowheads="1"/>
+          </p:cNvPicPr>
+          <p:nvPr>
+            <p:ph idx="1"/>
+          </p:nvPr>
+        </p:nvPicPr>
+        <p:blipFill>
+          <a:blip r:embed="rId2" cstate="print"/>
+          <a:srcRect/>
+          <a:stretch>
+            <a:fillRect/>
+          </a:stretch>
+        </p:blipFill>
+        <p:spPr bwMode="auto">
+          <a:xfrm>
+            <a:off x="1907704" y="1412776"/>
+            <a:ext cx="6726925" cy="5223374"/>
+          </a:xfrm>
+          <a:prstGeom prst="rect">
+            <a:avLst/>
+          </a:prstGeom>
+          <a:noFill/>
+          <a:ln w="9525">
+            <a:noFill/>
+            <a:miter lim="800000"/>
+            <a:headEnd/>
+            <a:tailEnd/>
+          </a:ln>
+        </p:spPr>
+      </p:pic>
+    </p:spTree>
+  </p:cSld>
+  <p:clrMapOvr>
+    <a:masterClrMapping/>
+  </p:clrMapOvr>
+  <p:transition>
+    <p:fade/>
+  </p:transition>
+</p:sld>
+</file>
+
+<file path=ppt/slides/slide15.xml><?xml version="1.0" encoding="utf-8"?>
+<p:sld xmlns:a="http://schemas.openxmlformats.org/drawingml/2006/main" xmlns:r="http://schemas.openxmlformats.org/officeDocument/2006/relationships" xmlns:p="http://schemas.openxmlformats.org/presentationml/2006/main">
+  <p:cSld>
+    <p:spTree>
+      <p:nvGrpSpPr>
+        <p:cNvPr id="1" name=""/>
+        <p:cNvGrpSpPr/>
+        <p:nvPr/>
+      </p:nvGrpSpPr>
+      <p:grpSpPr>
+        <a:xfrm>
+          <a:off x="0" y="0"/>
+          <a:ext cx="0" cy="0"/>
+          <a:chOff x="0" y="0"/>
+          <a:chExt cx="0" cy="0"/>
+        </a:xfrm>
+      </p:grpSpPr>
+      <p:sp>
+        <p:nvSpPr>
+          <p:cNvPr id="2" name="1 Título"/>
+          <p:cNvSpPr>
+            <a:spLocks noGrp="1"/>
+          </p:cNvSpPr>
+          <p:nvPr>
+            <p:ph type="title"/>
+          </p:nvPr>
+        </p:nvSpPr>
+        <p:spPr>
+          <a:xfrm>
+            <a:off x="1259632" y="2708920"/>
+            <a:ext cx="7498080" cy="1143000"/>
+          </a:xfrm>
+        </p:spPr>
+        <p:txBody>
+          <a:bodyPr>
+            <a:normAutofit/>
+          </a:bodyPr>
+          <a:lstStyle/>
+          <a:p>
+            <a:pPr algn="ctr"/>
+            <a:r>
+              <a:rPr lang="es-AR" sz="6000" dirty="0" smtClean="0"/>
+              <a:t>Preguntas</a:t>
+            </a:r>
+            <a:endParaRPr lang="es-AR" sz="6000" dirty="0"/>
+          </a:p>
+        </p:txBody>
+      </p:sp>
+    </p:spTree>
+  </p:cSld>
+  <p:clrMapOvr>
+    <a:masterClrMapping/>
+  </p:clrMapOvr>
+  <p:transition>
+    <p:fade/>
+  </p:transition>
+</p:sld>
+</file>
+
 <file path=ppt/slides/slide2.xml><?xml version="1.0" encoding="utf-8"?>
 <p:sld xmlns:a="http://schemas.openxmlformats.org/drawingml/2006/main" xmlns:r="http://schemas.openxmlformats.org/officeDocument/2006/relationships" xmlns:p="http://schemas.openxmlformats.org/presentationml/2006/main">
   <p:cSld>
@@ -8828,11 +9388,7 @@
           <a:p>
             <a:r>
               <a:rPr lang="es-AR" dirty="0" smtClean="0"/>
-              <a:t>Contrato </a:t>
-            </a:r>
-            <a:r>
-              <a:rPr lang="es-AR" dirty="0" smtClean="0"/>
-              <a:t>de exclusividad con </a:t>
+              <a:t>Contrato de exclusividad con </a:t>
             </a:r>
             <a:r>
               <a:rPr lang="es-AR" dirty="0" err="1" smtClean="0"/>
@@ -8842,7 +9398,6 @@
               <a:rPr lang="es-AR" dirty="0" smtClean="0"/>
               <a:t>.</a:t>
             </a:r>
-            <a:endParaRPr lang="es-AR" dirty="0" smtClean="0"/>
           </a:p>
           <a:p>
             <a:endParaRPr lang="es-AR" dirty="0" smtClean="0"/>
@@ -8852,7 +9407,6 @@
               <a:rPr lang="es-AR" dirty="0" smtClean="0"/>
               <a:t>45 Personas.</a:t>
             </a:r>
-            <a:endParaRPr lang="es-AR" dirty="0" smtClean="0"/>
           </a:p>
           <a:p>
             <a:endParaRPr lang="es-AR" dirty="0" smtClean="0"/>
@@ -8955,12 +9509,16 @@
           </a:p>
           <a:p>
             <a:r>
-              <a:rPr lang="es-AR" dirty="0" err="1" smtClean="0"/>
-              <a:t>Unica</a:t>
-            </a:r>
-            <a:r>
               <a:rPr lang="es-AR" dirty="0" smtClean="0"/>
-              <a:t> empresa que provee todo el mobiliario de </a:t>
+              <a:t>Ú</a:t>
+            </a:r>
+            <a:r>
+              <a:rPr lang="es-AR" dirty="0" smtClean="0"/>
+              <a:t>nica </a:t>
+            </a:r>
+            <a:r>
+              <a:rPr lang="es-AR" dirty="0" smtClean="0"/>
+              <a:t>empresa que provee todo el mobiliario de </a:t>
             </a:r>
             <a:r>
               <a:rPr lang="es-AR" dirty="0" err="1" smtClean="0"/>
@@ -9271,7 +9829,7 @@
         </p:nvGraphicFramePr>
         <p:xfrm>
           <a:off x="1111064" y="1196752"/>
-          <a:ext cx="8032936" cy="5088632"/>
+          <a:ext cx="7709408" cy="5040560"/>
         </p:xfrm>
         <a:graphic>
           <a:graphicData uri="http://schemas.openxmlformats.org/drawingml/2006/diagram">
@@ -9487,14 +10045,52 @@
         </p:nvSpPr>
         <p:spPr/>
         <p:txBody>
-          <a:bodyPr/>
+          <a:bodyPr>
+            <a:normAutofit fontScale="92500" lnSpcReduction="10000"/>
+          </a:bodyPr>
           <a:lstStyle/>
           <a:p>
-            <a:r>
-              <a:rPr lang="es-AR" dirty="0" smtClean="0"/>
-              <a:t>Lo que nos diga el profesor</a:t>
-            </a:r>
-            <a:endParaRPr lang="es-AR" dirty="0"/>
+            <a:pPr marL="0" lvl="0" indent="0">
+              <a:spcBef>
+                <a:spcPts val="601"/>
+              </a:spcBef>
+              <a:buClr>
+                <a:srgbClr val="C5B07E"/>
+              </a:buClr>
+            </a:pPr>
+            <a:r>
+              <a:rPr lang="es-AR" dirty="0" smtClean="0">
+                <a:latin typeface="Gill Sans MT" pitchFamily="18"/>
+              </a:rPr>
+              <a:t>Imagen y Comunicación debido a la calidad demostrada hasta la fecha recibe una propuesta de la casa matriz de </a:t>
+            </a:r>
+            <a:r>
+              <a:rPr lang="es-AR" dirty="0" err="1" smtClean="0">
+                <a:latin typeface="Gill Sans MT" pitchFamily="18"/>
+              </a:rPr>
+              <a:t>Nike</a:t>
+            </a:r>
+            <a:r>
+              <a:rPr lang="es-AR" dirty="0" smtClean="0">
+                <a:latin typeface="Gill Sans MT" pitchFamily="18"/>
+              </a:rPr>
+              <a:t> a los efectos de ocuparse de todo lo relacionado con Imagen y Comunicación en Argentina en la instalación de 200 locales de 2500 m</a:t>
+            </a:r>
+            <a:r>
+              <a:rPr lang="es-AR" baseline="30000" dirty="0" smtClean="0">
+                <a:latin typeface="Gill Sans MT" pitchFamily="18"/>
+              </a:rPr>
+              <a:t>2</a:t>
+            </a:r>
+            <a:r>
+              <a:rPr lang="es-AR" dirty="0" smtClean="0">
+                <a:latin typeface="Gill Sans MT" pitchFamily="18"/>
+              </a:rPr>
+              <a:t> cada uno en diferentes provincias del país. ¿Cómo adecuaría la estructura de la empresa para atender esta solicitud a lo largo de 5 años? Siendo que los diseños de los productos deben ser novedosos.</a:t>
+            </a:r>
+            <a:endParaRPr lang="es-AR" dirty="0">
+              <a:latin typeface="Gill Sans MT" pitchFamily="18"/>
+            </a:endParaRPr>
           </a:p>
         </p:txBody>
       </p:sp>
@@ -9513,6 +10109,77 @@
       </p:par>
     </p:tnLst>
   </p:timing>
+</p:sld>
+</file>
+
+<file path=ppt/slides/slide9.xml><?xml version="1.0" encoding="utf-8"?>
+<p:sld xmlns:a="http://schemas.openxmlformats.org/drawingml/2006/main" xmlns:r="http://schemas.openxmlformats.org/officeDocument/2006/relationships" xmlns:p="http://schemas.openxmlformats.org/presentationml/2006/main">
+  <p:cSld>
+    <p:spTree>
+      <p:nvGrpSpPr>
+        <p:cNvPr id="1" name=""/>
+        <p:cNvGrpSpPr/>
+        <p:nvPr/>
+      </p:nvGrpSpPr>
+      <p:grpSpPr>
+        <a:xfrm>
+          <a:off x="0" y="0"/>
+          <a:ext cx="0" cy="0"/>
+          <a:chOff x="0" y="0"/>
+          <a:chExt cx="0" cy="0"/>
+        </a:xfrm>
+      </p:grpSpPr>
+      <p:sp>
+        <p:nvSpPr>
+          <p:cNvPr id="2" name="1 Título"/>
+          <p:cNvSpPr>
+            <a:spLocks noGrp="1"/>
+          </p:cNvSpPr>
+          <p:nvPr>
+            <p:ph type="title"/>
+          </p:nvPr>
+        </p:nvSpPr>
+        <p:spPr/>
+        <p:txBody>
+          <a:bodyPr/>
+          <a:lstStyle/>
+          <a:p>
+            <a:pPr algn="ctr"/>
+            <a:r>
+              <a:rPr lang="es-AR" dirty="0" smtClean="0"/>
+              <a:t>Resolución Hipótesis</a:t>
+            </a:r>
+            <a:endParaRPr lang="es-AR" dirty="0"/>
+          </a:p>
+        </p:txBody>
+      </p:sp>
+      <p:sp>
+        <p:nvSpPr>
+          <p:cNvPr id="3" name="2 Marcador de contenido"/>
+          <p:cNvSpPr>
+            <a:spLocks noGrp="1"/>
+          </p:cNvSpPr>
+          <p:nvPr>
+            <p:ph idx="1"/>
+          </p:nvPr>
+        </p:nvSpPr>
+        <p:spPr/>
+        <p:txBody>
+          <a:bodyPr/>
+          <a:lstStyle/>
+          <a:p>
+            <a:endParaRPr lang="es-AR"/>
+          </a:p>
+        </p:txBody>
+      </p:sp>
+    </p:spTree>
+  </p:cSld>
+  <p:clrMapOvr>
+    <a:masterClrMapping/>
+  </p:clrMapOvr>
+  <p:transition>
+    <p:fade/>
+  </p:transition>
 </p:sld>
 </file>
 
@@ -9801,4 +10468,287 @@
   <a:objectDefaults/>
   <a:extraClrSchemeLst/>
 </a:theme>
+</file>
+
+<file path=ppt/theme/theme2.xml><?xml version="1.0" encoding="utf-8"?>
+<a:theme xmlns:a="http://schemas.openxmlformats.org/drawingml/2006/main" name="Tema de Office">
+  <a:themeElements>
+    <a:clrScheme name="Office">
+      <a:dk1>
+        <a:sysClr val="windowText" lastClr="000000"/>
+      </a:dk1>
+      <a:lt1>
+        <a:sysClr val="window" lastClr="FFFFFF"/>
+      </a:lt1>
+      <a:dk2>
+        <a:srgbClr val="1F497D"/>
+      </a:dk2>
+      <a:lt2>
+        <a:srgbClr val="EEECE1"/>
+      </a:lt2>
+      <a:accent1>
+        <a:srgbClr val="4F81BD"/>
+      </a:accent1>
+      <a:accent2>
+        <a:srgbClr val="C0504D"/>
+      </a:accent2>
+      <a:accent3>
+        <a:srgbClr val="9BBB59"/>
+      </a:accent3>
+      <a:accent4>
+        <a:srgbClr val="8064A2"/>
+      </a:accent4>
+      <a:accent5>
+        <a:srgbClr val="4BACC6"/>
+      </a:accent5>
+      <a:accent6>
+        <a:srgbClr val="F79646"/>
+      </a:accent6>
+      <a:hlink>
+        <a:srgbClr val="0000FF"/>
+      </a:hlink>
+      <a:folHlink>
+        <a:srgbClr val="800080"/>
+      </a:folHlink>
+    </a:clrScheme>
+    <a:fontScheme name="Office">
+      <a:majorFont>
+        <a:latin typeface="Calibri"/>
+        <a:ea typeface=""/>
+        <a:cs typeface=""/>
+        <a:font script="Jpan" typeface="ＭＳ Ｐゴシック"/>
+        <a:font script="Hang" typeface="맑은 고딕"/>
+        <a:font script="Hans" typeface="宋体"/>
+        <a:font script="Hant" typeface="新細明體"/>
+        <a:font script="Arab" typeface="Times New Roman"/>
+        <a:font script="Hebr" typeface="Times New Roman"/>
+        <a:font script="Thai" typeface="Angsana New"/>
+        <a:font script="Ethi" typeface="Nyala"/>
+        <a:font script="Beng" typeface="Vrinda"/>
+        <a:font script="Gujr" typeface="Shruti"/>
+        <a:font script="Khmr" typeface="MoolBoran"/>
+        <a:font script="Knda" typeface="Tunga"/>
+        <a:font script="Guru" typeface="Raavi"/>
+        <a:font script="Cans" typeface="Euphemia"/>
+        <a:font script="Cher" typeface="Plantagenet Cherokee"/>
+        <a:font script="Yiii" typeface="Microsoft Yi Baiti"/>
+        <a:font script="Tibt" typeface="Microsoft Himalaya"/>
+        <a:font script="Thaa" typeface="MV Boli"/>
+        <a:font script="Deva" typeface="Mangal"/>
+        <a:font script="Telu" typeface="Gautami"/>
+        <a:font script="Taml" typeface="Latha"/>
+        <a:font script="Syrc" typeface="Estrangelo Edessa"/>
+        <a:font script="Orya" typeface="Kalinga"/>
+        <a:font script="Mlym" typeface="Kartika"/>
+        <a:font script="Laoo" typeface="DokChampa"/>
+        <a:font script="Sinh" typeface="Iskoola Pota"/>
+        <a:font script="Mong" typeface="Mongolian Baiti"/>
+        <a:font script="Viet" typeface="Times New Roman"/>
+        <a:font script="Uigh" typeface="Microsoft Uighur"/>
+      </a:majorFont>
+      <a:minorFont>
+        <a:latin typeface="Calibri"/>
+        <a:ea typeface=""/>
+        <a:cs typeface=""/>
+        <a:font script="Jpan" typeface="ＭＳ Ｐゴシック"/>
+        <a:font script="Hang" typeface="맑은 고딕"/>
+        <a:font script="Hans" typeface="宋体"/>
+        <a:font script="Hant" typeface="新細明體"/>
+        <a:font script="Arab" typeface="Arial"/>
+        <a:font script="Hebr" typeface="Arial"/>
+        <a:font script="Thai" typeface="Cordia New"/>
+        <a:font script="Ethi" typeface="Nyala"/>
+        <a:font script="Beng" typeface="Vrinda"/>
+        <a:font script="Gujr" typeface="Shruti"/>
+        <a:font script="Khmr" typeface="DaunPenh"/>
+        <a:font script="Knda" typeface="Tunga"/>
+        <a:font script="Guru" typeface="Raavi"/>
+        <a:font script="Cans" typeface="Euphemia"/>
+        <a:font script="Cher" typeface="Plantagenet Cherokee"/>
+        <a:font script="Yiii" typeface="Microsoft Yi Baiti"/>
+        <a:font script="Tibt" typeface="Microsoft Himalaya"/>
+        <a:font script="Thaa" typeface="MV Boli"/>
+        <a:font script="Deva" typeface="Mangal"/>
+        <a:font script="Telu" typeface="Gautami"/>
+        <a:font script="Taml" typeface="Latha"/>
+        <a:font script="Syrc" typeface="Estrangelo Edessa"/>
+        <a:font script="Orya" typeface="Kalinga"/>
+        <a:font script="Mlym" typeface="Kartika"/>
+        <a:font script="Laoo" typeface="DokChampa"/>
+        <a:font script="Sinh" typeface="Iskoola Pota"/>
+        <a:font script="Mong" typeface="Mongolian Baiti"/>
+        <a:font script="Viet" typeface="Arial"/>
+        <a:font script="Uigh" typeface="Microsoft Uighur"/>
+      </a:minorFont>
+    </a:fontScheme>
+    <a:fmtScheme name="Office">
+      <a:fillStyleLst>
+        <a:solidFill>
+          <a:schemeClr val="phClr"/>
+        </a:solidFill>
+        <a:gradFill rotWithShape="1">
+          <a:gsLst>
+            <a:gs pos="0">
+              <a:schemeClr val="phClr">
+                <a:tint val="50000"/>
+                <a:satMod val="300000"/>
+              </a:schemeClr>
+            </a:gs>
+            <a:gs pos="35000">
+              <a:schemeClr val="phClr">
+                <a:tint val="37000"/>
+                <a:satMod val="300000"/>
+              </a:schemeClr>
+            </a:gs>
+            <a:gs pos="100000">
+              <a:schemeClr val="phClr">
+                <a:tint val="15000"/>
+                <a:satMod val="350000"/>
+              </a:schemeClr>
+            </a:gs>
+          </a:gsLst>
+          <a:lin ang="16200000" scaled="1"/>
+        </a:gradFill>
+        <a:gradFill rotWithShape="1">
+          <a:gsLst>
+            <a:gs pos="0">
+              <a:schemeClr val="phClr">
+                <a:shade val="51000"/>
+                <a:satMod val="130000"/>
+              </a:schemeClr>
+            </a:gs>
+            <a:gs pos="80000">
+              <a:schemeClr val="phClr">
+                <a:shade val="93000"/>
+                <a:satMod val="130000"/>
+              </a:schemeClr>
+            </a:gs>
+            <a:gs pos="100000">
+              <a:schemeClr val="phClr">
+                <a:shade val="94000"/>
+                <a:satMod val="135000"/>
+              </a:schemeClr>
+            </a:gs>
+          </a:gsLst>
+          <a:lin ang="16200000" scaled="0"/>
+        </a:gradFill>
+      </a:fillStyleLst>
+      <a:lnStyleLst>
+        <a:ln w="9525" cap="flat" cmpd="sng" algn="ctr">
+          <a:solidFill>
+            <a:schemeClr val="phClr">
+              <a:shade val="95000"/>
+              <a:satMod val="105000"/>
+            </a:schemeClr>
+          </a:solidFill>
+          <a:prstDash val="solid"/>
+        </a:ln>
+        <a:ln w="25400" cap="flat" cmpd="sng" algn="ctr">
+          <a:solidFill>
+            <a:schemeClr val="phClr"/>
+          </a:solidFill>
+          <a:prstDash val="solid"/>
+        </a:ln>
+        <a:ln w="38100" cap="flat" cmpd="sng" algn="ctr">
+          <a:solidFill>
+            <a:schemeClr val="phClr"/>
+          </a:solidFill>
+          <a:prstDash val="solid"/>
+        </a:ln>
+      </a:lnStyleLst>
+      <a:effectStyleLst>
+        <a:effectStyle>
+          <a:effectLst>
+            <a:outerShdw blurRad="40000" dist="20000" dir="5400000" rotWithShape="0">
+              <a:srgbClr val="000000">
+                <a:alpha val="38000"/>
+              </a:srgbClr>
+            </a:outerShdw>
+          </a:effectLst>
+        </a:effectStyle>
+        <a:effectStyle>
+          <a:effectLst>
+            <a:outerShdw blurRad="40000" dist="23000" dir="5400000" rotWithShape="0">
+              <a:srgbClr val="000000">
+                <a:alpha val="35000"/>
+              </a:srgbClr>
+            </a:outerShdw>
+          </a:effectLst>
+        </a:effectStyle>
+        <a:effectStyle>
+          <a:effectLst>
+            <a:outerShdw blurRad="40000" dist="23000" dir="5400000" rotWithShape="0">
+              <a:srgbClr val="000000">
+                <a:alpha val="35000"/>
+              </a:srgbClr>
+            </a:outerShdw>
+          </a:effectLst>
+          <a:scene3d>
+            <a:camera prst="orthographicFront">
+              <a:rot lat="0" lon="0" rev="0"/>
+            </a:camera>
+            <a:lightRig rig="threePt" dir="t">
+              <a:rot lat="0" lon="0" rev="1200000"/>
+            </a:lightRig>
+          </a:scene3d>
+          <a:sp3d>
+            <a:bevelT w="63500" h="25400"/>
+          </a:sp3d>
+        </a:effectStyle>
+      </a:effectStyleLst>
+      <a:bgFillStyleLst>
+        <a:solidFill>
+          <a:schemeClr val="phClr"/>
+        </a:solidFill>
+        <a:gradFill rotWithShape="1">
+          <a:gsLst>
+            <a:gs pos="0">
+              <a:schemeClr val="phClr">
+                <a:tint val="40000"/>
+                <a:satMod val="350000"/>
+              </a:schemeClr>
+            </a:gs>
+            <a:gs pos="40000">
+              <a:schemeClr val="phClr">
+                <a:tint val="45000"/>
+                <a:shade val="99000"/>
+                <a:satMod val="350000"/>
+              </a:schemeClr>
+            </a:gs>
+            <a:gs pos="100000">
+              <a:schemeClr val="phClr">
+                <a:shade val="20000"/>
+                <a:satMod val="255000"/>
+              </a:schemeClr>
+            </a:gs>
+          </a:gsLst>
+          <a:path path="circle">
+            <a:fillToRect l="50000" t="-80000" r="50000" b="180000"/>
+          </a:path>
+        </a:gradFill>
+        <a:gradFill rotWithShape="1">
+          <a:gsLst>
+            <a:gs pos="0">
+              <a:schemeClr val="phClr">
+                <a:tint val="80000"/>
+                <a:satMod val="300000"/>
+              </a:schemeClr>
+            </a:gs>
+            <a:gs pos="100000">
+              <a:schemeClr val="phClr">
+                <a:shade val="30000"/>
+                <a:satMod val="200000"/>
+              </a:schemeClr>
+            </a:gs>
+          </a:gsLst>
+          <a:path path="circle">
+            <a:fillToRect l="50000" t="50000" r="50000" b="50000"/>
+          </a:path>
+        </a:gradFill>
+      </a:bgFillStyleLst>
+    </a:fmtScheme>
+  </a:themeElements>
+  <a:objectDefaults/>
+  <a:extraClrSchemeLst/>
+</a:theme>
 </file>
</xml_diff>

<commit_message>
lo que mande por mail
</commit_message>
<xml_diff>
--- a/Presentacion/Presentacion.pptx
+++ b/Presentacion/Presentacion.pptx
@@ -1261,6 +1261,13 @@
         </dgm:presLayoutVars>
       </dgm:prSet>
       <dgm:spPr/>
+      <dgm:t>
+        <a:bodyPr/>
+        <a:lstStyle/>
+        <a:p>
+          <a:endParaRPr lang="es-AR"/>
+        </a:p>
+      </dgm:t>
     </dgm:pt>
     <dgm:pt modelId="{4124D1F3-F49F-438A-B106-3C970F35304C}" type="pres">
       <dgm:prSet presAssocID="{9E84F8C8-4335-44CA-9A4D-F7482B6DD3B4}" presName="firstNode" presStyleLbl="node1" presStyleIdx="0" presStyleCnt="8" custLinFactNeighborX="18394" custLinFactNeighborY="-27133">
@@ -1269,10 +1276,24 @@
         </dgm:presLayoutVars>
       </dgm:prSet>
       <dgm:spPr/>
+      <dgm:t>
+        <a:bodyPr/>
+        <a:lstStyle/>
+        <a:p>
+          <a:endParaRPr lang="es-AR"/>
+        </a:p>
+      </dgm:t>
     </dgm:pt>
     <dgm:pt modelId="{398CFFDE-B6EF-41CB-94B3-FC752D013E1D}" type="pres">
       <dgm:prSet presAssocID="{A76AC0ED-B38A-4273-A32B-B3165498AFF1}" presName="sibTrans" presStyleLbl="sibTrans2D1" presStyleIdx="0" presStyleCnt="7" custScaleX="202229" custScaleY="117059"/>
       <dgm:spPr/>
+      <dgm:t>
+        <a:bodyPr/>
+        <a:lstStyle/>
+        <a:p>
+          <a:endParaRPr lang="es-AR"/>
+        </a:p>
+      </dgm:t>
     </dgm:pt>
     <dgm:pt modelId="{C8CC9634-38CD-475C-833B-A63F4956D2A6}" type="pres">
       <dgm:prSet presAssocID="{AE35BB52-512F-4216-8C74-442EAF9658F1}" presName="middleNode" presStyleCnt="0"/>
@@ -1300,6 +1321,13 @@
     <dgm:pt modelId="{3E82E8B9-71B3-4686-B2A5-6CCA92C05DA6}" type="pres">
       <dgm:prSet presAssocID="{526565F5-5712-441D-B35F-D3485816F305}" presName="sibTrans" presStyleLbl="sibTrans2D1" presStyleIdx="1" presStyleCnt="7"/>
       <dgm:spPr/>
+      <dgm:t>
+        <a:bodyPr/>
+        <a:lstStyle/>
+        <a:p>
+          <a:endParaRPr lang="es-AR"/>
+        </a:p>
+      </dgm:t>
     </dgm:pt>
     <dgm:pt modelId="{FCE302B9-D1A5-4A93-BCCE-577678004595}" type="pres">
       <dgm:prSet presAssocID="{25D6D3D2-9778-419D-85BC-4FA3468A3D67}" presName="middleNode" presStyleCnt="0"/>
@@ -1316,10 +1344,24 @@
         </dgm:presLayoutVars>
       </dgm:prSet>
       <dgm:spPr/>
+      <dgm:t>
+        <a:bodyPr/>
+        <a:lstStyle/>
+        <a:p>
+          <a:endParaRPr lang="es-AR"/>
+        </a:p>
+      </dgm:t>
     </dgm:pt>
     <dgm:pt modelId="{F9FE47AB-795B-4BD4-ACB6-8497075F20CC}" type="pres">
       <dgm:prSet presAssocID="{EA013C51-6B73-401D-A97E-81B0C9873EA7}" presName="sibTrans" presStyleLbl="sibTrans2D1" presStyleIdx="2" presStyleCnt="7"/>
       <dgm:spPr/>
+      <dgm:t>
+        <a:bodyPr/>
+        <a:lstStyle/>
+        <a:p>
+          <a:endParaRPr lang="es-AR"/>
+        </a:p>
+      </dgm:t>
     </dgm:pt>
     <dgm:pt modelId="{B783239E-A511-4046-B335-00526ACE8618}" type="pres">
       <dgm:prSet presAssocID="{E6A688EE-5F6D-4FFC-94AF-FB31D499D542}" presName="middleNode" presStyleCnt="0"/>
@@ -1336,10 +1378,24 @@
         </dgm:presLayoutVars>
       </dgm:prSet>
       <dgm:spPr/>
+      <dgm:t>
+        <a:bodyPr/>
+        <a:lstStyle/>
+        <a:p>
+          <a:endParaRPr lang="es-AR"/>
+        </a:p>
+      </dgm:t>
     </dgm:pt>
     <dgm:pt modelId="{6B4B0A88-849A-430A-9CC1-AAF0BA443C6F}" type="pres">
       <dgm:prSet presAssocID="{981FFFBB-02CE-4F2B-9D91-069C8751BD4C}" presName="sibTrans" presStyleLbl="sibTrans2D1" presStyleIdx="3" presStyleCnt="7"/>
       <dgm:spPr/>
+      <dgm:t>
+        <a:bodyPr/>
+        <a:lstStyle/>
+        <a:p>
+          <a:endParaRPr lang="es-AR"/>
+        </a:p>
+      </dgm:t>
     </dgm:pt>
     <dgm:pt modelId="{9BA69DD1-463C-4ED6-B394-82870DB56BC3}" type="pres">
       <dgm:prSet presAssocID="{CAF00F69-D36F-4FB0-8AB9-382EE34A6579}" presName="middleNode" presStyleCnt="0"/>
@@ -1367,6 +1423,13 @@
     <dgm:pt modelId="{1E154F84-0FB5-4A03-BC10-F0915100A3D0}" type="pres">
       <dgm:prSet presAssocID="{01786A67-57D3-45B9-9EA2-414F75F9CCC9}" presName="sibTrans" presStyleLbl="sibTrans2D1" presStyleIdx="4" presStyleCnt="7"/>
       <dgm:spPr/>
+      <dgm:t>
+        <a:bodyPr/>
+        <a:lstStyle/>
+        <a:p>
+          <a:endParaRPr lang="es-AR"/>
+        </a:p>
+      </dgm:t>
     </dgm:pt>
     <dgm:pt modelId="{C0AFFE8A-5B24-4BC0-B3E0-26EE62FAAFDC}" type="pres">
       <dgm:prSet presAssocID="{617C2609-EB45-42A3-8BA0-44599585603C}" presName="middleNode" presStyleCnt="0"/>
@@ -1394,6 +1457,13 @@
     <dgm:pt modelId="{162881B7-5CA2-4801-B7C5-C4203DEA2D9A}" type="pres">
       <dgm:prSet presAssocID="{80E015A4-701C-4741-9FA3-910608A1A5DD}" presName="sibTrans" presStyleLbl="sibTrans2D1" presStyleIdx="5" presStyleCnt="7"/>
       <dgm:spPr/>
+      <dgm:t>
+        <a:bodyPr/>
+        <a:lstStyle/>
+        <a:p>
+          <a:endParaRPr lang="es-AR"/>
+        </a:p>
+      </dgm:t>
     </dgm:pt>
     <dgm:pt modelId="{60C0460C-0D06-4D82-964C-A2F25226A6C7}" type="pres">
       <dgm:prSet presAssocID="{3914AB2A-0AAA-4F53-B987-709626338E04}" presName="middleNode" presStyleCnt="0"/>
@@ -1410,10 +1480,24 @@
         </dgm:presLayoutVars>
       </dgm:prSet>
       <dgm:spPr/>
+      <dgm:t>
+        <a:bodyPr/>
+        <a:lstStyle/>
+        <a:p>
+          <a:endParaRPr lang="es-AR"/>
+        </a:p>
+      </dgm:t>
     </dgm:pt>
     <dgm:pt modelId="{2CAD250B-E149-4DBB-945E-E5CA1432BCA2}" type="pres">
       <dgm:prSet presAssocID="{85FFEF28-971F-44B3-A8DB-F7C254A45F91}" presName="sibTrans" presStyleLbl="sibTrans2D1" presStyleIdx="6" presStyleCnt="7" custScaleX="153456"/>
       <dgm:spPr/>
+      <dgm:t>
+        <a:bodyPr/>
+        <a:lstStyle/>
+        <a:p>
+          <a:endParaRPr lang="es-AR"/>
+        </a:p>
+      </dgm:t>
     </dgm:pt>
     <dgm:pt modelId="{F1F0991A-ED7B-4142-BE7E-BF91529E330F}" type="pres">
       <dgm:prSet presAssocID="{B2E52BD7-EC53-443C-95CC-5C327F1BD2C7}" presName="lastNode" presStyleLbl="node1" presStyleIdx="7" presStyleCnt="8" custLinFactY="73487" custLinFactNeighborX="-30367" custLinFactNeighborY="100000">
@@ -1432,29 +1516,29 @@
     </dgm:pt>
   </dgm:ptLst>
   <dgm:cxnLst>
-    <dgm:cxn modelId="{64953063-3C09-4CCE-BB14-4EF33F66C611}" type="presOf" srcId="{EA013C51-6B73-401D-A97E-81B0C9873EA7}" destId="{F9FE47AB-795B-4BD4-ACB6-8497075F20CC}" srcOrd="0" destOrd="0" presId="urn:microsoft.com/office/officeart/2005/8/layout/bProcess2"/>
-    <dgm:cxn modelId="{5481082D-3271-400C-ABE8-FC93D9DE87A9}" srcId="{C2365845-EF73-4848-B396-71E91C1ED804}" destId="{3914AB2A-0AAA-4F53-B987-709626338E04}" srcOrd="6" destOrd="0" parTransId="{B32FEB9C-DCE0-4267-8997-2C182CF60860}" sibTransId="{85FFEF28-971F-44B3-A8DB-F7C254A45F91}"/>
-    <dgm:cxn modelId="{3AA6352F-BF4F-4C2D-BAD4-36F3A19E63B6}" type="presOf" srcId="{A76AC0ED-B38A-4273-A32B-B3165498AFF1}" destId="{398CFFDE-B6EF-41CB-94B3-FC752D013E1D}" srcOrd="0" destOrd="0" presId="urn:microsoft.com/office/officeart/2005/8/layout/bProcess2"/>
-    <dgm:cxn modelId="{60E2BB39-FA60-4925-8D48-B8F265C0AEE7}" type="presOf" srcId="{01786A67-57D3-45B9-9EA2-414F75F9CCC9}" destId="{1E154F84-0FB5-4A03-BC10-F0915100A3D0}" srcOrd="0" destOrd="0" presId="urn:microsoft.com/office/officeart/2005/8/layout/bProcess2"/>
-    <dgm:cxn modelId="{54E0C458-C5F5-4377-A717-3BC6C68F3226}" type="presOf" srcId="{526565F5-5712-441D-B35F-D3485816F305}" destId="{3E82E8B9-71B3-4686-B2A5-6CCA92C05DA6}" srcOrd="0" destOrd="0" presId="urn:microsoft.com/office/officeart/2005/8/layout/bProcess2"/>
-    <dgm:cxn modelId="{70887561-C919-4A56-9D39-6E8280D9E07A}" type="presOf" srcId="{80E015A4-701C-4741-9FA3-910608A1A5DD}" destId="{162881B7-5CA2-4801-B7C5-C4203DEA2D9A}" srcOrd="0" destOrd="0" presId="urn:microsoft.com/office/officeart/2005/8/layout/bProcess2"/>
-    <dgm:cxn modelId="{5203382D-97B2-4D76-98AB-DE3DCCF231AD}" srcId="{C2365845-EF73-4848-B396-71E91C1ED804}" destId="{AE35BB52-512F-4216-8C74-442EAF9658F1}" srcOrd="1" destOrd="0" parTransId="{DC0B5EB5-E5C6-4D58-920E-4028460DB64B}" sibTransId="{526565F5-5712-441D-B35F-D3485816F305}"/>
     <dgm:cxn modelId="{1E9165E9-8409-49AE-B0B8-991FBBEC278A}" srcId="{C2365845-EF73-4848-B396-71E91C1ED804}" destId="{B2E52BD7-EC53-443C-95CC-5C327F1BD2C7}" srcOrd="7" destOrd="0" parTransId="{7A394A07-BA7E-4590-ADB9-DD9BF98BD83C}" sibTransId="{0E4A3BC8-FCB6-4F01-86C1-F2A7C8A67527}"/>
-    <dgm:cxn modelId="{F5F4C32A-E72C-4DD6-B9F8-25671DAD4CD2}" type="presOf" srcId="{B2E52BD7-EC53-443C-95CC-5C327F1BD2C7}" destId="{F1F0991A-ED7B-4142-BE7E-BF91529E330F}" srcOrd="0" destOrd="0" presId="urn:microsoft.com/office/officeart/2005/8/layout/bProcess2"/>
     <dgm:cxn modelId="{66947DE3-8A38-4C4E-99C8-1E45E1C032F6}" type="presOf" srcId="{C2365845-EF73-4848-B396-71E91C1ED804}" destId="{EC367A7F-B976-401D-9034-D0466928D3B0}" srcOrd="0" destOrd="0" presId="urn:microsoft.com/office/officeart/2005/8/layout/bProcess2"/>
     <dgm:cxn modelId="{24BFFD7B-4CE6-4772-BCB3-281E57D605EA}" srcId="{C2365845-EF73-4848-B396-71E91C1ED804}" destId="{25D6D3D2-9778-419D-85BC-4FA3468A3D67}" srcOrd="2" destOrd="0" parTransId="{DF8599B4-6BF4-44ED-AA5C-89E6042F512A}" sibTransId="{EA013C51-6B73-401D-A97E-81B0C9873EA7}"/>
-    <dgm:cxn modelId="{9F042F93-F6AA-4E1F-B983-17B49AB3315F}" type="presOf" srcId="{E6A688EE-5F6D-4FFC-94AF-FB31D499D542}" destId="{51C985B6-A111-4F04-AF02-10CF2AF99076}" srcOrd="0" destOrd="0" presId="urn:microsoft.com/office/officeart/2005/8/layout/bProcess2"/>
-    <dgm:cxn modelId="{9C61BF74-7DCC-4A6E-875E-89519FFB2B4A}" type="presOf" srcId="{25D6D3D2-9778-419D-85BC-4FA3468A3D67}" destId="{2220DEA6-7A60-4F70-A456-F7811CCB1201}" srcOrd="0" destOrd="0" presId="urn:microsoft.com/office/officeart/2005/8/layout/bProcess2"/>
+    <dgm:cxn modelId="{3983ECF7-693E-4821-A348-D598E063B7DB}" type="presOf" srcId="{9E84F8C8-4335-44CA-9A4D-F7482B6DD3B4}" destId="{4124D1F3-F49F-438A-B106-3C970F35304C}" srcOrd="0" destOrd="0" presId="urn:microsoft.com/office/officeart/2005/8/layout/bProcess2"/>
+    <dgm:cxn modelId="{3A16C56A-46A8-4248-B727-00EFE671A1FC}" type="presOf" srcId="{AE35BB52-512F-4216-8C74-442EAF9658F1}" destId="{297B9C63-752D-4A9D-8B61-4CAF494516F8}" srcOrd="0" destOrd="0" presId="urn:microsoft.com/office/officeart/2005/8/layout/bProcess2"/>
+    <dgm:cxn modelId="{B60F6C34-E88B-41D7-ACB4-BC13AB29D207}" type="presOf" srcId="{CAF00F69-D36F-4FB0-8AB9-382EE34A6579}" destId="{86A64250-B3BE-4EFC-8717-EB3F61C3376F}" srcOrd="0" destOrd="0" presId="urn:microsoft.com/office/officeart/2005/8/layout/bProcess2"/>
+    <dgm:cxn modelId="{AD6CAD9F-B105-49BF-A553-D9ABD05A68A5}" srcId="{C2365845-EF73-4848-B396-71E91C1ED804}" destId="{617C2609-EB45-42A3-8BA0-44599585603C}" srcOrd="5" destOrd="0" parTransId="{AC9CC373-1A20-448F-9023-12C3C00E1CBC}" sibTransId="{80E015A4-701C-4741-9FA3-910608A1A5DD}"/>
     <dgm:cxn modelId="{1921BD9E-60B0-4E16-8907-C302FEC3D1F4}" type="presOf" srcId="{981FFFBB-02CE-4F2B-9D91-069C8751BD4C}" destId="{6B4B0A88-849A-430A-9CC1-AAF0BA443C6F}" srcOrd="0" destOrd="0" presId="urn:microsoft.com/office/officeart/2005/8/layout/bProcess2"/>
-    <dgm:cxn modelId="{AD6CAD9F-B105-49BF-A553-D9ABD05A68A5}" srcId="{C2365845-EF73-4848-B396-71E91C1ED804}" destId="{617C2609-EB45-42A3-8BA0-44599585603C}" srcOrd="5" destOrd="0" parTransId="{AC9CC373-1A20-448F-9023-12C3C00E1CBC}" sibTransId="{80E015A4-701C-4741-9FA3-910608A1A5DD}"/>
     <dgm:cxn modelId="{86A7E18A-B0A5-426E-B224-E28E2F319B2A}" type="presOf" srcId="{3914AB2A-0AAA-4F53-B987-709626338E04}" destId="{0B63645C-6E0E-49F4-AC17-B0EF4195D8A2}" srcOrd="0" destOrd="0" presId="urn:microsoft.com/office/officeart/2005/8/layout/bProcess2"/>
     <dgm:cxn modelId="{E319051D-A32D-4FF3-B31C-A2221D6B9CC4}" srcId="{C2365845-EF73-4848-B396-71E91C1ED804}" destId="{CAF00F69-D36F-4FB0-8AB9-382EE34A6579}" srcOrd="4" destOrd="0" parTransId="{612C3121-2251-471C-B95C-63B1E7BE4EA4}" sibTransId="{01786A67-57D3-45B9-9EA2-414F75F9CCC9}"/>
-    <dgm:cxn modelId="{B60F6C34-E88B-41D7-ACB4-BC13AB29D207}" type="presOf" srcId="{CAF00F69-D36F-4FB0-8AB9-382EE34A6579}" destId="{86A64250-B3BE-4EFC-8717-EB3F61C3376F}" srcOrd="0" destOrd="0" presId="urn:microsoft.com/office/officeart/2005/8/layout/bProcess2"/>
-    <dgm:cxn modelId="{3A16C56A-46A8-4248-B727-00EFE671A1FC}" type="presOf" srcId="{AE35BB52-512F-4216-8C74-442EAF9658F1}" destId="{297B9C63-752D-4A9D-8B61-4CAF494516F8}" srcOrd="0" destOrd="0" presId="urn:microsoft.com/office/officeart/2005/8/layout/bProcess2"/>
+    <dgm:cxn modelId="{F5F4C32A-E72C-4DD6-B9F8-25671DAD4CD2}" type="presOf" srcId="{B2E52BD7-EC53-443C-95CC-5C327F1BD2C7}" destId="{F1F0991A-ED7B-4142-BE7E-BF91529E330F}" srcOrd="0" destOrd="0" presId="urn:microsoft.com/office/officeart/2005/8/layout/bProcess2"/>
+    <dgm:cxn modelId="{54E0C458-C5F5-4377-A717-3BC6C68F3226}" type="presOf" srcId="{526565F5-5712-441D-B35F-D3485816F305}" destId="{3E82E8B9-71B3-4686-B2A5-6CCA92C05DA6}" srcOrd="0" destOrd="0" presId="urn:microsoft.com/office/officeart/2005/8/layout/bProcess2"/>
+    <dgm:cxn modelId="{64953063-3C09-4CCE-BB14-4EF33F66C611}" type="presOf" srcId="{EA013C51-6B73-401D-A97E-81B0C9873EA7}" destId="{F9FE47AB-795B-4BD4-ACB6-8497075F20CC}" srcOrd="0" destOrd="0" presId="urn:microsoft.com/office/officeart/2005/8/layout/bProcess2"/>
+    <dgm:cxn modelId="{60E2BB39-FA60-4925-8D48-B8F265C0AEE7}" type="presOf" srcId="{01786A67-57D3-45B9-9EA2-414F75F9CCC9}" destId="{1E154F84-0FB5-4A03-BC10-F0915100A3D0}" srcOrd="0" destOrd="0" presId="urn:microsoft.com/office/officeart/2005/8/layout/bProcess2"/>
+    <dgm:cxn modelId="{10F9C9A3-0C03-4062-AC99-AC9EA6CD89F9}" srcId="{C2365845-EF73-4848-B396-71E91C1ED804}" destId="{E6A688EE-5F6D-4FFC-94AF-FB31D499D542}" srcOrd="3" destOrd="0" parTransId="{13059E23-E1F5-4139-BB1C-C6E3EAB8F348}" sibTransId="{981FFFBB-02CE-4F2B-9D91-069C8751BD4C}"/>
+    <dgm:cxn modelId="{3AA6352F-BF4F-4C2D-BAD4-36F3A19E63B6}" type="presOf" srcId="{A76AC0ED-B38A-4273-A32B-B3165498AFF1}" destId="{398CFFDE-B6EF-41CB-94B3-FC752D013E1D}" srcOrd="0" destOrd="0" presId="urn:microsoft.com/office/officeart/2005/8/layout/bProcess2"/>
     <dgm:cxn modelId="{5B11DC70-9517-4212-9985-78CCE94DE965}" type="presOf" srcId="{617C2609-EB45-42A3-8BA0-44599585603C}" destId="{CE32AD42-D2E3-4C20-9415-D4A989C95E26}" srcOrd="0" destOrd="0" presId="urn:microsoft.com/office/officeart/2005/8/layout/bProcess2"/>
-    <dgm:cxn modelId="{3983ECF7-693E-4821-A348-D598E063B7DB}" type="presOf" srcId="{9E84F8C8-4335-44CA-9A4D-F7482B6DD3B4}" destId="{4124D1F3-F49F-438A-B106-3C970F35304C}" srcOrd="0" destOrd="0" presId="urn:microsoft.com/office/officeart/2005/8/layout/bProcess2"/>
+    <dgm:cxn modelId="{5203382D-97B2-4D76-98AB-DE3DCCF231AD}" srcId="{C2365845-EF73-4848-B396-71E91C1ED804}" destId="{AE35BB52-512F-4216-8C74-442EAF9658F1}" srcOrd="1" destOrd="0" parTransId="{DC0B5EB5-E5C6-4D58-920E-4028460DB64B}" sibTransId="{526565F5-5712-441D-B35F-D3485816F305}"/>
+    <dgm:cxn modelId="{70887561-C919-4A56-9D39-6E8280D9E07A}" type="presOf" srcId="{80E015A4-701C-4741-9FA3-910608A1A5DD}" destId="{162881B7-5CA2-4801-B7C5-C4203DEA2D9A}" srcOrd="0" destOrd="0" presId="urn:microsoft.com/office/officeart/2005/8/layout/bProcess2"/>
     <dgm:cxn modelId="{81169773-F06F-4DB6-AF1E-FB3629211DE9}" srcId="{C2365845-EF73-4848-B396-71E91C1ED804}" destId="{9E84F8C8-4335-44CA-9A4D-F7482B6DD3B4}" srcOrd="0" destOrd="0" parTransId="{EAA56BEC-422F-4961-9C86-993877435AEA}" sibTransId="{A76AC0ED-B38A-4273-A32B-B3165498AFF1}"/>
-    <dgm:cxn modelId="{10F9C9A3-0C03-4062-AC99-AC9EA6CD89F9}" srcId="{C2365845-EF73-4848-B396-71E91C1ED804}" destId="{E6A688EE-5F6D-4FFC-94AF-FB31D499D542}" srcOrd="3" destOrd="0" parTransId="{13059E23-E1F5-4139-BB1C-C6E3EAB8F348}" sibTransId="{981FFFBB-02CE-4F2B-9D91-069C8751BD4C}"/>
+    <dgm:cxn modelId="{9F042F93-F6AA-4E1F-B983-17B49AB3315F}" type="presOf" srcId="{E6A688EE-5F6D-4FFC-94AF-FB31D499D542}" destId="{51C985B6-A111-4F04-AF02-10CF2AF99076}" srcOrd="0" destOrd="0" presId="urn:microsoft.com/office/officeart/2005/8/layout/bProcess2"/>
+    <dgm:cxn modelId="{5481082D-3271-400C-ABE8-FC93D9DE87A9}" srcId="{C2365845-EF73-4848-B396-71E91C1ED804}" destId="{3914AB2A-0AAA-4F53-B987-709626338E04}" srcOrd="6" destOrd="0" parTransId="{B32FEB9C-DCE0-4267-8997-2C182CF60860}" sibTransId="{85FFEF28-971F-44B3-A8DB-F7C254A45F91}"/>
+    <dgm:cxn modelId="{9C61BF74-7DCC-4A6E-875E-89519FFB2B4A}" type="presOf" srcId="{25D6D3D2-9778-419D-85BC-4FA3468A3D67}" destId="{2220DEA6-7A60-4F70-A456-F7811CCB1201}" srcOrd="0" destOrd="0" presId="urn:microsoft.com/office/officeart/2005/8/layout/bProcess2"/>
     <dgm:cxn modelId="{CB79AB4A-EADF-44F7-A1B8-323613EFCDA0}" type="presOf" srcId="{85FFEF28-971F-44B3-A8DB-F7C254A45F91}" destId="{2CAD250B-E149-4DBB-945E-E5CA1432BCA2}" srcOrd="0" destOrd="0" presId="urn:microsoft.com/office/officeart/2005/8/layout/bProcess2"/>
     <dgm:cxn modelId="{7CAFAAED-B98B-41F8-BF9E-13092AA512F6}" type="presParOf" srcId="{EC367A7F-B976-401D-9034-D0466928D3B0}" destId="{4124D1F3-F49F-438A-B106-3C970F35304C}" srcOrd="0" destOrd="0" presId="urn:microsoft.com/office/officeart/2005/8/layout/bProcess2"/>
     <dgm:cxn modelId="{79C1217F-0B00-4540-A5DD-F66463D09F4C}" type="presParOf" srcId="{EC367A7F-B976-401D-9034-D0466928D3B0}" destId="{398CFFDE-B6EF-41CB-94B3-FC752D013E1D}" srcOrd="1" destOrd="0" presId="urn:microsoft.com/office/officeart/2005/8/layout/bProcess2"/>
@@ -4559,7 +4643,7 @@
             <a:fld id="{F7EC247D-ED8B-45CF-B553-37729D048AD6}" type="datetimeFigureOut">
               <a:rPr lang="es-AR" smtClean="0"/>
               <a:pPr/>
-              <a:t>16/06/2011</a:t>
+              <a:t>18/06/2011</a:t>
             </a:fld>
             <a:endParaRPr lang="es-AR"/>
           </a:p>
@@ -4960,7 +5044,7 @@
             <a:fld id="{7C44809D-EF54-4966-A24E-C6C0F0B167CB}" type="datetimeFigureOut">
               <a:rPr lang="es-AR" smtClean="0"/>
               <a:pPr/>
-              <a:t>16/06/2011</a:t>
+              <a:t>18/06/2011</a:t>
             </a:fld>
             <a:endParaRPr lang="es-AR"/>
           </a:p>
@@ -5278,7 +5362,7 @@
             <a:fld id="{7C44809D-EF54-4966-A24E-C6C0F0B167CB}" type="datetimeFigureOut">
               <a:rPr lang="es-AR" smtClean="0"/>
               <a:pPr/>
-              <a:t>16/06/2011</a:t>
+              <a:t>18/06/2011</a:t>
             </a:fld>
             <a:endParaRPr lang="es-AR"/>
           </a:p>
@@ -5468,7 +5552,7 @@
             <a:fld id="{7C44809D-EF54-4966-A24E-C6C0F0B167CB}" type="datetimeFigureOut">
               <a:rPr lang="es-AR" smtClean="0"/>
               <a:pPr/>
-              <a:t>16/06/2011</a:t>
+              <a:t>18/06/2011</a:t>
             </a:fld>
             <a:endParaRPr lang="es-AR"/>
           </a:p>
@@ -5648,7 +5732,7 @@
             <a:fld id="{7C44809D-EF54-4966-A24E-C6C0F0B167CB}" type="datetimeFigureOut">
               <a:rPr lang="es-AR" smtClean="0"/>
               <a:pPr/>
-              <a:t>16/06/2011</a:t>
+              <a:t>18/06/2011</a:t>
             </a:fld>
             <a:endParaRPr lang="es-AR"/>
           </a:p>
@@ -5921,7 +6005,7 @@
             <a:fld id="{7C44809D-EF54-4966-A24E-C6C0F0B167CB}" type="datetimeFigureOut">
               <a:rPr lang="es-AR" smtClean="0"/>
               <a:pPr/>
-              <a:t>16/06/2011</a:t>
+              <a:t>18/06/2011</a:t>
             </a:fld>
             <a:endParaRPr lang="es-AR"/>
           </a:p>
@@ -6394,7 +6478,7 @@
             <a:fld id="{7C44809D-EF54-4966-A24E-C6C0F0B167CB}" type="datetimeFigureOut">
               <a:rPr lang="es-AR" smtClean="0"/>
               <a:pPr/>
-              <a:t>16/06/2011</a:t>
+              <a:t>18/06/2011</a:t>
             </a:fld>
             <a:endParaRPr lang="es-AR"/>
           </a:p>
@@ -6888,7 +6972,7 @@
             <a:fld id="{7C44809D-EF54-4966-A24E-C6C0F0B167CB}" type="datetimeFigureOut">
               <a:rPr lang="es-AR" smtClean="0"/>
               <a:pPr/>
-              <a:t>16/06/2011</a:t>
+              <a:t>18/06/2011</a:t>
             </a:fld>
             <a:endParaRPr lang="es-AR"/>
           </a:p>
@@ -7019,7 +7103,7 @@
             <a:fld id="{7C44809D-EF54-4966-A24E-C6C0F0B167CB}" type="datetimeFigureOut">
               <a:rPr lang="es-AR" smtClean="0"/>
               <a:pPr/>
-              <a:t>16/06/2011</a:t>
+              <a:t>18/06/2011</a:t>
             </a:fld>
             <a:endParaRPr lang="es-AR"/>
           </a:p>
@@ -7168,7 +7252,7 @@
             <a:fld id="{7C44809D-EF54-4966-A24E-C6C0F0B167CB}" type="datetimeFigureOut">
               <a:rPr lang="es-AR" smtClean="0"/>
               <a:pPr/>
-              <a:t>16/06/2011</a:t>
+              <a:t>18/06/2011</a:t>
             </a:fld>
             <a:endParaRPr lang="es-AR"/>
           </a:p>
@@ -7495,7 +7579,7 @@
             <a:fld id="{7C44809D-EF54-4966-A24E-C6C0F0B167CB}" type="datetimeFigureOut">
               <a:rPr lang="es-AR" smtClean="0"/>
               <a:pPr/>
-              <a:t>16/06/2011</a:t>
+              <a:t>18/06/2011</a:t>
             </a:fld>
             <a:endParaRPr lang="es-AR"/>
           </a:p>
@@ -7634,7 +7718,7 @@
             <a:fld id="{7C44809D-EF54-4966-A24E-C6C0F0B167CB}" type="datetimeFigureOut">
               <a:rPr lang="es-AR" smtClean="0"/>
               <a:pPr/>
-              <a:t>16/06/2011</a:t>
+              <a:t>18/06/2011</a:t>
             </a:fld>
             <a:endParaRPr lang="es-AR"/>
           </a:p>
@@ -8420,7 +8504,7 @@
             <a:fld id="{7C44809D-EF54-4966-A24E-C6C0F0B167CB}" type="datetimeFigureOut">
               <a:rPr lang="es-AR" smtClean="0"/>
               <a:pPr/>
-              <a:t>16/06/2011</a:t>
+              <a:t>18/06/2011</a:t>
             </a:fld>
             <a:endParaRPr lang="es-AR"/>
           </a:p>
@@ -9436,7 +9520,7 @@
         </p:nvGraphicFramePr>
         <p:xfrm>
           <a:off x="1691680" y="2420888"/>
-          <a:ext cx="7128792" cy="3931920"/>
+          <a:ext cx="7128792" cy="3627120"/>
         </p:xfrm>
         <a:graphic>
           <a:graphicData uri="http://schemas.openxmlformats.org/drawingml/2006/table">
@@ -9453,24 +9537,26 @@
                     <a:bodyPr/>
                     <a:lstStyle/>
                     <a:p>
-                      <a:pPr>
+                      <a:pPr marL="457200" lvl="1" algn="l" rtl="0" eaLnBrk="1" latinLnBrk="0" hangingPunct="1">
                         <a:buFontTx/>
                         <a:buBlip>
                           <a:blip r:embed="rId2"/>
                         </a:buBlip>
                       </a:pPr>
-                      <a:r>
-                        <a:rPr lang="es-AR" sz="2000" u="sng" dirty="0" smtClean="0">
-                          <a:latin typeface="Century Gothic" pitchFamily="34" charset="0"/>
-                        </a:rPr>
-                        <a:t> Función</a:t>
-                      </a:r>
+                      <a:endParaRPr kumimoji="0" lang="es-AR" sz="2000" kern="1200" dirty="0" smtClean="0">
+                        <a:solidFill>
+                          <a:schemeClr val="dk1"/>
+                        </a:solidFill>
+                        <a:latin typeface="Century Gothic" pitchFamily="34" charset="0"/>
+                        <a:ea typeface="+mn-ea"/>
+                        <a:cs typeface="+mn-cs"/>
+                      </a:endParaRPr>
                     </a:p>
                     <a:p>
                       <a:pPr marL="457200" lvl="1" algn="l" rtl="0" eaLnBrk="1" latinLnBrk="0" hangingPunct="1">
                         <a:buFontTx/>
                         <a:buBlip>
-                          <a:blip r:embed="rId3"/>
+                          <a:blip r:embed="rId2"/>
                         </a:buBlip>
                       </a:pPr>
                       <a:r>
@@ -9489,27 +9575,21 @@
                       <a:pPr lvl="1">
                         <a:buFontTx/>
                         <a:buBlip>
-                          <a:blip r:embed="rId3"/>
+                          <a:blip r:embed="rId2"/>
                         </a:buBlip>
                       </a:pPr>
                       <a:r>
                         <a:rPr lang="es-AR" sz="2000" dirty="0" smtClean="0">
                           <a:latin typeface="Century Gothic" pitchFamily="34" charset="0"/>
                         </a:rPr>
-                        <a:t>    </a:t>
-                      </a:r>
-                      <a:r>
-                        <a:rPr lang="es-AR" sz="2000" dirty="0" smtClean="0">
-                          <a:latin typeface="Century Gothic" pitchFamily="34" charset="0"/>
-                        </a:rPr>
-                        <a:t>Desarrollar estrategias</a:t>
+                        <a:t>    Desarrollar estrategias</a:t>
                       </a:r>
                     </a:p>
                     <a:p>
                       <a:pPr lvl="1">
                         <a:buFontTx/>
                         <a:buBlip>
-                          <a:blip r:embed="rId4"/>
+                          <a:blip r:embed="rId3"/>
                         </a:buBlip>
                       </a:pPr>
                       <a:endParaRPr lang="es-AR" sz="2000" dirty="0">
@@ -9526,11 +9606,9 @@
                     <a:bodyPr/>
                     <a:lstStyle/>
                     <a:p>
-                      <a:pPr marL="0" algn="l" rtl="0" eaLnBrk="1" latinLnBrk="0" hangingPunct="1">
-                        <a:buFontTx/>
-                        <a:buBlip>
-                          <a:blip r:embed="rId2"/>
-                        </a:buBlip>
+                      <a:pPr marL="457200" lvl="1" algn="l" rtl="0" eaLnBrk="1" latinLnBrk="0" hangingPunct="1">
+                        <a:buFont typeface="Arial" pitchFamily="34" charset="0"/>
+                        <a:buNone/>
                       </a:pPr>
                       <a:r>
                         <a:rPr kumimoji="0" lang="es-AR" sz="2000" kern="1200" dirty="0" smtClean="0">
@@ -9541,25 +9619,14 @@
                           <a:ea typeface="+mn-ea"/>
                           <a:cs typeface="+mn-cs"/>
                         </a:rPr>
-                        <a:t> </a:t>
-                      </a:r>
-                      <a:r>
-                        <a:rPr kumimoji="0" lang="es-AR" sz="2000" u="sng" kern="1200" dirty="0" smtClean="0">
-                          <a:solidFill>
-                            <a:schemeClr val="dk1"/>
-                          </a:solidFill>
-                          <a:latin typeface="Century Gothic" pitchFamily="34" charset="0"/>
-                          <a:ea typeface="+mn-ea"/>
-                          <a:cs typeface="+mn-cs"/>
-                        </a:rPr>
-                        <a:t>Responsabilidad</a:t>
+                        <a:t>   </a:t>
                       </a:r>
                     </a:p>
                     <a:p>
                       <a:pPr marL="457200" lvl="1" algn="l" rtl="0" eaLnBrk="1" latinLnBrk="0" hangingPunct="1">
                         <a:buFontTx/>
                         <a:buBlip>
-                          <a:blip r:embed="rId3"/>
+                          <a:blip r:embed="rId2"/>
                         </a:buBlip>
                       </a:pPr>
                       <a:r>
@@ -9578,7 +9645,7 @@
                       <a:pPr marL="457200" lvl="1" algn="l" rtl="0" eaLnBrk="1" latinLnBrk="0" hangingPunct="1">
                         <a:buFontTx/>
                         <a:buBlip>
-                          <a:blip r:embed="rId3"/>
+                          <a:blip r:embed="rId2"/>
                         </a:buBlip>
                       </a:pPr>
                       <a:r>
@@ -9590,39 +9657,17 @@
                           <a:ea typeface="+mn-ea"/>
                           <a:cs typeface="+mn-cs"/>
                         </a:rPr>
-                        <a:t>    </a:t>
-                      </a:r>
-                      <a:r>
-                        <a:rPr kumimoji="0" lang="es-AR" sz="2000" u="none" kern="1200" dirty="0" smtClean="0">
-                          <a:solidFill>
-                            <a:schemeClr val="dk1"/>
-                          </a:solidFill>
-                          <a:latin typeface="Century Gothic" pitchFamily="34" charset="0"/>
-                          <a:ea typeface="+mn-ea"/>
-                          <a:cs typeface="+mn-cs"/>
-                        </a:rPr>
-                        <a:t>Asignar</a:t>
-                      </a:r>
-                      <a:r>
-                        <a:rPr kumimoji="0" lang="es-AR" sz="2000" u="none" kern="1200" baseline="0" dirty="0" smtClean="0">
-                          <a:solidFill>
-                            <a:schemeClr val="dk1"/>
-                          </a:solidFill>
-                          <a:latin typeface="Century Gothic" pitchFamily="34" charset="0"/>
-                          <a:ea typeface="+mn-ea"/>
-                          <a:cs typeface="+mn-cs"/>
-                        </a:rPr>
-                        <a:t> objetivos a cada sector</a:t>
+                        <a:t>    Asignar objetivos a cada sector</a:t>
                       </a:r>
                     </a:p>
                     <a:p>
                       <a:pPr marL="457200" lvl="1" algn="l" rtl="0" eaLnBrk="1" latinLnBrk="0" hangingPunct="1">
                         <a:buFontTx/>
                         <a:buBlip>
-                          <a:blip r:embed="rId3"/>
+                          <a:blip r:embed="rId2"/>
                         </a:buBlip>
                       </a:pPr>
-                      <a:endParaRPr kumimoji="0" lang="es-AR" sz="2000" u="sng" kern="1200" dirty="0" smtClean="0">
+                      <a:endParaRPr kumimoji="0" lang="es-AR" sz="2000" kern="1200" dirty="0" smtClean="0">
                         <a:solidFill>
                           <a:schemeClr val="dk1"/>
                         </a:solidFill>
@@ -9641,7 +9686,7 @@
                     <a:bodyPr/>
                     <a:lstStyle/>
                     <a:p>
-                      <a:pPr marL="0" algn="l" rtl="0" eaLnBrk="1" latinLnBrk="0" hangingPunct="1">
+                      <a:pPr marL="457200" lvl="1" algn="l" rtl="0" eaLnBrk="1" latinLnBrk="0" hangingPunct="1">
                         <a:buFontTx/>
                         <a:buBlip>
                           <a:blip r:embed="rId2"/>
@@ -9656,44 +9701,14 @@
                           <a:ea typeface="+mn-ea"/>
                           <a:cs typeface="+mn-cs"/>
                         </a:rPr>
-                        <a:t> </a:t>
-                      </a:r>
-                      <a:r>
-                        <a:rPr kumimoji="0" lang="es-AR" sz="2000" u="sng" kern="1200" dirty="0" smtClean="0">
-                          <a:solidFill>
-                            <a:schemeClr val="dk1"/>
-                          </a:solidFill>
-                          <a:latin typeface="Century Gothic" pitchFamily="34" charset="0"/>
-                          <a:ea typeface="+mn-ea"/>
-                          <a:cs typeface="+mn-cs"/>
-                        </a:rPr>
-                        <a:t>Autoridad</a:t>
-                      </a:r>
-                    </a:p>
-                    <a:p>
-                      <a:pPr marL="457200" lvl="1" algn="l" rtl="0" eaLnBrk="1" latinLnBrk="0" hangingPunct="1">
-                        <a:buFontTx/>
-                        <a:buBlip>
-                          <a:blip r:embed="rId3"/>
-                        </a:buBlip>
-                      </a:pPr>
-                      <a:r>
-                        <a:rPr kumimoji="0" lang="es-AR" sz="2000" kern="1200" dirty="0" smtClean="0">
-                          <a:solidFill>
-                            <a:schemeClr val="dk1"/>
-                          </a:solidFill>
-                          <a:latin typeface="Century Gothic" pitchFamily="34" charset="0"/>
-                          <a:ea typeface="+mn-ea"/>
-                          <a:cs typeface="+mn-cs"/>
-                        </a:rPr>
-                        <a:t>    Puede delegar o cambiar responsabilidades de las gerencias.</a:t>
+                        <a:t>   Puede delegar o cambiar responsabilidades de las gerencias.</a:t>
                       </a:r>
                     </a:p>
                     <a:p>
                       <a:pPr marL="0" algn="l" rtl="0" eaLnBrk="1" latinLnBrk="0" hangingPunct="1">
                         <a:buFontTx/>
                         <a:buBlip>
-                          <a:blip r:embed="rId2"/>
+                          <a:blip r:embed="rId4"/>
                         </a:buBlip>
                       </a:pPr>
                       <a:endParaRPr kumimoji="0" lang="es-AR" sz="2000" kern="1200" dirty="0" smtClean="0">
@@ -9828,24 +9843,22 @@
                     <a:bodyPr/>
                     <a:lstStyle/>
                     <a:p>
-                      <a:pPr>
-                        <a:buFontTx/>
-                        <a:buBlip>
-                          <a:blip r:embed="rId2"/>
-                        </a:buBlip>
+                      <a:pPr algn="r">
+                        <a:buFont typeface="Arial" pitchFamily="34" charset="0"/>
+                        <a:buNone/>
                       </a:pPr>
                       <a:r>
                         <a:rPr lang="es-AR" sz="2000" u="sng" dirty="0" smtClean="0">
                           <a:latin typeface="Century Gothic" pitchFamily="34" charset="0"/>
                         </a:rPr>
-                        <a:t> Función</a:t>
+                        <a:t> </a:t>
                       </a:r>
                     </a:p>
                     <a:p>
                       <a:pPr marL="457200" lvl="1" algn="l" rtl="0" eaLnBrk="1" latinLnBrk="0" hangingPunct="1">
                         <a:buFontTx/>
                         <a:buBlip>
-                          <a:blip r:embed="rId3"/>
+                          <a:blip r:embed="rId2"/>
                         </a:buBlip>
                       </a:pPr>
                       <a:r>
@@ -9868,7 +9881,7 @@
                       <a:pPr marL="457200" lvl="1" algn="l" rtl="0" eaLnBrk="1" latinLnBrk="0" hangingPunct="1">
                         <a:buFontTx/>
                         <a:buBlip>
-                          <a:blip r:embed="rId3"/>
+                          <a:blip r:embed="rId2"/>
                         </a:buBlip>
                       </a:pPr>
                       <a:r>
@@ -9882,7 +9895,7 @@
                       <a:pPr marL="457200" lvl="1" algn="l" rtl="0" eaLnBrk="1" latinLnBrk="0" hangingPunct="1">
                         <a:buFontTx/>
                         <a:buBlip>
-                          <a:blip r:embed="rId3"/>
+                          <a:blip r:embed="rId2"/>
                         </a:buBlip>
                       </a:pPr>
                       <a:r>
@@ -9896,7 +9909,7 @@
                       <a:pPr lvl="1">
                         <a:buFontTx/>
                         <a:buBlip>
-                          <a:blip r:embed="rId4"/>
+                          <a:blip r:embed="rId3"/>
                         </a:buBlip>
                       </a:pPr>
                       <a:endParaRPr lang="es-AR" sz="2000" dirty="0">
@@ -9914,10 +9927,8 @@
                     <a:lstStyle/>
                     <a:p>
                       <a:pPr marL="0" algn="l" rtl="0" eaLnBrk="1" latinLnBrk="0" hangingPunct="1">
-                        <a:buFontTx/>
-                        <a:buBlip>
-                          <a:blip r:embed="rId2"/>
-                        </a:buBlip>
+                        <a:buFont typeface="Arial" pitchFamily="34" charset="0"/>
+                        <a:buNone/>
                       </a:pPr>
                       <a:r>
                         <a:rPr kumimoji="0" lang="es-AR" sz="2000" kern="1200" dirty="0" smtClean="0">
@@ -9930,23 +9941,20 @@
                         </a:rPr>
                         <a:t> </a:t>
                       </a:r>
-                      <a:r>
-                        <a:rPr kumimoji="0" lang="es-AR" sz="2000" u="sng" kern="1200" dirty="0" smtClean="0">
-                          <a:solidFill>
-                            <a:schemeClr val="dk1"/>
-                          </a:solidFill>
-                          <a:latin typeface="Century Gothic" pitchFamily="34" charset="0"/>
-                          <a:ea typeface="+mn-ea"/>
-                          <a:cs typeface="+mn-cs"/>
-                        </a:rPr>
-                        <a:t>Responsabilidad</a:t>
-                      </a:r>
+                      <a:endParaRPr kumimoji="0" lang="es-AR" sz="2000" u="sng" kern="1200" dirty="0" smtClean="0">
+                        <a:solidFill>
+                          <a:schemeClr val="dk1"/>
+                        </a:solidFill>
+                        <a:latin typeface="Century Gothic" pitchFamily="34" charset="0"/>
+                        <a:ea typeface="+mn-ea"/>
+                        <a:cs typeface="+mn-cs"/>
+                      </a:endParaRPr>
                     </a:p>
                     <a:p>
                       <a:pPr marL="457200" lvl="1" algn="l" rtl="0" eaLnBrk="1" latinLnBrk="0" hangingPunct="1">
                         <a:buFontTx/>
                         <a:buBlip>
-                          <a:blip r:embed="rId3"/>
+                          <a:blip r:embed="rId2"/>
                         </a:buBlip>
                       </a:pPr>
                       <a:r>
@@ -9965,7 +9973,7 @@
                       <a:pPr marL="457200" lvl="1" algn="l" rtl="0" eaLnBrk="1" latinLnBrk="0" hangingPunct="1">
                         <a:buFontTx/>
                         <a:buBlip>
-                          <a:blip r:embed="rId3"/>
+                          <a:blip r:embed="rId2"/>
                         </a:buBlip>
                       </a:pPr>
                       <a:r>
@@ -9984,7 +9992,7 @@
                       <a:pPr marL="457200" lvl="1" algn="l" rtl="0" eaLnBrk="1" latinLnBrk="0" hangingPunct="1">
                         <a:buFontTx/>
                         <a:buBlip>
-                          <a:blip r:embed="rId3"/>
+                          <a:blip r:embed="rId2"/>
                         </a:buBlip>
                       </a:pPr>
                       <a:endParaRPr kumimoji="0" lang="es-AR" sz="2000" kern="1200" dirty="0" smtClean="0">
@@ -10007,10 +10015,8 @@
                     <a:lstStyle/>
                     <a:p>
                       <a:pPr marL="0" algn="l" rtl="0" eaLnBrk="1" latinLnBrk="0" hangingPunct="1">
-                        <a:buFontTx/>
-                        <a:buBlip>
-                          <a:blip r:embed="rId2"/>
-                        </a:buBlip>
+                        <a:buFont typeface="Arial" pitchFamily="34" charset="0"/>
+                        <a:buNone/>
                       </a:pPr>
                       <a:r>
                         <a:rPr kumimoji="0" lang="es-AR" sz="2000" kern="1200" dirty="0" smtClean="0">
@@ -10023,23 +10029,20 @@
                         </a:rPr>
                         <a:t> </a:t>
                       </a:r>
-                      <a:r>
-                        <a:rPr kumimoji="0" lang="es-AR" sz="2000" u="sng" kern="1200" dirty="0" smtClean="0">
-                          <a:solidFill>
-                            <a:schemeClr val="dk1"/>
-                          </a:solidFill>
-                          <a:latin typeface="Century Gothic" pitchFamily="34" charset="0"/>
-                          <a:ea typeface="+mn-ea"/>
-                          <a:cs typeface="+mn-cs"/>
-                        </a:rPr>
-                        <a:t>Autoridad</a:t>
-                      </a:r>
+                      <a:endParaRPr kumimoji="0" lang="es-AR" sz="2000" u="sng" kern="1200" dirty="0" smtClean="0">
+                        <a:solidFill>
+                          <a:schemeClr val="dk1"/>
+                        </a:solidFill>
+                        <a:latin typeface="Century Gothic" pitchFamily="34" charset="0"/>
+                        <a:ea typeface="+mn-ea"/>
+                        <a:cs typeface="+mn-cs"/>
+                      </a:endParaRPr>
                     </a:p>
                     <a:p>
                       <a:pPr marL="457200" lvl="1" algn="l" rtl="0" eaLnBrk="1" latinLnBrk="0" hangingPunct="1">
                         <a:buFontTx/>
                         <a:buBlip>
-                          <a:blip r:embed="rId3"/>
+                          <a:blip r:embed="rId2"/>
                         </a:buBlip>
                       </a:pPr>
                       <a:r>
@@ -10077,7 +10080,7 @@
                       <a:pPr marL="0" algn="l" rtl="0" eaLnBrk="1" latinLnBrk="0" hangingPunct="1">
                         <a:buFontTx/>
                         <a:buBlip>
-                          <a:blip r:embed="rId2"/>
+                          <a:blip r:embed="rId4"/>
                         </a:buBlip>
                       </a:pPr>
                       <a:endParaRPr kumimoji="0" lang="es-AR" sz="2000" kern="1200" dirty="0" smtClean="0">
@@ -10212,12 +10215,9 @@
                           <a:blip r:embed="rId2"/>
                         </a:buBlip>
                       </a:pPr>
-                      <a:r>
-                        <a:rPr lang="es-AR" sz="2000" u="sng" dirty="0" smtClean="0">
-                          <a:latin typeface="Century Gothic" pitchFamily="34" charset="0"/>
-                        </a:rPr>
-                        <a:t> Función</a:t>
-                      </a:r>
+                      <a:endParaRPr lang="es-AR" sz="2000" u="sng" dirty="0" smtClean="0">
+                        <a:latin typeface="Century Gothic" pitchFamily="34" charset="0"/>
+                      </a:endParaRPr>
                     </a:p>
                     <a:p>
                       <a:pPr marL="457200" lvl="1" algn="l" rtl="0" eaLnBrk="1" latinLnBrk="0" hangingPunct="1">
@@ -10307,28 +10307,14 @@
                           <a:blip r:embed="rId2"/>
                         </a:buBlip>
                       </a:pPr>
-                      <a:r>
-                        <a:rPr kumimoji="0" lang="es-AR" sz="2000" kern="1200" dirty="0" smtClean="0">
-                          <a:solidFill>
-                            <a:schemeClr val="dk1"/>
-                          </a:solidFill>
-                          <a:latin typeface="Century Gothic" pitchFamily="34" charset="0"/>
-                          <a:ea typeface="+mn-ea"/>
-                          <a:cs typeface="+mn-cs"/>
-                        </a:rPr>
-                        <a:t> </a:t>
-                      </a:r>
-                      <a:r>
-                        <a:rPr kumimoji="0" lang="es-AR" sz="2000" u="sng" kern="1200" dirty="0" smtClean="0">
-                          <a:solidFill>
-                            <a:schemeClr val="dk1"/>
-                          </a:solidFill>
-                          <a:latin typeface="Century Gothic" pitchFamily="34" charset="0"/>
-                          <a:ea typeface="+mn-ea"/>
-                          <a:cs typeface="+mn-cs"/>
-                        </a:rPr>
-                        <a:t>Responsabilidad</a:t>
-                      </a:r>
+                      <a:endParaRPr kumimoji="0" lang="es-AR" sz="2000" u="sng" kern="1200" dirty="0" smtClean="0">
+                        <a:solidFill>
+                          <a:schemeClr val="dk1"/>
+                        </a:solidFill>
+                        <a:latin typeface="Century Gothic" pitchFamily="34" charset="0"/>
+                        <a:ea typeface="+mn-ea"/>
+                        <a:cs typeface="+mn-cs"/>
+                      </a:endParaRPr>
                     </a:p>
                     <a:p>
                       <a:pPr marL="457200" lvl="1" algn="l" rtl="0" eaLnBrk="1" latinLnBrk="0" hangingPunct="1">
@@ -10441,28 +10427,14 @@
                           <a:blip r:embed="rId2"/>
                         </a:buBlip>
                       </a:pPr>
-                      <a:r>
-                        <a:rPr kumimoji="0" lang="es-AR" sz="2000" kern="1200" dirty="0" smtClean="0">
-                          <a:solidFill>
-                            <a:schemeClr val="dk1"/>
-                          </a:solidFill>
-                          <a:latin typeface="Century Gothic" pitchFamily="34" charset="0"/>
-                          <a:ea typeface="+mn-ea"/>
-                          <a:cs typeface="+mn-cs"/>
-                        </a:rPr>
-                        <a:t> </a:t>
-                      </a:r>
-                      <a:r>
-                        <a:rPr kumimoji="0" lang="es-AR" sz="2000" u="sng" kern="1200" dirty="0" smtClean="0">
-                          <a:solidFill>
-                            <a:schemeClr val="dk1"/>
-                          </a:solidFill>
-                          <a:latin typeface="Century Gothic" pitchFamily="34" charset="0"/>
-                          <a:ea typeface="+mn-ea"/>
-                          <a:cs typeface="+mn-cs"/>
-                        </a:rPr>
-                        <a:t>Autoridad</a:t>
-                      </a:r>
+                      <a:endParaRPr kumimoji="0" lang="es-AR" sz="2000" u="sng" kern="1200" dirty="0" smtClean="0">
+                        <a:solidFill>
+                          <a:schemeClr val="dk1"/>
+                        </a:solidFill>
+                        <a:latin typeface="Century Gothic" pitchFamily="34" charset="0"/>
+                        <a:ea typeface="+mn-ea"/>
+                        <a:cs typeface="+mn-cs"/>
+                      </a:endParaRPr>
                     </a:p>
                     <a:p>
                       <a:pPr marL="457200" lvl="1" algn="l" rtl="0" eaLnBrk="1" latinLnBrk="0" hangingPunct="1">
@@ -10637,22 +10609,17 @@
                     <a:p>
                       <a:pPr>
                         <a:buFontTx/>
-                        <a:buBlip>
-                          <a:blip r:embed="rId2"/>
-                        </a:buBlip>
+                        <a:buNone/>
                       </a:pPr>
-                      <a:r>
-                        <a:rPr lang="es-AR" sz="2000" u="sng" dirty="0" smtClean="0">
-                          <a:latin typeface="Century Gothic" pitchFamily="34" charset="0"/>
-                        </a:rPr>
-                        <a:t> Función</a:t>
-                      </a:r>
+                      <a:endParaRPr lang="es-AR" sz="2000" u="sng" dirty="0" smtClean="0">
+                        <a:latin typeface="Century Gothic" pitchFamily="34" charset="0"/>
+                      </a:endParaRPr>
                     </a:p>
                     <a:p>
                       <a:pPr marL="457200" lvl="1" algn="l" rtl="0" eaLnBrk="1" latinLnBrk="0" hangingPunct="1">
                         <a:buFontTx/>
                         <a:buBlip>
-                          <a:blip r:embed="rId3"/>
+                          <a:blip r:embed="rId2"/>
                         </a:buBlip>
                       </a:pPr>
                       <a:r>
@@ -10690,7 +10657,7 @@
                       <a:pPr lvl="1">
                         <a:buFontTx/>
                         <a:buBlip>
-                          <a:blip r:embed="rId3"/>
+                          <a:blip r:embed="rId2"/>
                         </a:buBlip>
                       </a:pPr>
                       <a:r>
@@ -10704,7 +10671,7 @@
                       <a:pPr lvl="1">
                         <a:buFontTx/>
                         <a:buBlip>
-                          <a:blip r:embed="rId3"/>
+                          <a:blip r:embed="rId2"/>
                         </a:buBlip>
                       </a:pPr>
                       <a:endParaRPr lang="es-AR" sz="2000" dirty="0">
@@ -10724,37 +10691,23 @@
                       <a:pPr marL="0" algn="l" rtl="0" eaLnBrk="1" latinLnBrk="0" hangingPunct="1">
                         <a:buFontTx/>
                         <a:buBlip>
-                          <a:blip r:embed="rId2"/>
+                          <a:blip r:embed="rId3"/>
                         </a:buBlip>
                       </a:pPr>
-                      <a:r>
-                        <a:rPr kumimoji="0" lang="es-AR" sz="2000" kern="1200" dirty="0" smtClean="0">
-                          <a:solidFill>
-                            <a:schemeClr val="dk1"/>
-                          </a:solidFill>
-                          <a:latin typeface="Century Gothic" pitchFamily="34" charset="0"/>
-                          <a:ea typeface="+mn-ea"/>
-                          <a:cs typeface="+mn-cs"/>
-                        </a:rPr>
-                        <a:t> </a:t>
-                      </a:r>
-                      <a:r>
-                        <a:rPr kumimoji="0" lang="es-AR" sz="2000" u="sng" kern="1200" dirty="0" smtClean="0">
-                          <a:solidFill>
-                            <a:schemeClr val="dk1"/>
-                          </a:solidFill>
-                          <a:latin typeface="Century Gothic" pitchFamily="34" charset="0"/>
-                          <a:ea typeface="+mn-ea"/>
-                          <a:cs typeface="+mn-cs"/>
-                        </a:rPr>
-                        <a:t>Responsabilidad</a:t>
-                      </a:r>
+                      <a:endParaRPr kumimoji="0" lang="es-AR" sz="2000" u="sng" kern="1200" dirty="0" smtClean="0">
+                        <a:solidFill>
+                          <a:schemeClr val="dk1"/>
+                        </a:solidFill>
+                        <a:latin typeface="Century Gothic" pitchFamily="34" charset="0"/>
+                        <a:ea typeface="+mn-ea"/>
+                        <a:cs typeface="+mn-cs"/>
+                      </a:endParaRPr>
                     </a:p>
                     <a:p>
                       <a:pPr marL="457200" lvl="1" algn="l" rtl="0" eaLnBrk="1" latinLnBrk="0" hangingPunct="1">
                         <a:buFontTx/>
                         <a:buBlip>
-                          <a:blip r:embed="rId3"/>
+                          <a:blip r:embed="rId2"/>
                         </a:buBlip>
                       </a:pPr>
                       <a:r>
@@ -10792,7 +10745,7 @@
                       <a:pPr marL="457200" lvl="1" algn="l" rtl="0" eaLnBrk="1" latinLnBrk="0" hangingPunct="1">
                         <a:buFontTx/>
                         <a:buBlip>
-                          <a:blip r:embed="rId3"/>
+                          <a:blip r:embed="rId2"/>
                         </a:buBlip>
                       </a:pPr>
                       <a:r>
@@ -10811,7 +10764,7 @@
                       <a:pPr marL="457200" lvl="1" algn="l" rtl="0" eaLnBrk="1" latinLnBrk="0" hangingPunct="1">
                         <a:buFontTx/>
                         <a:buBlip>
-                          <a:blip r:embed="rId3"/>
+                          <a:blip r:embed="rId2"/>
                         </a:buBlip>
                       </a:pPr>
                       <a:endParaRPr kumimoji="0" lang="es-AR" sz="2000" kern="1200" dirty="0" smtClean="0">
@@ -10836,37 +10789,23 @@
                       <a:pPr marL="0" algn="l" rtl="0" eaLnBrk="1" latinLnBrk="0" hangingPunct="1">
                         <a:buFontTx/>
                         <a:buBlip>
-                          <a:blip r:embed="rId2"/>
+                          <a:blip r:embed="rId3"/>
                         </a:buBlip>
                       </a:pPr>
-                      <a:r>
-                        <a:rPr kumimoji="0" lang="es-AR" sz="2000" kern="1200" dirty="0" smtClean="0">
-                          <a:solidFill>
-                            <a:schemeClr val="dk1"/>
-                          </a:solidFill>
-                          <a:latin typeface="Century Gothic" pitchFamily="34" charset="0"/>
-                          <a:ea typeface="+mn-ea"/>
-                          <a:cs typeface="+mn-cs"/>
-                        </a:rPr>
-                        <a:t> </a:t>
-                      </a:r>
-                      <a:r>
-                        <a:rPr kumimoji="0" lang="es-AR" sz="2000" u="sng" kern="1200" dirty="0" smtClean="0">
-                          <a:solidFill>
-                            <a:schemeClr val="dk1"/>
-                          </a:solidFill>
-                          <a:latin typeface="Century Gothic" pitchFamily="34" charset="0"/>
-                          <a:ea typeface="+mn-ea"/>
-                          <a:cs typeface="+mn-cs"/>
-                        </a:rPr>
-                        <a:t>Autoridad</a:t>
-                      </a:r>
+                      <a:endParaRPr kumimoji="0" lang="es-AR" sz="2000" u="sng" kern="1200" dirty="0" smtClean="0">
+                        <a:solidFill>
+                          <a:schemeClr val="dk1"/>
+                        </a:solidFill>
+                        <a:latin typeface="Century Gothic" pitchFamily="34" charset="0"/>
+                        <a:ea typeface="+mn-ea"/>
+                        <a:cs typeface="+mn-cs"/>
+                      </a:endParaRPr>
                     </a:p>
                     <a:p>
                       <a:pPr marL="457200" lvl="1" algn="l" rtl="0" eaLnBrk="1" latinLnBrk="0" hangingPunct="1">
                         <a:buFontTx/>
                         <a:buBlip>
-                          <a:blip r:embed="rId3"/>
+                          <a:blip r:embed="rId2"/>
                         </a:buBlip>
                       </a:pPr>
                       <a:r>
@@ -10896,7 +10835,7 @@
                       <a:pPr marL="457200" lvl="1" algn="l" rtl="0" eaLnBrk="1" latinLnBrk="0" hangingPunct="1">
                         <a:buFontTx/>
                         <a:buBlip>
-                          <a:blip r:embed="rId3"/>
+                          <a:blip r:embed="rId2"/>
                         </a:buBlip>
                       </a:pPr>
                       <a:r>
@@ -10923,7 +10862,7 @@
                       <a:pPr marL="0" algn="l" rtl="0" eaLnBrk="1" latinLnBrk="0" hangingPunct="1">
                         <a:buFontTx/>
                         <a:buBlip>
-                          <a:blip r:embed="rId2"/>
+                          <a:blip r:embed="rId3"/>
                         </a:buBlip>
                       </a:pPr>
                       <a:endParaRPr kumimoji="0" lang="es-AR" sz="2000" kern="1200" dirty="0" smtClean="0">
@@ -11035,7 +10974,7 @@
         </p:nvGraphicFramePr>
         <p:xfrm>
           <a:off x="1691680" y="2420888"/>
-          <a:ext cx="7128792" cy="3840480"/>
+          <a:ext cx="7128792" cy="4114800"/>
         </p:xfrm>
         <a:graphic>
           <a:graphicData uri="http://schemas.openxmlformats.org/drawingml/2006/table">
@@ -11058,11 +10997,49 @@
                           <a:blip r:embed="rId2"/>
                         </a:buBlip>
                       </a:pPr>
+                      <a:endParaRPr lang="es-AR" sz="2400" u="sng" dirty="0" smtClean="0">
+                        <a:latin typeface="Century Gothic" pitchFamily="34" charset="0"/>
+                      </a:endParaRPr>
+                    </a:p>
+                    <a:p>
+                      <a:pPr marL="457200" lvl="1" algn="l" rtl="0" eaLnBrk="1" latinLnBrk="0" hangingPunct="1">
+                        <a:buFontTx/>
+                        <a:buBlip>
+                          <a:blip r:embed="rId3"/>
+                        </a:buBlip>
+                      </a:pPr>
                       <a:r>
-                        <a:rPr lang="es-AR" sz="2000" u="sng" dirty="0" smtClean="0">
+                        <a:rPr kumimoji="0" lang="es-AR" sz="2400" kern="1200" dirty="0" smtClean="0">
+                          <a:solidFill>
+                            <a:schemeClr val="dk1"/>
+                          </a:solidFill>
                           <a:latin typeface="Century Gothic" pitchFamily="34" charset="0"/>
+                          <a:ea typeface="+mn-ea"/>
+                          <a:cs typeface="+mn-cs"/>
                         </a:rPr>
-                        <a:t> Función</a:t>
+                        <a:t>  </a:t>
+                      </a:r>
+                      <a:r>
+                        <a:rPr kumimoji="0" lang="es-AR" sz="2000" kern="1200" dirty="0" smtClean="0">
+                          <a:solidFill>
+                            <a:schemeClr val="dk1"/>
+                          </a:solidFill>
+                          <a:latin typeface="Century Gothic" pitchFamily="34" charset="0"/>
+                          <a:ea typeface="+mn-ea"/>
+                          <a:cs typeface="+mn-cs"/>
+                        </a:rPr>
+                        <a:t>Llevar a cabo los</a:t>
+                      </a:r>
+                      <a:r>
+                        <a:rPr kumimoji="0" lang="es-AR" sz="2000" kern="1200" baseline="0" dirty="0" smtClean="0">
+                          <a:solidFill>
+                            <a:schemeClr val="dk1"/>
+                          </a:solidFill>
+                          <a:latin typeface="Century Gothic" pitchFamily="34" charset="0"/>
+                          <a:ea typeface="+mn-ea"/>
+                          <a:cs typeface="+mn-cs"/>
+                        </a:rPr>
+                        <a:t> proyectos aprobados</a:t>
                       </a:r>
                     </a:p>
                     <a:p>
@@ -11081,50 +11058,9 @@
                           <a:ea typeface="+mn-ea"/>
                           <a:cs typeface="+mn-cs"/>
                         </a:rPr>
-                        <a:t>  </a:t>
-                      </a:r>
-                      <a:r>
-                        <a:rPr kumimoji="0" lang="es-AR" sz="1800" kern="1200" dirty="0" smtClean="0">
-                          <a:solidFill>
-                            <a:schemeClr val="dk1"/>
-                          </a:solidFill>
-                          <a:latin typeface="Century Gothic" pitchFamily="34" charset="0"/>
-                          <a:ea typeface="+mn-ea"/>
-                          <a:cs typeface="+mn-cs"/>
-                        </a:rPr>
-                        <a:t>Llevar a cabo los</a:t>
-                      </a:r>
-                      <a:r>
-                        <a:rPr kumimoji="0" lang="es-AR" sz="1800" kern="1200" baseline="0" dirty="0" smtClean="0">
-                          <a:solidFill>
-                            <a:schemeClr val="dk1"/>
-                          </a:solidFill>
-                          <a:latin typeface="Century Gothic" pitchFamily="34" charset="0"/>
-                          <a:ea typeface="+mn-ea"/>
-                          <a:cs typeface="+mn-cs"/>
-                        </a:rPr>
-                        <a:t> proyectos aprobados</a:t>
-                      </a:r>
-                    </a:p>
-                    <a:p>
-                      <a:pPr marL="457200" lvl="1" algn="l" rtl="0" eaLnBrk="1" latinLnBrk="0" hangingPunct="1">
-                        <a:buFontTx/>
-                        <a:buBlip>
-                          <a:blip r:embed="rId3"/>
-                        </a:buBlip>
-                      </a:pPr>
-                      <a:r>
-                        <a:rPr kumimoji="0" lang="es-AR" sz="1800" kern="1200" dirty="0" smtClean="0">
-                          <a:solidFill>
-                            <a:schemeClr val="dk1"/>
-                          </a:solidFill>
-                          <a:latin typeface="Century Gothic" pitchFamily="34" charset="0"/>
-                          <a:ea typeface="+mn-ea"/>
-                          <a:cs typeface="+mn-cs"/>
-                        </a:rPr>
                         <a:t>  Asegurar la provisión de insumos necesarios</a:t>
                       </a:r>
-                      <a:endParaRPr kumimoji="0" lang="es-AR" sz="2000" kern="1200" baseline="0" dirty="0" smtClean="0">
+                      <a:endParaRPr kumimoji="0" lang="es-AR" sz="2400" kern="1200" baseline="0" dirty="0" smtClean="0">
                         <a:solidFill>
                           <a:schemeClr val="dk1"/>
                         </a:solidFill>
@@ -11140,7 +11076,7 @@
                           <a:blip r:embed="rId3"/>
                         </a:buBlip>
                       </a:pPr>
-                      <a:endParaRPr lang="es-AR" sz="2000" dirty="0">
+                      <a:endParaRPr lang="es-AR" sz="2400" dirty="0">
                         <a:latin typeface="Century Gothic" pitchFamily="34" charset="0"/>
                       </a:endParaRPr>
                     </a:p>
@@ -11160,28 +11096,14 @@
                           <a:blip r:embed="rId2"/>
                         </a:buBlip>
                       </a:pPr>
-                      <a:r>
-                        <a:rPr kumimoji="0" lang="es-AR" sz="2000" kern="1200" dirty="0" smtClean="0">
-                          <a:solidFill>
-                            <a:schemeClr val="dk1"/>
-                          </a:solidFill>
-                          <a:latin typeface="Century Gothic" pitchFamily="34" charset="0"/>
-                          <a:ea typeface="+mn-ea"/>
-                          <a:cs typeface="+mn-cs"/>
-                        </a:rPr>
-                        <a:t> </a:t>
-                      </a:r>
-                      <a:r>
-                        <a:rPr kumimoji="0" lang="es-AR" sz="2000" u="sng" kern="1200" dirty="0" smtClean="0">
-                          <a:solidFill>
-                            <a:schemeClr val="dk1"/>
-                          </a:solidFill>
-                          <a:latin typeface="Century Gothic" pitchFamily="34" charset="0"/>
-                          <a:ea typeface="+mn-ea"/>
-                          <a:cs typeface="+mn-cs"/>
-                        </a:rPr>
-                        <a:t>Responsabilidad</a:t>
-                      </a:r>
+                      <a:endParaRPr kumimoji="0" lang="es-AR" sz="2400" u="sng" kern="1200" dirty="0" smtClean="0">
+                        <a:solidFill>
+                          <a:schemeClr val="dk1"/>
+                        </a:solidFill>
+                        <a:latin typeface="Century Gothic" pitchFamily="34" charset="0"/>
+                        <a:ea typeface="+mn-ea"/>
+                        <a:cs typeface="+mn-cs"/>
+                      </a:endParaRPr>
                     </a:p>
                     <a:p>
                       <a:pPr marL="457200" lvl="1" algn="l" rtl="0" eaLnBrk="1" latinLnBrk="0" hangingPunct="1">
@@ -11191,7 +11113,7 @@
                         </a:buBlip>
                       </a:pPr>
                       <a:r>
-                        <a:rPr kumimoji="0" lang="es-AR" sz="2000" kern="1200" dirty="0" smtClean="0">
+                        <a:rPr kumimoji="0" lang="es-AR" sz="2400" kern="1200" dirty="0" smtClean="0">
                           <a:solidFill>
                             <a:schemeClr val="dk1"/>
                           </a:solidFill>
@@ -11223,7 +11145,7 @@
                         </a:rPr>
                         <a:t> volúmenes de producción establecidos</a:t>
                       </a:r>
-                      <a:endParaRPr kumimoji="0" lang="es-AR" sz="1800" kern="1200" dirty="0" smtClean="0">
+                      <a:endParaRPr kumimoji="0" lang="es-AR" sz="2000" kern="1200" dirty="0" smtClean="0">
                         <a:solidFill>
                           <a:schemeClr val="dk1"/>
                         </a:solidFill>
@@ -11240,7 +11162,7 @@
                         </a:buBlip>
                       </a:pPr>
                       <a:r>
-                        <a:rPr kumimoji="0" lang="es-AR" sz="2000" kern="1200" dirty="0" smtClean="0">
+                        <a:rPr kumimoji="0" lang="es-AR" sz="2400" kern="1200" dirty="0" smtClean="0">
                           <a:solidFill>
                             <a:schemeClr val="dk1"/>
                           </a:solidFill>
@@ -11251,7 +11173,7 @@
                         <a:t> </a:t>
                       </a:r>
                       <a:r>
-                        <a:rPr kumimoji="0" lang="es-AR" sz="1800" kern="1200" dirty="0" smtClean="0">
+                        <a:rPr kumimoji="0" lang="es-AR" sz="2000" kern="1200" dirty="0" smtClean="0">
                           <a:solidFill>
                             <a:schemeClr val="dk1"/>
                           </a:solidFill>
@@ -11261,7 +11183,7 @@
                         </a:rPr>
                         <a:t> Cumplir con las normas de calidad</a:t>
                       </a:r>
-                      <a:endParaRPr kumimoji="0" lang="es-AR" sz="1800" u="none" kern="1200" baseline="0" dirty="0" smtClean="0">
+                      <a:endParaRPr kumimoji="0" lang="es-AR" sz="2000" u="none" kern="1200" baseline="0" dirty="0" smtClean="0">
                         <a:solidFill>
                           <a:schemeClr val="dk1"/>
                         </a:solidFill>
@@ -11277,7 +11199,7 @@
                           <a:blip r:embed="rId3"/>
                         </a:buBlip>
                       </a:pPr>
-                      <a:endParaRPr kumimoji="0" lang="es-AR" sz="2000" kern="1200" dirty="0" smtClean="0">
+                      <a:endParaRPr kumimoji="0" lang="es-AR" sz="2400" kern="1200" dirty="0" smtClean="0">
                         <a:solidFill>
                           <a:schemeClr val="dk1"/>
                         </a:solidFill>
@@ -11296,10 +11218,10 @@
                     <a:bodyPr/>
                     <a:lstStyle/>
                     <a:p>
-                      <a:pPr marL="0" algn="l" rtl="0" eaLnBrk="1" latinLnBrk="0" hangingPunct="1">
+                      <a:pPr marL="457200" lvl="1" algn="l" rtl="0" eaLnBrk="1" latinLnBrk="0" hangingPunct="1">
                         <a:buFontTx/>
                         <a:buBlip>
-                          <a:blip r:embed="rId2"/>
+                          <a:blip r:embed="rId3"/>
                         </a:buBlip>
                       </a:pPr>
                       <a:r>
@@ -11311,40 +11233,10 @@
                           <a:ea typeface="+mn-ea"/>
                           <a:cs typeface="+mn-cs"/>
                         </a:rPr>
-                        <a:t> </a:t>
-                      </a:r>
-                      <a:r>
-                        <a:rPr kumimoji="0" lang="es-AR" sz="2000" u="sng" kern="1200" dirty="0" smtClean="0">
-                          <a:solidFill>
-                            <a:schemeClr val="dk1"/>
-                          </a:solidFill>
-                          <a:latin typeface="Century Gothic" pitchFamily="34" charset="0"/>
-                          <a:ea typeface="+mn-ea"/>
-                          <a:cs typeface="+mn-cs"/>
-                        </a:rPr>
-                        <a:t>Autoridad</a:t>
-                      </a:r>
-                    </a:p>
-                    <a:p>
-                      <a:pPr marL="457200" lvl="1" algn="l" rtl="0" eaLnBrk="1" latinLnBrk="0" hangingPunct="1">
-                        <a:buFontTx/>
-                        <a:buBlip>
-                          <a:blip r:embed="rId3"/>
-                        </a:buBlip>
-                      </a:pPr>
-                      <a:r>
-                        <a:rPr kumimoji="0" lang="es-AR" sz="1800" kern="1200" dirty="0" smtClean="0">
-                          <a:solidFill>
-                            <a:schemeClr val="dk1"/>
-                          </a:solidFill>
-                          <a:latin typeface="Century Gothic" pitchFamily="34" charset="0"/>
-                          <a:ea typeface="+mn-ea"/>
-                          <a:cs typeface="+mn-cs"/>
-                        </a:rPr>
                         <a:t>    Exigir</a:t>
                       </a:r>
                       <a:r>
-                        <a:rPr kumimoji="0" lang="es-AR" sz="1800" kern="1200" baseline="0" dirty="0" smtClean="0">
+                        <a:rPr kumimoji="0" lang="es-AR" sz="2000" kern="1200" baseline="0" dirty="0" smtClean="0">
                           <a:solidFill>
                             <a:schemeClr val="dk1"/>
                           </a:solidFill>
@@ -11363,7 +11255,7 @@
                         </a:buBlip>
                       </a:pPr>
                       <a:r>
-                        <a:rPr kumimoji="0" lang="es-AR" sz="1800" kern="1200" baseline="0" dirty="0" smtClean="0">
+                        <a:rPr kumimoji="0" lang="es-AR" sz="2000" kern="1200" baseline="0" dirty="0" smtClean="0">
                           <a:solidFill>
                             <a:schemeClr val="dk1"/>
                           </a:solidFill>
@@ -11373,7 +11265,7 @@
                         </a:rPr>
                         <a:t>    Proponer cambios al sistema productivo</a:t>
                       </a:r>
-                      <a:endParaRPr kumimoji="0" lang="es-AR" sz="2000" kern="1200" dirty="0" smtClean="0">
+                      <a:endParaRPr kumimoji="0" lang="es-AR" sz="2400" kern="1200" dirty="0" smtClean="0">
                         <a:solidFill>
                           <a:schemeClr val="dk1"/>
                         </a:solidFill>
@@ -11389,7 +11281,7 @@
                           <a:blip r:embed="rId2"/>
                         </a:buBlip>
                       </a:pPr>
-                      <a:endParaRPr kumimoji="0" lang="es-AR" sz="2000" kern="1200" dirty="0" smtClean="0">
+                      <a:endParaRPr kumimoji="0" lang="es-AR" sz="2400" kern="1200" dirty="0" smtClean="0">
                         <a:solidFill>
                           <a:schemeClr val="dk1"/>
                         </a:solidFill>
@@ -11506,7 +11398,25 @@
               <a:rPr lang="es-AR" dirty="0" smtClean="0">
                 <a:latin typeface="Gill Sans MT" pitchFamily="18"/>
               </a:rPr>
-              <a:t> a los efectos de ocuparse de todo lo relacionado con Imagen y Comunicación en Argentina en la instalación de 200 locales de 2500 m</a:t>
+              <a:t> a los efectos de ocuparse de todo lo relacionado con Imagen y Comunicación en Argentina en la instalación de 200 locales </a:t>
+            </a:r>
+            <a:r>
+              <a:rPr lang="es-AR" smtClean="0">
+                <a:latin typeface="Gill Sans MT" pitchFamily="18"/>
+              </a:rPr>
+              <a:t>de </a:t>
+            </a:r>
+            <a:r>
+              <a:rPr lang="es-AR" smtClean="0">
+                <a:latin typeface="Gill Sans MT" pitchFamily="18"/>
+              </a:rPr>
+              <a:t>1500 </a:t>
+            </a:r>
+            <a:r>
+              <a:rPr lang="es-AR" dirty="0" smtClean="0">
+                <a:latin typeface="Gill Sans MT" pitchFamily="18"/>
+              </a:rPr>
+              <a:t>m</a:t>
             </a:r>
             <a:r>
               <a:rPr lang="es-AR" baseline="30000" dirty="0" smtClean="0">
@@ -11518,13 +11428,7 @@
               <a:rPr lang="es-AR" dirty="0" smtClean="0">
                 <a:latin typeface="Gill Sans MT" pitchFamily="18"/>
               </a:rPr>
-              <a:t> cada uno en diferentes provincias del país</a:t>
-            </a:r>
-            <a:r>
-              <a:rPr lang="es-AR" dirty="0" smtClean="0">
-                <a:latin typeface="Gill Sans MT" pitchFamily="18"/>
-              </a:rPr>
-              <a:t>.</a:t>
+              <a:t> cada uno en diferentes provincias del país.</a:t>
             </a:r>
           </a:p>
           <a:p>
@@ -11540,13 +11444,7 @@
               <a:rPr lang="es-AR" dirty="0" smtClean="0">
                 <a:latin typeface="Gill Sans MT" pitchFamily="18"/>
               </a:rPr>
-              <a:t> </a:t>
-            </a:r>
-            <a:r>
-              <a:rPr lang="es-AR" dirty="0" smtClean="0">
-                <a:latin typeface="Gill Sans MT" pitchFamily="18"/>
-              </a:rPr>
-              <a:t>¿Cómo adecuaría la estructura de la empresa para atender esta solicitud a lo largo de 5 años, siendo que los diseños de los productos deben ser novedosos?</a:t>
+              <a:t> ¿Cómo adecuaría la estructura de la empresa para atender esta solicitud a lo largo de 5 años, siendo que los diseños de los productos deben ser novedosos?</a:t>
             </a:r>
             <a:endParaRPr lang="es-AR" dirty="0">
               <a:latin typeface="Gill Sans MT" pitchFamily="18"/>
@@ -11644,13 +11542,8 @@
           <a:p>
             <a:r>
               <a:rPr lang="es-AR" dirty="0" smtClean="0"/>
-              <a:t>Aumentar </a:t>
-            </a:r>
-            <a:r>
-              <a:rPr lang="es-AR" dirty="0" smtClean="0"/>
-              <a:t>Stock</a:t>
-            </a:r>
-            <a:endParaRPr lang="es-AR" dirty="0" smtClean="0"/>
+              <a:t>Aumentar Stock</a:t>
+            </a:r>
           </a:p>
           <a:p>
             <a:r>
@@ -11662,13 +11555,8 @@
           <a:p>
             <a:r>
               <a:rPr lang="es-AR" dirty="0" smtClean="0"/>
-              <a:t>Contratar </a:t>
-            </a:r>
-            <a:r>
-              <a:rPr lang="es-AR" dirty="0" smtClean="0"/>
-              <a:t>Asesoría</a:t>
-            </a:r>
-            <a:endParaRPr lang="es-AR" dirty="0" smtClean="0"/>
+              <a:t>Contratar Asesoría</a:t>
+            </a:r>
           </a:p>
           <a:p>
             <a:r>
@@ -11685,11 +11573,11 @@
           <a:p>
             <a:r>
               <a:rPr lang="es-AR" dirty="0" smtClean="0"/>
-              <a:t>Crear </a:t>
+              <a:t>Crear nuevas áreas y </a:t>
             </a:r>
             <a:r>
               <a:rPr lang="es-AR" smtClean="0"/>
-              <a:t>nuevas áreas.</a:t>
+              <a:t>agrandar existentes</a:t>
             </a:r>
             <a:endParaRPr lang="es-AR" dirty="0" smtClean="0"/>
           </a:p>
@@ -12277,7 +12165,7 @@
         </p:spPr>
         <p:txBody>
           <a:bodyPr>
-            <a:normAutofit lnSpcReduction="10000"/>
+            <a:normAutofit/>
           </a:bodyPr>
           <a:lstStyle/>
           <a:p>
@@ -12324,37 +12212,32 @@
             <a:pPr lvl="1"/>
             <a:r>
               <a:rPr lang="es-AR" dirty="0" smtClean="0"/>
-              <a:t> </a:t>
-            </a:r>
+              <a:t> provee todo el mobiliario para los locales.</a:t>
+            </a:r>
+          </a:p>
+          <a:p>
+            <a:pPr lvl="1"/>
             <a:r>
               <a:rPr lang="es-AR" dirty="0" smtClean="0"/>
-              <a:t>provee todo el mobiliario para los locales.</a:t>
-            </a:r>
+              <a:t> realiza los diseños propuestos por </a:t>
+            </a:r>
+            <a:r>
+              <a:rPr lang="es-AR" dirty="0" err="1" smtClean="0"/>
+              <a:t>Nike</a:t>
+            </a:r>
+            <a:r>
+              <a:rPr lang="es-AR" dirty="0" smtClean="0"/>
+              <a:t>.</a:t>
+            </a:r>
+          </a:p>
+          <a:p>
             <a:endParaRPr lang="es-AR" dirty="0" smtClean="0"/>
           </a:p>
           <a:p>
-            <a:endParaRPr lang="es-AR" dirty="0" smtClean="0"/>
-          </a:p>
-          <a:p>
             <a:r>
               <a:rPr lang="es-AR" dirty="0" smtClean="0"/>
-              <a:t>45 </a:t>
-            </a:r>
-            <a:r>
-              <a:rPr lang="es-AR" dirty="0" smtClean="0"/>
-              <a:t>Personas</a:t>
-            </a:r>
-            <a:endParaRPr lang="es-AR" dirty="0" smtClean="0"/>
-          </a:p>
-          <a:p>
-            <a:endParaRPr lang="es-AR" dirty="0" smtClean="0"/>
-          </a:p>
-          <a:p>
-            <a:r>
-              <a:rPr lang="es-AR" dirty="0" smtClean="0"/>
-              <a:t>Poco estructurada.</a:t>
-            </a:r>
-            <a:endParaRPr lang="es-AR" dirty="0" smtClean="0"/>
+              <a:t>45 Personas</a:t>
+            </a:r>
           </a:p>
           <a:p>
             <a:endParaRPr lang="es-AR" dirty="0" smtClean="0"/>
@@ -12445,19 +12328,7 @@
           <a:p>
             <a:r>
               <a:rPr lang="es-AR" dirty="0" smtClean="0"/>
-              <a:t>Comienzos </a:t>
-            </a:r>
-            <a:r>
-              <a:rPr lang="es-AR" dirty="0" smtClean="0"/>
-              <a:t>en </a:t>
-            </a:r>
-            <a:r>
-              <a:rPr lang="es-AR" dirty="0" smtClean="0"/>
-              <a:t>el año </a:t>
-            </a:r>
-            <a:r>
-              <a:rPr lang="es-AR" dirty="0" smtClean="0"/>
-              <a:t>1992</a:t>
+              <a:t>Comienzos en el año 1992</a:t>
             </a:r>
           </a:p>
           <a:p>
@@ -12466,7 +12337,6 @@
               <a:rPr lang="es-AR" dirty="0" smtClean="0"/>
               <a:t>Empresa unipersonal de exhibidores </a:t>
             </a:r>
-            <a:endParaRPr lang="es-AR" dirty="0" smtClean="0"/>
           </a:p>
           <a:p>
             <a:endParaRPr lang="es-AR" dirty="0" smtClean="0"/>
@@ -12495,19 +12365,7 @@
           <a:p>
             <a:r>
               <a:rPr lang="es-AR" dirty="0" smtClean="0"/>
-              <a:t> </a:t>
-            </a:r>
-            <a:r>
-              <a:rPr lang="es-AR" dirty="0" smtClean="0"/>
-              <a:t>Expansión por</a:t>
-            </a:r>
-            <a:r>
-              <a:rPr lang="es-AR" dirty="0" smtClean="0"/>
-              <a:t> </a:t>
-            </a:r>
-            <a:r>
-              <a:rPr lang="es-AR" dirty="0" smtClean="0"/>
-              <a:t>Latinoamérica</a:t>
+              <a:t> Expansión por Latinoamérica</a:t>
             </a:r>
           </a:p>
           <a:p>

</xml_diff>

<commit_message>
fin de la presentacion
</commit_message>
<xml_diff>
--- a/Presentacion/Presentacion.pptx
+++ b/Presentacion/Presentacion.pptx
@@ -5,7 +5,7 @@
     <p:sldMasterId id="2147483816" r:id="rId1"/>
   </p:sldMasterIdLst>
   <p:notesMasterIdLst>
-    <p:notesMasterId r:id="rId24"/>
+    <p:notesMasterId r:id="rId31"/>
   </p:notesMasterIdLst>
   <p:sldIdLst>
     <p:sldId id="258" r:id="rId2"/>
@@ -27,9 +27,16 @@
     <p:sldId id="274" r:id="rId18"/>
     <p:sldId id="263" r:id="rId19"/>
     <p:sldId id="270" r:id="rId20"/>
-    <p:sldId id="271" r:id="rId21"/>
-    <p:sldId id="277" r:id="rId22"/>
-    <p:sldId id="269" r:id="rId23"/>
+    <p:sldId id="279" r:id="rId21"/>
+    <p:sldId id="284" r:id="rId22"/>
+    <p:sldId id="283" r:id="rId23"/>
+    <p:sldId id="282" r:id="rId24"/>
+    <p:sldId id="281" r:id="rId25"/>
+    <p:sldId id="280" r:id="rId26"/>
+    <p:sldId id="285" r:id="rId27"/>
+    <p:sldId id="271" r:id="rId28"/>
+    <p:sldId id="277" r:id="rId29"/>
+    <p:sldId id="269" r:id="rId30"/>
   </p:sldIdLst>
   <p:sldSz cx="9144000" cy="6858000" type="screen4x3"/>
   <p:notesSz cx="6858000" cy="9144000"/>
@@ -4643,7 +4650,7 @@
             <a:fld id="{F7EC247D-ED8B-45CF-B553-37729D048AD6}" type="datetimeFigureOut">
               <a:rPr lang="es-AR" smtClean="0"/>
               <a:pPr/>
-              <a:t>18/06/2011</a:t>
+              <a:t>22/06/2011</a:t>
             </a:fld>
             <a:endParaRPr lang="es-AR"/>
           </a:p>
@@ -5044,7 +5051,7 @@
             <a:fld id="{7C44809D-EF54-4966-A24E-C6C0F0B167CB}" type="datetimeFigureOut">
               <a:rPr lang="es-AR" smtClean="0"/>
               <a:pPr/>
-              <a:t>18/06/2011</a:t>
+              <a:t>22/06/2011</a:t>
             </a:fld>
             <a:endParaRPr lang="es-AR"/>
           </a:p>
@@ -5362,7 +5369,7 @@
             <a:fld id="{7C44809D-EF54-4966-A24E-C6C0F0B167CB}" type="datetimeFigureOut">
               <a:rPr lang="es-AR" smtClean="0"/>
               <a:pPr/>
-              <a:t>18/06/2011</a:t>
+              <a:t>22/06/2011</a:t>
             </a:fld>
             <a:endParaRPr lang="es-AR"/>
           </a:p>
@@ -5552,7 +5559,7 @@
             <a:fld id="{7C44809D-EF54-4966-A24E-C6C0F0B167CB}" type="datetimeFigureOut">
               <a:rPr lang="es-AR" smtClean="0"/>
               <a:pPr/>
-              <a:t>18/06/2011</a:t>
+              <a:t>22/06/2011</a:t>
             </a:fld>
             <a:endParaRPr lang="es-AR"/>
           </a:p>
@@ -5732,7 +5739,7 @@
             <a:fld id="{7C44809D-EF54-4966-A24E-C6C0F0B167CB}" type="datetimeFigureOut">
               <a:rPr lang="es-AR" smtClean="0"/>
               <a:pPr/>
-              <a:t>18/06/2011</a:t>
+              <a:t>22/06/2011</a:t>
             </a:fld>
             <a:endParaRPr lang="es-AR"/>
           </a:p>
@@ -6005,7 +6012,7 @@
             <a:fld id="{7C44809D-EF54-4966-A24E-C6C0F0B167CB}" type="datetimeFigureOut">
               <a:rPr lang="es-AR" smtClean="0"/>
               <a:pPr/>
-              <a:t>18/06/2011</a:t>
+              <a:t>22/06/2011</a:t>
             </a:fld>
             <a:endParaRPr lang="es-AR"/>
           </a:p>
@@ -6478,7 +6485,7 @@
             <a:fld id="{7C44809D-EF54-4966-A24E-C6C0F0B167CB}" type="datetimeFigureOut">
               <a:rPr lang="es-AR" smtClean="0"/>
               <a:pPr/>
-              <a:t>18/06/2011</a:t>
+              <a:t>22/06/2011</a:t>
             </a:fld>
             <a:endParaRPr lang="es-AR"/>
           </a:p>
@@ -6972,7 +6979,7 @@
             <a:fld id="{7C44809D-EF54-4966-A24E-C6C0F0B167CB}" type="datetimeFigureOut">
               <a:rPr lang="es-AR" smtClean="0"/>
               <a:pPr/>
-              <a:t>18/06/2011</a:t>
+              <a:t>22/06/2011</a:t>
             </a:fld>
             <a:endParaRPr lang="es-AR"/>
           </a:p>
@@ -7103,7 +7110,7 @@
             <a:fld id="{7C44809D-EF54-4966-A24E-C6C0F0B167CB}" type="datetimeFigureOut">
               <a:rPr lang="es-AR" smtClean="0"/>
               <a:pPr/>
-              <a:t>18/06/2011</a:t>
+              <a:t>22/06/2011</a:t>
             </a:fld>
             <a:endParaRPr lang="es-AR"/>
           </a:p>
@@ -7252,7 +7259,7 @@
             <a:fld id="{7C44809D-EF54-4966-A24E-C6C0F0B167CB}" type="datetimeFigureOut">
               <a:rPr lang="es-AR" smtClean="0"/>
               <a:pPr/>
-              <a:t>18/06/2011</a:t>
+              <a:t>22/06/2011</a:t>
             </a:fld>
             <a:endParaRPr lang="es-AR"/>
           </a:p>
@@ -7579,7 +7586,7 @@
             <a:fld id="{7C44809D-EF54-4966-A24E-C6C0F0B167CB}" type="datetimeFigureOut">
               <a:rPr lang="es-AR" smtClean="0"/>
               <a:pPr/>
-              <a:t>18/06/2011</a:t>
+              <a:t>22/06/2011</a:t>
             </a:fld>
             <a:endParaRPr lang="es-AR"/>
           </a:p>
@@ -7718,7 +7725,7 @@
             <a:fld id="{7C44809D-EF54-4966-A24E-C6C0F0B167CB}" type="datetimeFigureOut">
               <a:rPr lang="es-AR" smtClean="0"/>
               <a:pPr/>
-              <a:t>18/06/2011</a:t>
+              <a:t>22/06/2011</a:t>
             </a:fld>
             <a:endParaRPr lang="es-AR"/>
           </a:p>
@@ -8504,7 +8511,7 @@
             <a:fld id="{7C44809D-EF54-4966-A24E-C6C0F0B167CB}" type="datetimeFigureOut">
               <a:rPr lang="es-AR" smtClean="0"/>
               <a:pPr/>
-              <a:t>18/06/2011</a:t>
+              <a:t>22/06/2011</a:t>
             </a:fld>
             <a:endParaRPr lang="es-AR"/>
           </a:p>
@@ -9077,7 +9084,7 @@
             </a:pPr>
             <a:r>
               <a:rPr lang="es-AR" u="sng" dirty="0" smtClean="0"/>
-              <a:t>Ayudante</a:t>
+              <a:t>Profesor</a:t>
             </a:r>
             <a:r>
               <a:rPr lang="es-AR" sz="2200" u="sng" dirty="0" smtClean="0"/>
@@ -11398,25 +11405,7 @@
               <a:rPr lang="es-AR" dirty="0" smtClean="0">
                 <a:latin typeface="Gill Sans MT" pitchFamily="18"/>
               </a:rPr>
-              <a:t> a los efectos de ocuparse de todo lo relacionado con Imagen y Comunicación en Argentina en la instalación de 200 locales </a:t>
-            </a:r>
-            <a:r>
-              <a:rPr lang="es-AR" smtClean="0">
-                <a:latin typeface="Gill Sans MT" pitchFamily="18"/>
-              </a:rPr>
-              <a:t>de </a:t>
-            </a:r>
-            <a:r>
-              <a:rPr lang="es-AR" smtClean="0">
-                <a:latin typeface="Gill Sans MT" pitchFamily="18"/>
-              </a:rPr>
-              <a:t>1500 </a:t>
-            </a:r>
-            <a:r>
-              <a:rPr lang="es-AR" dirty="0" smtClean="0">
-                <a:latin typeface="Gill Sans MT" pitchFamily="18"/>
-              </a:rPr>
-              <a:t>m</a:t>
+              <a:t> a los efectos de ocuparse de todo lo relacionado con Imagen y Comunicación en Argentina en la instalación de 200 locales de 1500 m</a:t>
             </a:r>
             <a:r>
               <a:rPr lang="es-AR" baseline="30000" dirty="0" smtClean="0">
@@ -11534,54 +11523,6 @@
             </a:r>
           </a:p>
           <a:p>
-            <a:r>
-              <a:rPr lang="es-AR" dirty="0" smtClean="0"/>
-              <a:t>Expandir el depósito</a:t>
-            </a:r>
-          </a:p>
-          <a:p>
-            <a:r>
-              <a:rPr lang="es-AR" dirty="0" smtClean="0"/>
-              <a:t>Aumentar Stock</a:t>
-            </a:r>
-          </a:p>
-          <a:p>
-            <a:r>
-              <a:rPr lang="es-AR" dirty="0" err="1" smtClean="0"/>
-              <a:t>Tercerizar</a:t>
-            </a:r>
-            <a:endParaRPr lang="es-AR" dirty="0" smtClean="0"/>
-          </a:p>
-          <a:p>
-            <a:r>
-              <a:rPr lang="es-AR" dirty="0" smtClean="0"/>
-              <a:t>Contratar Asesoría</a:t>
-            </a:r>
-          </a:p>
-          <a:p>
-            <a:r>
-              <a:rPr lang="es-AR" dirty="0" smtClean="0"/>
-              <a:t>Armar circuitos de trabajo</a:t>
-            </a:r>
-          </a:p>
-          <a:p>
-            <a:r>
-              <a:rPr lang="es-AR" dirty="0" smtClean="0"/>
-              <a:t>Utilizar herramientas informativas</a:t>
-            </a:r>
-          </a:p>
-          <a:p>
-            <a:r>
-              <a:rPr lang="es-AR" dirty="0" smtClean="0"/>
-              <a:t>Crear nuevas áreas y </a:t>
-            </a:r>
-            <a:r>
-              <a:rPr lang="es-AR" smtClean="0"/>
-              <a:t>agrandar existentes</a:t>
-            </a:r>
-            <a:endParaRPr lang="es-AR" dirty="0" smtClean="0"/>
-          </a:p>
-          <a:p>
             <a:endParaRPr lang="es-AR" dirty="0"/>
           </a:p>
         </p:txBody>
@@ -11591,7 +11532,7 @@
   <p:clrMapOvr>
     <a:masterClrMapping/>
   </p:clrMapOvr>
-  <p:transition>
+  <p:transition spd="med">
     <p:fade/>
   </p:transition>
   <p:timing>
@@ -11858,6 +11799,792 @@
 </file>
 
 <file path=ppt/slides/slide20.xml><?xml version="1.0" encoding="utf-8"?>
+<p:sld xmlns:a="http://schemas.openxmlformats.org/drawingml/2006/main" xmlns:r="http://schemas.openxmlformats.org/officeDocument/2006/relationships" xmlns:p="http://schemas.openxmlformats.org/presentationml/2006/main">
+  <p:cSld>
+    <p:spTree>
+      <p:nvGrpSpPr>
+        <p:cNvPr id="1" name=""/>
+        <p:cNvGrpSpPr/>
+        <p:nvPr/>
+      </p:nvGrpSpPr>
+      <p:grpSpPr>
+        <a:xfrm>
+          <a:off x="0" y="0"/>
+          <a:ext cx="0" cy="0"/>
+          <a:chOff x="0" y="0"/>
+          <a:chExt cx="0" cy="0"/>
+        </a:xfrm>
+      </p:grpSpPr>
+      <p:sp>
+        <p:nvSpPr>
+          <p:cNvPr id="2" name="1 Título"/>
+          <p:cNvSpPr>
+            <a:spLocks noGrp="1"/>
+          </p:cNvSpPr>
+          <p:nvPr>
+            <p:ph type="title"/>
+          </p:nvPr>
+        </p:nvSpPr>
+        <p:spPr/>
+        <p:txBody>
+          <a:bodyPr/>
+          <a:lstStyle/>
+          <a:p>
+            <a:pPr algn="ctr"/>
+            <a:r>
+              <a:rPr lang="es-AR" dirty="0" smtClean="0"/>
+              <a:t>Resolución Hipótesis</a:t>
+            </a:r>
+            <a:endParaRPr lang="es-AR" dirty="0"/>
+          </a:p>
+        </p:txBody>
+      </p:sp>
+      <p:sp>
+        <p:nvSpPr>
+          <p:cNvPr id="3" name="2 Marcador de contenido"/>
+          <p:cNvSpPr>
+            <a:spLocks noGrp="1"/>
+          </p:cNvSpPr>
+          <p:nvPr>
+            <p:ph idx="1"/>
+          </p:nvPr>
+        </p:nvSpPr>
+        <p:spPr/>
+        <p:txBody>
+          <a:bodyPr>
+            <a:normAutofit/>
+          </a:bodyPr>
+          <a:lstStyle/>
+          <a:p>
+            <a:r>
+              <a:rPr lang="es-AR" dirty="0" smtClean="0"/>
+              <a:t>Mantener las fortalezas</a:t>
+            </a:r>
+          </a:p>
+          <a:p>
+            <a:r>
+              <a:rPr lang="es-AR" dirty="0" smtClean="0"/>
+              <a:t>Expandir el </a:t>
+            </a:r>
+            <a:r>
+              <a:rPr lang="es-AR" dirty="0" smtClean="0"/>
+              <a:t>depósito</a:t>
+            </a:r>
+            <a:endParaRPr lang="es-AR" dirty="0" smtClean="0"/>
+          </a:p>
+        </p:txBody>
+      </p:sp>
+    </p:spTree>
+  </p:cSld>
+  <p:clrMapOvr>
+    <a:masterClrMapping/>
+  </p:clrMapOvr>
+  <p:transition spd="med">
+    <p:fade/>
+  </p:transition>
+  <p:timing>
+    <p:tnLst>
+      <p:par>
+        <p:cTn id="1" dur="indefinite" restart="never" nodeType="tmRoot"/>
+      </p:par>
+    </p:tnLst>
+  </p:timing>
+</p:sld>
+</file>
+
+<file path=ppt/slides/slide21.xml><?xml version="1.0" encoding="utf-8"?>
+<p:sld xmlns:a="http://schemas.openxmlformats.org/drawingml/2006/main" xmlns:r="http://schemas.openxmlformats.org/officeDocument/2006/relationships" xmlns:p="http://schemas.openxmlformats.org/presentationml/2006/main">
+  <p:cSld>
+    <p:spTree>
+      <p:nvGrpSpPr>
+        <p:cNvPr id="1" name=""/>
+        <p:cNvGrpSpPr/>
+        <p:nvPr/>
+      </p:nvGrpSpPr>
+      <p:grpSpPr>
+        <a:xfrm>
+          <a:off x="0" y="0"/>
+          <a:ext cx="0" cy="0"/>
+          <a:chOff x="0" y="0"/>
+          <a:chExt cx="0" cy="0"/>
+        </a:xfrm>
+      </p:grpSpPr>
+      <p:sp>
+        <p:nvSpPr>
+          <p:cNvPr id="2" name="1 Título"/>
+          <p:cNvSpPr>
+            <a:spLocks noGrp="1"/>
+          </p:cNvSpPr>
+          <p:nvPr>
+            <p:ph type="title"/>
+          </p:nvPr>
+        </p:nvSpPr>
+        <p:spPr/>
+        <p:txBody>
+          <a:bodyPr/>
+          <a:lstStyle/>
+          <a:p>
+            <a:pPr algn="ctr"/>
+            <a:r>
+              <a:rPr lang="es-AR" dirty="0" smtClean="0"/>
+              <a:t>Resolución Hipótesis</a:t>
+            </a:r>
+            <a:endParaRPr lang="es-AR" dirty="0"/>
+          </a:p>
+        </p:txBody>
+      </p:sp>
+      <p:sp>
+        <p:nvSpPr>
+          <p:cNvPr id="3" name="2 Marcador de contenido"/>
+          <p:cNvSpPr>
+            <a:spLocks noGrp="1"/>
+          </p:cNvSpPr>
+          <p:nvPr>
+            <p:ph idx="1"/>
+          </p:nvPr>
+        </p:nvSpPr>
+        <p:spPr/>
+        <p:txBody>
+          <a:bodyPr>
+            <a:normAutofit/>
+          </a:bodyPr>
+          <a:lstStyle/>
+          <a:p>
+            <a:r>
+              <a:rPr lang="es-AR" dirty="0" smtClean="0"/>
+              <a:t>Mantener las fortalezas</a:t>
+            </a:r>
+          </a:p>
+          <a:p>
+            <a:r>
+              <a:rPr lang="es-AR" dirty="0" smtClean="0"/>
+              <a:t>Expandir el depósito</a:t>
+            </a:r>
+          </a:p>
+          <a:p>
+            <a:r>
+              <a:rPr lang="es-AR" dirty="0" smtClean="0"/>
+              <a:t>Aumentar </a:t>
+            </a:r>
+            <a:r>
+              <a:rPr lang="es-AR" dirty="0" smtClean="0"/>
+              <a:t>Stock</a:t>
+            </a:r>
+            <a:endParaRPr lang="es-AR" dirty="0" smtClean="0"/>
+          </a:p>
+        </p:txBody>
+      </p:sp>
+    </p:spTree>
+  </p:cSld>
+  <p:clrMapOvr>
+    <a:masterClrMapping/>
+  </p:clrMapOvr>
+  <p:transition spd="med">
+    <p:fade/>
+  </p:transition>
+  <p:timing>
+    <p:tnLst>
+      <p:par>
+        <p:cTn id="1" dur="indefinite" restart="never" nodeType="tmRoot"/>
+      </p:par>
+    </p:tnLst>
+  </p:timing>
+</p:sld>
+</file>
+
+<file path=ppt/slides/slide22.xml><?xml version="1.0" encoding="utf-8"?>
+<p:sld xmlns:a="http://schemas.openxmlformats.org/drawingml/2006/main" xmlns:r="http://schemas.openxmlformats.org/officeDocument/2006/relationships" xmlns:p="http://schemas.openxmlformats.org/presentationml/2006/main">
+  <p:cSld>
+    <p:spTree>
+      <p:nvGrpSpPr>
+        <p:cNvPr id="1" name=""/>
+        <p:cNvGrpSpPr/>
+        <p:nvPr/>
+      </p:nvGrpSpPr>
+      <p:grpSpPr>
+        <a:xfrm>
+          <a:off x="0" y="0"/>
+          <a:ext cx="0" cy="0"/>
+          <a:chOff x="0" y="0"/>
+          <a:chExt cx="0" cy="0"/>
+        </a:xfrm>
+      </p:grpSpPr>
+      <p:sp>
+        <p:nvSpPr>
+          <p:cNvPr id="2" name="1 Título"/>
+          <p:cNvSpPr>
+            <a:spLocks noGrp="1"/>
+          </p:cNvSpPr>
+          <p:nvPr>
+            <p:ph type="title"/>
+          </p:nvPr>
+        </p:nvSpPr>
+        <p:spPr/>
+        <p:txBody>
+          <a:bodyPr/>
+          <a:lstStyle/>
+          <a:p>
+            <a:pPr algn="ctr"/>
+            <a:r>
+              <a:rPr lang="es-AR" dirty="0" smtClean="0"/>
+              <a:t>Resolución Hipótesis</a:t>
+            </a:r>
+            <a:endParaRPr lang="es-AR" dirty="0"/>
+          </a:p>
+        </p:txBody>
+      </p:sp>
+      <p:sp>
+        <p:nvSpPr>
+          <p:cNvPr id="3" name="2 Marcador de contenido"/>
+          <p:cNvSpPr>
+            <a:spLocks noGrp="1"/>
+          </p:cNvSpPr>
+          <p:nvPr>
+            <p:ph idx="1"/>
+          </p:nvPr>
+        </p:nvSpPr>
+        <p:spPr/>
+        <p:txBody>
+          <a:bodyPr>
+            <a:normAutofit/>
+          </a:bodyPr>
+          <a:lstStyle/>
+          <a:p>
+            <a:r>
+              <a:rPr lang="es-AR" dirty="0" smtClean="0"/>
+              <a:t>Mantener las fortalezas</a:t>
+            </a:r>
+          </a:p>
+          <a:p>
+            <a:r>
+              <a:rPr lang="es-AR" dirty="0" smtClean="0"/>
+              <a:t>Expandir el depósito</a:t>
+            </a:r>
+          </a:p>
+          <a:p>
+            <a:r>
+              <a:rPr lang="es-AR" dirty="0" smtClean="0"/>
+              <a:t>Aumentar Stock</a:t>
+            </a:r>
+          </a:p>
+          <a:p>
+            <a:r>
+              <a:rPr lang="es-AR" dirty="0" err="1" smtClean="0"/>
+              <a:t>Tercerizar</a:t>
+            </a:r>
+            <a:endParaRPr lang="es-AR" dirty="0" smtClean="0"/>
+          </a:p>
+          <a:p>
+            <a:endParaRPr lang="es-AR" dirty="0"/>
+          </a:p>
+        </p:txBody>
+      </p:sp>
+    </p:spTree>
+  </p:cSld>
+  <p:clrMapOvr>
+    <a:masterClrMapping/>
+  </p:clrMapOvr>
+  <p:transition spd="med">
+    <p:fade/>
+  </p:transition>
+  <p:timing>
+    <p:tnLst>
+      <p:par>
+        <p:cTn id="1" dur="indefinite" restart="never" nodeType="tmRoot"/>
+      </p:par>
+    </p:tnLst>
+  </p:timing>
+</p:sld>
+</file>
+
+<file path=ppt/slides/slide23.xml><?xml version="1.0" encoding="utf-8"?>
+<p:sld xmlns:a="http://schemas.openxmlformats.org/drawingml/2006/main" xmlns:r="http://schemas.openxmlformats.org/officeDocument/2006/relationships" xmlns:p="http://schemas.openxmlformats.org/presentationml/2006/main">
+  <p:cSld>
+    <p:spTree>
+      <p:nvGrpSpPr>
+        <p:cNvPr id="1" name=""/>
+        <p:cNvGrpSpPr/>
+        <p:nvPr/>
+      </p:nvGrpSpPr>
+      <p:grpSpPr>
+        <a:xfrm>
+          <a:off x="0" y="0"/>
+          <a:ext cx="0" cy="0"/>
+          <a:chOff x="0" y="0"/>
+          <a:chExt cx="0" cy="0"/>
+        </a:xfrm>
+      </p:grpSpPr>
+      <p:sp>
+        <p:nvSpPr>
+          <p:cNvPr id="2" name="1 Título"/>
+          <p:cNvSpPr>
+            <a:spLocks noGrp="1"/>
+          </p:cNvSpPr>
+          <p:nvPr>
+            <p:ph type="title"/>
+          </p:nvPr>
+        </p:nvSpPr>
+        <p:spPr/>
+        <p:txBody>
+          <a:bodyPr/>
+          <a:lstStyle/>
+          <a:p>
+            <a:pPr algn="ctr"/>
+            <a:r>
+              <a:rPr lang="es-AR" dirty="0" smtClean="0"/>
+              <a:t>Resolución Hipótesis</a:t>
+            </a:r>
+            <a:endParaRPr lang="es-AR" dirty="0"/>
+          </a:p>
+        </p:txBody>
+      </p:sp>
+      <p:sp>
+        <p:nvSpPr>
+          <p:cNvPr id="3" name="2 Marcador de contenido"/>
+          <p:cNvSpPr>
+            <a:spLocks noGrp="1"/>
+          </p:cNvSpPr>
+          <p:nvPr>
+            <p:ph idx="1"/>
+          </p:nvPr>
+        </p:nvSpPr>
+        <p:spPr/>
+        <p:txBody>
+          <a:bodyPr>
+            <a:normAutofit/>
+          </a:bodyPr>
+          <a:lstStyle/>
+          <a:p>
+            <a:r>
+              <a:rPr lang="es-AR" dirty="0" smtClean="0"/>
+              <a:t>Mantener las fortalezas</a:t>
+            </a:r>
+          </a:p>
+          <a:p>
+            <a:r>
+              <a:rPr lang="es-AR" dirty="0" smtClean="0"/>
+              <a:t>Expandir el depósito</a:t>
+            </a:r>
+          </a:p>
+          <a:p>
+            <a:r>
+              <a:rPr lang="es-AR" dirty="0" smtClean="0"/>
+              <a:t>Aumentar Stock</a:t>
+            </a:r>
+          </a:p>
+          <a:p>
+            <a:r>
+              <a:rPr lang="es-AR" dirty="0" err="1" smtClean="0"/>
+              <a:t>Tercerizar</a:t>
+            </a:r>
+            <a:endParaRPr lang="es-AR" dirty="0" smtClean="0"/>
+          </a:p>
+          <a:p>
+            <a:r>
+              <a:rPr lang="es-AR" dirty="0" smtClean="0"/>
+              <a:t>Contratar </a:t>
+            </a:r>
+            <a:r>
+              <a:rPr lang="es-AR" dirty="0" smtClean="0"/>
+              <a:t>Asesoría</a:t>
+            </a:r>
+            <a:endParaRPr lang="es-AR" dirty="0" smtClean="0"/>
+          </a:p>
+        </p:txBody>
+      </p:sp>
+    </p:spTree>
+  </p:cSld>
+  <p:clrMapOvr>
+    <a:masterClrMapping/>
+  </p:clrMapOvr>
+  <p:transition spd="med">
+    <p:fade/>
+  </p:transition>
+  <p:timing>
+    <p:tnLst>
+      <p:par>
+        <p:cTn id="1" dur="indefinite" restart="never" nodeType="tmRoot"/>
+      </p:par>
+    </p:tnLst>
+  </p:timing>
+</p:sld>
+</file>
+
+<file path=ppt/slides/slide24.xml><?xml version="1.0" encoding="utf-8"?>
+<p:sld xmlns:a="http://schemas.openxmlformats.org/drawingml/2006/main" xmlns:r="http://schemas.openxmlformats.org/officeDocument/2006/relationships" xmlns:p="http://schemas.openxmlformats.org/presentationml/2006/main">
+  <p:cSld>
+    <p:spTree>
+      <p:nvGrpSpPr>
+        <p:cNvPr id="1" name=""/>
+        <p:cNvGrpSpPr/>
+        <p:nvPr/>
+      </p:nvGrpSpPr>
+      <p:grpSpPr>
+        <a:xfrm>
+          <a:off x="0" y="0"/>
+          <a:ext cx="0" cy="0"/>
+          <a:chOff x="0" y="0"/>
+          <a:chExt cx="0" cy="0"/>
+        </a:xfrm>
+      </p:grpSpPr>
+      <p:sp>
+        <p:nvSpPr>
+          <p:cNvPr id="2" name="1 Título"/>
+          <p:cNvSpPr>
+            <a:spLocks noGrp="1"/>
+          </p:cNvSpPr>
+          <p:nvPr>
+            <p:ph type="title"/>
+          </p:nvPr>
+        </p:nvSpPr>
+        <p:spPr/>
+        <p:txBody>
+          <a:bodyPr/>
+          <a:lstStyle/>
+          <a:p>
+            <a:pPr algn="ctr"/>
+            <a:r>
+              <a:rPr lang="es-AR" dirty="0" smtClean="0"/>
+              <a:t>Resolución Hipótesis</a:t>
+            </a:r>
+            <a:endParaRPr lang="es-AR" dirty="0"/>
+          </a:p>
+        </p:txBody>
+      </p:sp>
+      <p:sp>
+        <p:nvSpPr>
+          <p:cNvPr id="3" name="2 Marcador de contenido"/>
+          <p:cNvSpPr>
+            <a:spLocks noGrp="1"/>
+          </p:cNvSpPr>
+          <p:nvPr>
+            <p:ph idx="1"/>
+          </p:nvPr>
+        </p:nvSpPr>
+        <p:spPr/>
+        <p:txBody>
+          <a:bodyPr>
+            <a:normAutofit/>
+          </a:bodyPr>
+          <a:lstStyle/>
+          <a:p>
+            <a:r>
+              <a:rPr lang="es-AR" dirty="0" smtClean="0"/>
+              <a:t>Mantener las fortalezas</a:t>
+            </a:r>
+          </a:p>
+          <a:p>
+            <a:r>
+              <a:rPr lang="es-AR" dirty="0" smtClean="0"/>
+              <a:t>Expandir el depósito</a:t>
+            </a:r>
+          </a:p>
+          <a:p>
+            <a:r>
+              <a:rPr lang="es-AR" dirty="0" smtClean="0"/>
+              <a:t>Aumentar Stock</a:t>
+            </a:r>
+          </a:p>
+          <a:p>
+            <a:r>
+              <a:rPr lang="es-AR" dirty="0" err="1" smtClean="0"/>
+              <a:t>Tercerizar</a:t>
+            </a:r>
+            <a:endParaRPr lang="es-AR" dirty="0" smtClean="0"/>
+          </a:p>
+          <a:p>
+            <a:r>
+              <a:rPr lang="es-AR" dirty="0" smtClean="0"/>
+              <a:t>Contratar Asesoría</a:t>
+            </a:r>
+          </a:p>
+          <a:p>
+            <a:r>
+              <a:rPr lang="es-AR" dirty="0" smtClean="0"/>
+              <a:t>Armar circuitos de trabajo</a:t>
+            </a:r>
+          </a:p>
+          <a:p>
+            <a:endParaRPr lang="es-AR" dirty="0"/>
+          </a:p>
+        </p:txBody>
+      </p:sp>
+    </p:spTree>
+  </p:cSld>
+  <p:clrMapOvr>
+    <a:masterClrMapping/>
+  </p:clrMapOvr>
+  <p:transition spd="med">
+    <p:fade/>
+  </p:transition>
+  <p:timing>
+    <p:tnLst>
+      <p:par>
+        <p:cTn id="1" dur="indefinite" restart="never" nodeType="tmRoot"/>
+      </p:par>
+    </p:tnLst>
+  </p:timing>
+</p:sld>
+</file>
+
+<file path=ppt/slides/slide25.xml><?xml version="1.0" encoding="utf-8"?>
+<p:sld xmlns:a="http://schemas.openxmlformats.org/drawingml/2006/main" xmlns:r="http://schemas.openxmlformats.org/officeDocument/2006/relationships" xmlns:p="http://schemas.openxmlformats.org/presentationml/2006/main">
+  <p:cSld>
+    <p:spTree>
+      <p:nvGrpSpPr>
+        <p:cNvPr id="1" name=""/>
+        <p:cNvGrpSpPr/>
+        <p:nvPr/>
+      </p:nvGrpSpPr>
+      <p:grpSpPr>
+        <a:xfrm>
+          <a:off x="0" y="0"/>
+          <a:ext cx="0" cy="0"/>
+          <a:chOff x="0" y="0"/>
+          <a:chExt cx="0" cy="0"/>
+        </a:xfrm>
+      </p:grpSpPr>
+      <p:sp>
+        <p:nvSpPr>
+          <p:cNvPr id="2" name="1 Título"/>
+          <p:cNvSpPr>
+            <a:spLocks noGrp="1"/>
+          </p:cNvSpPr>
+          <p:nvPr>
+            <p:ph type="title"/>
+          </p:nvPr>
+        </p:nvSpPr>
+        <p:spPr/>
+        <p:txBody>
+          <a:bodyPr/>
+          <a:lstStyle/>
+          <a:p>
+            <a:pPr algn="ctr"/>
+            <a:r>
+              <a:rPr lang="es-AR" dirty="0" smtClean="0"/>
+              <a:t>Resolución Hipótesis</a:t>
+            </a:r>
+            <a:endParaRPr lang="es-AR" dirty="0"/>
+          </a:p>
+        </p:txBody>
+      </p:sp>
+      <p:sp>
+        <p:nvSpPr>
+          <p:cNvPr id="3" name="2 Marcador de contenido"/>
+          <p:cNvSpPr>
+            <a:spLocks noGrp="1"/>
+          </p:cNvSpPr>
+          <p:nvPr>
+            <p:ph idx="1"/>
+          </p:nvPr>
+        </p:nvSpPr>
+        <p:spPr/>
+        <p:txBody>
+          <a:bodyPr>
+            <a:normAutofit/>
+          </a:bodyPr>
+          <a:lstStyle/>
+          <a:p>
+            <a:r>
+              <a:rPr lang="es-AR" dirty="0" smtClean="0"/>
+              <a:t>Mantener las fortalezas</a:t>
+            </a:r>
+          </a:p>
+          <a:p>
+            <a:r>
+              <a:rPr lang="es-AR" dirty="0" smtClean="0"/>
+              <a:t>Expandir el depósito</a:t>
+            </a:r>
+          </a:p>
+          <a:p>
+            <a:r>
+              <a:rPr lang="es-AR" dirty="0" smtClean="0"/>
+              <a:t>Aumentar Stock</a:t>
+            </a:r>
+          </a:p>
+          <a:p>
+            <a:r>
+              <a:rPr lang="es-AR" dirty="0" err="1" smtClean="0"/>
+              <a:t>Tercerizar</a:t>
+            </a:r>
+            <a:endParaRPr lang="es-AR" dirty="0" smtClean="0"/>
+          </a:p>
+          <a:p>
+            <a:r>
+              <a:rPr lang="es-AR" dirty="0" smtClean="0"/>
+              <a:t>Contratar Asesoría</a:t>
+            </a:r>
+          </a:p>
+          <a:p>
+            <a:r>
+              <a:rPr lang="es-AR" dirty="0" smtClean="0"/>
+              <a:t>Armar circuitos de trabajo</a:t>
+            </a:r>
+          </a:p>
+          <a:p>
+            <a:r>
+              <a:rPr lang="es-AR" dirty="0" smtClean="0"/>
+              <a:t>Utilizar herramientas informativas</a:t>
+            </a:r>
+          </a:p>
+          <a:p>
+            <a:endParaRPr lang="es-AR" dirty="0"/>
+          </a:p>
+        </p:txBody>
+      </p:sp>
+    </p:spTree>
+  </p:cSld>
+  <p:clrMapOvr>
+    <a:masterClrMapping/>
+  </p:clrMapOvr>
+  <p:transition spd="med">
+    <p:fade/>
+  </p:transition>
+  <p:timing>
+    <p:tnLst>
+      <p:par>
+        <p:cTn id="1" dur="indefinite" restart="never" nodeType="tmRoot"/>
+      </p:par>
+    </p:tnLst>
+  </p:timing>
+</p:sld>
+</file>
+
+<file path=ppt/slides/slide26.xml><?xml version="1.0" encoding="utf-8"?>
+<p:sld xmlns:a="http://schemas.openxmlformats.org/drawingml/2006/main" xmlns:r="http://schemas.openxmlformats.org/officeDocument/2006/relationships" xmlns:p="http://schemas.openxmlformats.org/presentationml/2006/main">
+  <p:cSld>
+    <p:spTree>
+      <p:nvGrpSpPr>
+        <p:cNvPr id="1" name=""/>
+        <p:cNvGrpSpPr/>
+        <p:nvPr/>
+      </p:nvGrpSpPr>
+      <p:grpSpPr>
+        <a:xfrm>
+          <a:off x="0" y="0"/>
+          <a:ext cx="0" cy="0"/>
+          <a:chOff x="0" y="0"/>
+          <a:chExt cx="0" cy="0"/>
+        </a:xfrm>
+      </p:grpSpPr>
+      <p:sp>
+        <p:nvSpPr>
+          <p:cNvPr id="2" name="1 Título"/>
+          <p:cNvSpPr>
+            <a:spLocks noGrp="1"/>
+          </p:cNvSpPr>
+          <p:nvPr>
+            <p:ph type="title"/>
+          </p:nvPr>
+        </p:nvSpPr>
+        <p:spPr/>
+        <p:txBody>
+          <a:bodyPr/>
+          <a:lstStyle/>
+          <a:p>
+            <a:pPr algn="ctr"/>
+            <a:r>
+              <a:rPr lang="es-AR" dirty="0" smtClean="0"/>
+              <a:t>Resolución Hipótesis</a:t>
+            </a:r>
+            <a:endParaRPr lang="es-AR" dirty="0"/>
+          </a:p>
+        </p:txBody>
+      </p:sp>
+      <p:sp>
+        <p:nvSpPr>
+          <p:cNvPr id="3" name="2 Marcador de contenido"/>
+          <p:cNvSpPr>
+            <a:spLocks noGrp="1"/>
+          </p:cNvSpPr>
+          <p:nvPr>
+            <p:ph idx="1"/>
+          </p:nvPr>
+        </p:nvSpPr>
+        <p:spPr/>
+        <p:txBody>
+          <a:bodyPr>
+            <a:normAutofit/>
+          </a:bodyPr>
+          <a:lstStyle/>
+          <a:p>
+            <a:r>
+              <a:rPr lang="es-AR" dirty="0" smtClean="0"/>
+              <a:t>Mantener las fortalezas</a:t>
+            </a:r>
+          </a:p>
+          <a:p>
+            <a:r>
+              <a:rPr lang="es-AR" dirty="0" smtClean="0"/>
+              <a:t>Expandir el depósito</a:t>
+            </a:r>
+          </a:p>
+          <a:p>
+            <a:r>
+              <a:rPr lang="es-AR" dirty="0" smtClean="0"/>
+              <a:t>Aumentar Stock</a:t>
+            </a:r>
+          </a:p>
+          <a:p>
+            <a:r>
+              <a:rPr lang="es-AR" dirty="0" err="1" smtClean="0"/>
+              <a:t>Tercerizar</a:t>
+            </a:r>
+            <a:endParaRPr lang="es-AR" dirty="0" smtClean="0"/>
+          </a:p>
+          <a:p>
+            <a:r>
+              <a:rPr lang="es-AR" dirty="0" smtClean="0"/>
+              <a:t>Contratar Asesoría</a:t>
+            </a:r>
+          </a:p>
+          <a:p>
+            <a:r>
+              <a:rPr lang="es-AR" dirty="0" smtClean="0"/>
+              <a:t>Armar circuitos de trabajo</a:t>
+            </a:r>
+          </a:p>
+          <a:p>
+            <a:r>
+              <a:rPr lang="es-AR" dirty="0" smtClean="0"/>
+              <a:t>Utilizar herramientas informativas</a:t>
+            </a:r>
+          </a:p>
+          <a:p>
+            <a:r>
+              <a:rPr lang="es-AR" dirty="0" smtClean="0"/>
+              <a:t>Crear nuevas áreas y </a:t>
+            </a:r>
+            <a:r>
+              <a:rPr lang="es-AR" smtClean="0"/>
+              <a:t>agrandar existentes</a:t>
+            </a:r>
+            <a:endParaRPr lang="es-AR" dirty="0" smtClean="0"/>
+          </a:p>
+          <a:p>
+            <a:endParaRPr lang="es-AR" dirty="0"/>
+          </a:p>
+        </p:txBody>
+      </p:sp>
+    </p:spTree>
+  </p:cSld>
+  <p:clrMapOvr>
+    <a:masterClrMapping/>
+  </p:clrMapOvr>
+  <p:transition spd="med">
+    <p:fade/>
+  </p:transition>
+  <p:timing>
+    <p:tnLst>
+      <p:par>
+        <p:cTn id="1" dur="indefinite" restart="never" nodeType="tmRoot"/>
+      </p:par>
+    </p:tnLst>
+  </p:timing>
+</p:sld>
+</file>
+
+<file path=ppt/slides/slide27.xml><?xml version="1.0" encoding="utf-8"?>
 <p:sld xmlns:a="http://schemas.openxmlformats.org/drawingml/2006/main" xmlns:r="http://schemas.openxmlformats.org/officeDocument/2006/relationships" xmlns:p="http://schemas.openxmlformats.org/presentationml/2006/main" showMasterSp="0">
   <p:cSld>
     <p:bg>
@@ -11958,7 +12685,7 @@
 </p:sld>
 </file>
 
-<file path=ppt/slides/slide21.xml><?xml version="1.0" encoding="utf-8"?>
+<file path=ppt/slides/slide28.xml><?xml version="1.0" encoding="utf-8"?>
 <p:sld xmlns:a="http://schemas.openxmlformats.org/drawingml/2006/main" xmlns:r="http://schemas.openxmlformats.org/officeDocument/2006/relationships" xmlns:p="http://schemas.openxmlformats.org/presentationml/2006/main">
   <p:cSld>
     <p:spTree>
@@ -12017,7 +12744,45 @@
             <a:endParaRPr lang="es-AR" dirty="0" smtClean="0"/>
           </a:p>
           <a:p>
-            <a:endParaRPr lang="es-AR" dirty="0"/>
+            <a:r>
+              <a:rPr lang="es-AR" dirty="0" err="1" smtClean="0"/>
+              <a:t>ICom</a:t>
+            </a:r>
+            <a:r>
+              <a:rPr lang="es-AR" dirty="0" smtClean="0"/>
+              <a:t> es un claro ejemplo de una empresa sin organización pero exitosa</a:t>
+            </a:r>
+          </a:p>
+          <a:p>
+            <a:endParaRPr lang="es-AR" dirty="0" smtClean="0"/>
+          </a:p>
+          <a:p>
+            <a:r>
+              <a:rPr lang="es-AR" sz="2800" dirty="0" smtClean="0"/>
+              <a:t>No deberían confiar tanto en su exclusividad</a:t>
+            </a:r>
+          </a:p>
+          <a:p>
+            <a:pPr lvl="1"/>
+            <a:r>
+              <a:rPr lang="es-AR" dirty="0" smtClean="0"/>
+              <a:t>Aplicar medidas organizativas</a:t>
+            </a:r>
+            <a:endParaRPr lang="es-AR" dirty="0" smtClean="0"/>
+          </a:p>
+          <a:p>
+            <a:pPr lvl="1"/>
+            <a:r>
+              <a:rPr lang="es-AR" dirty="0" smtClean="0"/>
+              <a:t>Explotar su potencial</a:t>
+            </a:r>
+          </a:p>
+          <a:p>
+            <a:pPr lvl="1"/>
+            <a:r>
+              <a:rPr lang="es-AR" dirty="0" smtClean="0"/>
+              <a:t>Para asegurar su privilegiada posición</a:t>
+            </a:r>
           </a:p>
         </p:txBody>
       </p:sp>
@@ -12039,7 +12804,7 @@
 </p:sld>
 </file>
 
-<file path=ppt/slides/slide22.xml><?xml version="1.0" encoding="utf-8"?>
+<file path=ppt/slides/slide29.xml><?xml version="1.0" encoding="utf-8"?>
 <p:sld xmlns:a="http://schemas.openxmlformats.org/drawingml/2006/main" xmlns:r="http://schemas.openxmlformats.org/officeDocument/2006/relationships" xmlns:p="http://schemas.openxmlformats.org/presentationml/2006/main">
   <p:cSld>
     <p:spTree>
@@ -12598,8 +13363,8 @@
         </p:blipFill>
         <p:spPr bwMode="auto">
           <a:xfrm>
-            <a:off x="1547663" y="1928813"/>
-            <a:ext cx="3737967" cy="3864250"/>
+            <a:off x="1547663" y="1928812"/>
+            <a:ext cx="3737967" cy="4452515"/>
           </a:xfrm>
           <a:prstGeom prst="rect">
             <a:avLst/>
@@ -12631,7 +13396,7 @@
         <p:spPr bwMode="auto">
           <a:xfrm>
             <a:off x="5364088" y="1916833"/>
-            <a:ext cx="3384376" cy="3888432"/>
+            <a:ext cx="3384376" cy="4480378"/>
           </a:xfrm>
           <a:prstGeom prst="rect">
             <a:avLst/>
@@ -12724,7 +13489,7 @@
         <p:spPr bwMode="auto">
           <a:xfrm>
             <a:off x="1763688" y="1103388"/>
-            <a:ext cx="7056784" cy="5402164"/>
+            <a:ext cx="7056784" cy="5493964"/>
           </a:xfrm>
           <a:prstGeom prst="rect">
             <a:avLst/>

</xml_diff>